<commit_message>
minor cleanup and changes diploma and Presentation.pptx
</commit_message>
<xml_diff>
--- a/docs/Presentation.pptx
+++ b/docs/Presentation.pptx
@@ -13,11 +13,16 @@
     <p:sldId id="263" r:id="rId7"/>
     <p:sldId id="260" r:id="rId8"/>
     <p:sldId id="259" r:id="rId9"/>
-    <p:sldId id="266" r:id="rId10"/>
-    <p:sldId id="267" r:id="rId11"/>
-    <p:sldId id="268" r:id="rId12"/>
-    <p:sldId id="269" r:id="rId13"/>
-    <p:sldId id="262" r:id="rId14"/>
+    <p:sldId id="270" r:id="rId10"/>
+    <p:sldId id="266" r:id="rId11"/>
+    <p:sldId id="267" r:id="rId12"/>
+    <p:sldId id="271" r:id="rId13"/>
+    <p:sldId id="272" r:id="rId14"/>
+    <p:sldId id="268" r:id="rId15"/>
+    <p:sldId id="269" r:id="rId16"/>
+    <p:sldId id="273" r:id="rId17"/>
+    <p:sldId id="262" r:id="rId18"/>
+    <p:sldId id="274" r:id="rId19"/>
   </p:sldIdLst>
   <p:sldSz cx="12192000" cy="6858000"/>
   <p:notesSz cx="6858000" cy="9144000"/>
@@ -271,7 +276,7 @@
           <a:p>
             <a:fld id="{D5ACBE5F-0E6D-41DB-81D9-950E8D2117EC}" type="datetimeFigureOut">
               <a:rPr lang="ru-RU" smtClean="0"/>
-              <a:t>23.05.2022</a:t>
+              <a:t>15.06.2022</a:t>
             </a:fld>
             <a:endParaRPr lang="ru-RU"/>
           </a:p>
@@ -469,7 +474,7 @@
           <a:p>
             <a:fld id="{D5ACBE5F-0E6D-41DB-81D9-950E8D2117EC}" type="datetimeFigureOut">
               <a:rPr lang="ru-RU" smtClean="0"/>
-              <a:t>23.05.2022</a:t>
+              <a:t>15.06.2022</a:t>
             </a:fld>
             <a:endParaRPr lang="ru-RU"/>
           </a:p>
@@ -677,7 +682,7 @@
           <a:p>
             <a:fld id="{D5ACBE5F-0E6D-41DB-81D9-950E8D2117EC}" type="datetimeFigureOut">
               <a:rPr lang="ru-RU" smtClean="0"/>
-              <a:t>23.05.2022</a:t>
+              <a:t>15.06.2022</a:t>
             </a:fld>
             <a:endParaRPr lang="ru-RU"/>
           </a:p>
@@ -875,7 +880,7 @@
           <a:p>
             <a:fld id="{D5ACBE5F-0E6D-41DB-81D9-950E8D2117EC}" type="datetimeFigureOut">
               <a:rPr lang="ru-RU" smtClean="0"/>
-              <a:t>23.05.2022</a:t>
+              <a:t>15.06.2022</a:t>
             </a:fld>
             <a:endParaRPr lang="ru-RU"/>
           </a:p>
@@ -1150,7 +1155,7 @@
           <a:p>
             <a:fld id="{D5ACBE5F-0E6D-41DB-81D9-950E8D2117EC}" type="datetimeFigureOut">
               <a:rPr lang="ru-RU" smtClean="0"/>
-              <a:t>23.05.2022</a:t>
+              <a:t>15.06.2022</a:t>
             </a:fld>
             <a:endParaRPr lang="ru-RU"/>
           </a:p>
@@ -1415,7 +1420,7 @@
           <a:p>
             <a:fld id="{D5ACBE5F-0E6D-41DB-81D9-950E8D2117EC}" type="datetimeFigureOut">
               <a:rPr lang="ru-RU" smtClean="0"/>
-              <a:t>23.05.2022</a:t>
+              <a:t>15.06.2022</a:t>
             </a:fld>
             <a:endParaRPr lang="ru-RU"/>
           </a:p>
@@ -1827,7 +1832,7 @@
           <a:p>
             <a:fld id="{D5ACBE5F-0E6D-41DB-81D9-950E8D2117EC}" type="datetimeFigureOut">
               <a:rPr lang="ru-RU" smtClean="0"/>
-              <a:t>23.05.2022</a:t>
+              <a:t>15.06.2022</a:t>
             </a:fld>
             <a:endParaRPr lang="ru-RU"/>
           </a:p>
@@ -1968,7 +1973,7 @@
           <a:p>
             <a:fld id="{D5ACBE5F-0E6D-41DB-81D9-950E8D2117EC}" type="datetimeFigureOut">
               <a:rPr lang="ru-RU" smtClean="0"/>
-              <a:t>23.05.2022</a:t>
+              <a:t>15.06.2022</a:t>
             </a:fld>
             <a:endParaRPr lang="ru-RU"/>
           </a:p>
@@ -2081,7 +2086,7 @@
           <a:p>
             <a:fld id="{D5ACBE5F-0E6D-41DB-81D9-950E8D2117EC}" type="datetimeFigureOut">
               <a:rPr lang="ru-RU" smtClean="0"/>
-              <a:t>23.05.2022</a:t>
+              <a:t>15.06.2022</a:t>
             </a:fld>
             <a:endParaRPr lang="ru-RU"/>
           </a:p>
@@ -2392,7 +2397,7 @@
           <a:p>
             <a:fld id="{D5ACBE5F-0E6D-41DB-81D9-950E8D2117EC}" type="datetimeFigureOut">
               <a:rPr lang="ru-RU" smtClean="0"/>
-              <a:t>23.05.2022</a:t>
+              <a:t>15.06.2022</a:t>
             </a:fld>
             <a:endParaRPr lang="ru-RU"/>
           </a:p>
@@ -2680,7 +2685,7 @@
           <a:p>
             <a:fld id="{D5ACBE5F-0E6D-41DB-81D9-950E8D2117EC}" type="datetimeFigureOut">
               <a:rPr lang="ru-RU" smtClean="0"/>
-              <a:t>23.05.2022</a:t>
+              <a:t>15.06.2022</a:t>
             </a:fld>
             <a:endParaRPr lang="ru-RU"/>
           </a:p>
@@ -2921,7 +2926,7 @@
           <a:p>
             <a:fld id="{D5ACBE5F-0E6D-41DB-81D9-950E8D2117EC}" type="datetimeFigureOut">
               <a:rPr lang="ru-RU" smtClean="0"/>
-              <a:t>23.05.2022</a:t>
+              <a:t>15.06.2022</a:t>
             </a:fld>
             <a:endParaRPr lang="ru-RU"/>
           </a:p>
@@ -3631,7 +3636,7 @@
                   </a:schemeClr>
                 </a:solidFill>
               </a:rPr>
-              <a:t>FRONTEND</a:t>
+              <a:t>REPOSITORY PATTERN</a:t>
             </a:r>
             <a:endParaRPr lang="ru-RU" b="1" dirty="0">
               <a:solidFill>
@@ -3697,7 +3702,7 @@
         <p:spPr>
           <a:xfrm>
             <a:off x="838200" y="1435980"/>
-            <a:ext cx="6027420" cy="4708981"/>
+            <a:ext cx="5257800" cy="1938992"/>
           </a:xfrm>
           <a:prstGeom prst="rect">
             <a:avLst/>
@@ -3710,135 +3715,25 @@
           <a:lstStyle/>
           <a:p>
             <a:r>
-              <a:rPr lang="ru-RU" sz="2800" b="1" dirty="0">
+              <a:rPr lang="en-US" sz="2400" b="1" dirty="0">
                 <a:solidFill>
                   <a:schemeClr val="accent1">
                     <a:lumMod val="50000"/>
                   </a:schemeClr>
                 </a:solidFill>
               </a:rPr>
-              <a:t>SPA</a:t>
-            </a:r>
-            <a:r>
-              <a:rPr lang="en-US" sz="2800" b="1" dirty="0">
+              <a:t>Persistence Ignorance – </a:t>
+            </a:r>
+            <a:r>
+              <a:rPr lang="ru-RU" sz="2400" b="1" dirty="0">
                 <a:solidFill>
                   <a:schemeClr val="accent1">
                     <a:lumMod val="50000"/>
                   </a:schemeClr>
                 </a:solidFill>
               </a:rPr>
-              <a:t> </a:t>
-            </a:r>
-            <a:r>
-              <a:rPr lang="ru-RU" sz="2800" b="1" dirty="0">
-                <a:solidFill>
-                  <a:schemeClr val="accent1">
-                    <a:lumMod val="50000"/>
-                  </a:schemeClr>
-                </a:solidFill>
-              </a:rPr>
-              <a:t>–</a:t>
-            </a:r>
-            <a:r>
-              <a:rPr lang="en-US" sz="2800" b="1" dirty="0">
-                <a:solidFill>
-                  <a:schemeClr val="accent1">
-                    <a:lumMod val="50000"/>
-                  </a:schemeClr>
-                </a:solidFill>
-              </a:rPr>
-              <a:t> </a:t>
-            </a:r>
-            <a:r>
-              <a:rPr lang="ru-RU" sz="2800" b="1" dirty="0">
-                <a:solidFill>
-                  <a:schemeClr val="accent1">
-                    <a:lumMod val="50000"/>
-                  </a:schemeClr>
-                </a:solidFill>
-              </a:rPr>
-              <a:t>одностраничное веб-приложение, которое загружается на одну HTML-страницу.</a:t>
-            </a:r>
-            <a:endParaRPr lang="en-US" sz="2800" b="1" dirty="0">
-              <a:solidFill>
-                <a:schemeClr val="accent1">
-                  <a:lumMod val="50000"/>
-                </a:schemeClr>
-              </a:solidFill>
-            </a:endParaRPr>
-          </a:p>
-          <a:p>
-            <a:endParaRPr lang="en-US" sz="2800" b="1" dirty="0">
-              <a:solidFill>
-                <a:schemeClr val="accent1">
-                  <a:lumMod val="50000"/>
-                </a:schemeClr>
-              </a:solidFill>
-            </a:endParaRPr>
-          </a:p>
-          <a:p>
-            <a:r>
-              <a:rPr lang="en-US" sz="2800" b="1" dirty="0">
-                <a:solidFill>
-                  <a:schemeClr val="accent1">
-                    <a:lumMod val="50000"/>
-                  </a:schemeClr>
-                </a:solidFill>
-              </a:rPr>
-              <a:t>CSR – </a:t>
-            </a:r>
-            <a:r>
-              <a:rPr lang="ru-RU" sz="2800" b="1" dirty="0">
-                <a:solidFill>
-                  <a:schemeClr val="accent1">
-                    <a:lumMod val="50000"/>
-                  </a:schemeClr>
-                </a:solidFill>
-              </a:rPr>
-              <a:t>динамическое получение данных без перезагрузки страницы.</a:t>
-            </a:r>
-          </a:p>
-          <a:p>
-            <a:endParaRPr lang="ru-RU" sz="2800" b="1" dirty="0">
-              <a:solidFill>
-                <a:schemeClr val="accent1">
-                  <a:lumMod val="50000"/>
-                </a:schemeClr>
-              </a:solidFill>
-            </a:endParaRPr>
-          </a:p>
-          <a:p>
-            <a:r>
-              <a:rPr lang="en-US" sz="2800" b="1" dirty="0">
-                <a:solidFill>
-                  <a:schemeClr val="accent1">
-                    <a:lumMod val="50000"/>
-                  </a:schemeClr>
-                </a:solidFill>
-              </a:rPr>
-              <a:t>SSR – </a:t>
-            </a:r>
-            <a:r>
-              <a:rPr lang="ru-RU" sz="2800" b="1" dirty="0">
-                <a:solidFill>
-                  <a:schemeClr val="accent1">
-                    <a:lumMod val="50000"/>
-                  </a:schemeClr>
-                </a:solidFill>
-              </a:rPr>
-              <a:t>перезагрузка страницы для обновления данных.</a:t>
-            </a:r>
-          </a:p>
-          <a:p>
-            <a:endParaRPr lang="ru-RU" sz="2400" b="1" dirty="0">
-              <a:solidFill>
-                <a:schemeClr val="accent1">
-                  <a:lumMod val="50000"/>
-                </a:schemeClr>
-              </a:solidFill>
-            </a:endParaRPr>
-          </a:p>
-          <a:p>
+              <a:t>классы, моделирующие бизнес-домен в программном приложении, не должны зависеть от того, как они могут быть сохранены.</a:t>
+            </a:r>
             <a:endParaRPr lang="ru-RU" sz="2400" dirty="0">
               <a:solidFill>
                 <a:schemeClr val="accent1">
@@ -3851,10 +3746,10 @@
       </p:sp>
       <p:pic>
         <p:nvPicPr>
-          <p:cNvPr id="6146" name="Picture 2" descr="Что такое SPA - особености и примеры одностраничных приложений для бизнеса">
-            <a:extLst>
-              <a:ext uri="{FF2B5EF4-FFF2-40B4-BE49-F238E27FC236}">
-                <a16:creationId xmlns:a16="http://schemas.microsoft.com/office/drawing/2014/main" id="{6D15A0AC-65C5-46E8-ABE4-77F79E740C6E}"/>
+          <p:cNvPr id="4106" name="Picture 10" descr="Hibernate. Everything data.">
+            <a:extLst>
+              <a:ext uri="{FF2B5EF4-FFF2-40B4-BE49-F238E27FC236}">
+                <a16:creationId xmlns:a16="http://schemas.microsoft.com/office/drawing/2014/main" id="{31A946E0-E5CF-4338-BCD0-92967EBF0A2C}"/>
               </a:ext>
             </a:extLst>
           </p:cNvPr>
@@ -3878,8 +3773,8 @@
         </p:blipFill>
         <p:spPr bwMode="auto">
           <a:xfrm>
-            <a:off x="7056122" y="1252802"/>
-            <a:ext cx="4853938" cy="5391878"/>
+            <a:off x="5799773" y="1398113"/>
+            <a:ext cx="5823979" cy="1553061"/>
           </a:xfrm>
           <a:prstGeom prst="rect">
             <a:avLst/>
@@ -3896,10 +3791,124 @@
           </a:extLst>
         </p:spPr>
       </p:pic>
+      <p:pic>
+        <p:nvPicPr>
+          <p:cNvPr id="4108" name="Picture 12" descr="Spring Data JPA &amp; Hibernate with Cucumber – Software Testing">
+            <a:extLst>
+              <a:ext uri="{FF2B5EF4-FFF2-40B4-BE49-F238E27FC236}">
+                <a16:creationId xmlns:a16="http://schemas.microsoft.com/office/drawing/2014/main" id="{F12784F4-DB28-46DB-A412-F3CC28DC4866}"/>
+              </a:ext>
+            </a:extLst>
+          </p:cNvPr>
+          <p:cNvPicPr>
+            <a:picLocks noChangeAspect="1" noChangeArrowheads="1"/>
+          </p:cNvPicPr>
+          <p:nvPr/>
+        </p:nvPicPr>
+        <p:blipFill>
+          <a:blip r:embed="rId3">
+            <a:extLst>
+              <a:ext uri="{28A0092B-C50C-407E-A947-70E740481C1C}">
+                <a14:useLocalDpi xmlns:a14="http://schemas.microsoft.com/office/drawing/2010/main" val="0"/>
+              </a:ext>
+            </a:extLst>
+          </a:blip>
+          <a:srcRect/>
+          <a:stretch>
+            <a:fillRect/>
+          </a:stretch>
+        </p:blipFill>
+        <p:spPr bwMode="auto">
+          <a:xfrm>
+            <a:off x="6536121" y="3774504"/>
+            <a:ext cx="4351281" cy="2216307"/>
+          </a:xfrm>
+          <a:prstGeom prst="rect">
+            <a:avLst/>
+          </a:prstGeom>
+          <a:noFill/>
+          <a:extLst>
+            <a:ext uri="{909E8E84-426E-40DD-AFC4-6F175D3DCCD1}">
+              <a14:hiddenFill xmlns:a14="http://schemas.microsoft.com/office/drawing/2010/main">
+                <a:solidFill>
+                  <a:srgbClr val="FFFFFF"/>
+                </a:solidFill>
+              </a14:hiddenFill>
+            </a:ext>
+          </a:extLst>
+        </p:spPr>
+      </p:pic>
+      <p:sp>
+        <p:nvSpPr>
+          <p:cNvPr id="19" name="Прямоугольник 18">
+            <a:extLst>
+              <a:ext uri="{FF2B5EF4-FFF2-40B4-BE49-F238E27FC236}">
+                <a16:creationId xmlns:a16="http://schemas.microsoft.com/office/drawing/2014/main" id="{7EFCD501-66D6-4844-AE13-0EA92988C8EB}"/>
+              </a:ext>
+            </a:extLst>
+          </p:cNvPr>
+          <p:cNvSpPr/>
+          <p:nvPr/>
+        </p:nvSpPr>
+        <p:spPr>
+          <a:xfrm>
+            <a:off x="838200" y="3543830"/>
+            <a:ext cx="5257800" cy="2677656"/>
+          </a:xfrm>
+          <a:prstGeom prst="rect">
+            <a:avLst/>
+          </a:prstGeom>
+        </p:spPr>
+        <p:txBody>
+          <a:bodyPr wrap="square">
+            <a:spAutoFit/>
+          </a:bodyPr>
+          <a:lstStyle/>
+          <a:p>
+            <a:r>
+              <a:rPr lang="ru-RU" sz="2400" b="1" dirty="0" err="1">
+                <a:solidFill>
+                  <a:schemeClr val="accent1">
+                    <a:lumMod val="50000"/>
+                  </a:schemeClr>
+                </a:solidFill>
+              </a:rPr>
+              <a:t>Repository</a:t>
+            </a:r>
+            <a:r>
+              <a:rPr lang="en-US" sz="2400" b="1" dirty="0">
+                <a:solidFill>
+                  <a:schemeClr val="accent1">
+                    <a:lumMod val="50000"/>
+                  </a:schemeClr>
+                </a:solidFill>
+              </a:rPr>
+              <a:t> </a:t>
+            </a:r>
+            <a:r>
+              <a:rPr lang="ru-RU" sz="2400" b="1" dirty="0">
+                <a:solidFill>
+                  <a:schemeClr val="accent1">
+                    <a:lumMod val="50000"/>
+                  </a:schemeClr>
+                </a:solidFill>
+              </a:rPr>
+              <a:t>– это интерфейс, который абстрагирует таблицу в БД и позволяет выполнять все необходимые задачи по хранению и обработке данных с помощью привычного разработчику языка программирования. </a:t>
+            </a:r>
+            <a:endParaRPr lang="ru-RU" sz="2400" dirty="0">
+              <a:solidFill>
+                <a:schemeClr val="accent1">
+                  <a:lumMod val="50000"/>
+                </a:schemeClr>
+              </a:solidFill>
+            </a:endParaRPr>
+          </a:p>
+        </p:txBody>
+      </p:sp>
     </p:spTree>
     <p:extLst>
       <p:ext uri="{BB962C8B-B14F-4D97-AF65-F5344CB8AC3E}">
-        <p14:creationId xmlns:p14="http://schemas.microsoft.com/office/powerpoint/2010/main" val="2900264544"/>
+        <p14:creationId xmlns:p14="http://schemas.microsoft.com/office/powerpoint/2010/main" val="2860851999"/>
       </p:ext>
     </p:extLst>
   </p:cSld>
@@ -3954,14 +3963,14 @@
           <a:p>
             <a:pPr algn="ctr"/>
             <a:r>
-              <a:rPr lang="ru-RU" sz="4000" b="1" dirty="0">
+              <a:rPr lang="en-US" sz="4000" b="1" dirty="0">
                 <a:solidFill>
                   <a:schemeClr val="accent1">
                     <a:lumMod val="75000"/>
                   </a:schemeClr>
                 </a:solidFill>
               </a:rPr>
-              <a:t>КОМПОНЕНТЫ ИНТЕРФЕЙСА</a:t>
+              <a:t>FRONTEND</a:t>
             </a:r>
             <a:endParaRPr lang="ru-RU" b="1" dirty="0">
               <a:solidFill>
@@ -4026,8 +4035,8 @@
         </p:nvSpPr>
         <p:spPr>
           <a:xfrm>
-            <a:off x="7807720" y="5901589"/>
-            <a:ext cx="2103120" cy="400110"/>
+            <a:off x="838200" y="1435980"/>
+            <a:ext cx="6027420" cy="4708981"/>
           </a:xfrm>
           <a:prstGeom prst="rect">
             <a:avLst/>
@@ -4039,18 +4048,57 @@
           </a:bodyPr>
           <a:lstStyle/>
           <a:p>
-            <a:pPr algn="ctr"/>
-            <a:r>
-              <a:rPr lang="en-US" sz="2000" b="1" dirty="0" err="1">
+            <a:r>
+              <a:rPr lang="ru-RU" sz="2800" b="1" dirty="0">
                 <a:solidFill>
                   <a:schemeClr val="accent1">
                     <a:lumMod val="50000"/>
                   </a:schemeClr>
                 </a:solidFill>
               </a:rPr>
-              <a:t>ComboBox</a:t>
-            </a:r>
-            <a:endParaRPr lang="ru-RU" dirty="0">
+              <a:t>SPA</a:t>
+            </a:r>
+            <a:r>
+              <a:rPr lang="en-US" sz="2800" b="1" dirty="0">
+                <a:solidFill>
+                  <a:schemeClr val="accent1">
+                    <a:lumMod val="50000"/>
+                  </a:schemeClr>
+                </a:solidFill>
+              </a:rPr>
+              <a:t> </a:t>
+            </a:r>
+            <a:r>
+              <a:rPr lang="ru-RU" sz="2800" b="1" dirty="0">
+                <a:solidFill>
+                  <a:schemeClr val="accent1">
+                    <a:lumMod val="50000"/>
+                  </a:schemeClr>
+                </a:solidFill>
+              </a:rPr>
+              <a:t>–</a:t>
+            </a:r>
+            <a:r>
+              <a:rPr lang="en-US" sz="2800" b="1" dirty="0">
+                <a:solidFill>
+                  <a:schemeClr val="accent1">
+                    <a:lumMod val="50000"/>
+                  </a:schemeClr>
+                </a:solidFill>
+              </a:rPr>
+              <a:t> </a:t>
+            </a:r>
+            <a:r>
+              <a:rPr lang="ru-RU" sz="2800" b="1" dirty="0">
+                <a:solidFill>
+                  <a:schemeClr val="accent1">
+                    <a:lumMod val="50000"/>
+                  </a:schemeClr>
+                </a:solidFill>
+              </a:rPr>
+              <a:t>одностраничное веб-приложение, которое загружается на одну HTML-страницу.</a:t>
+            </a:r>
+            <a:endParaRPr lang="en-US" sz="2800" b="1" dirty="0">
               <a:solidFill>
                 <a:schemeClr val="accent1">
                   <a:lumMod val="50000"/>
@@ -4058,107 +4106,8 @@
               </a:solidFill>
             </a:endParaRPr>
           </a:p>
-        </p:txBody>
-      </p:sp>
-      <p:pic>
-        <p:nvPicPr>
-          <p:cNvPr id="4" name="Рисунок 3">
-            <a:extLst>
-              <a:ext uri="{FF2B5EF4-FFF2-40B4-BE49-F238E27FC236}">
-                <a16:creationId xmlns:a16="http://schemas.microsoft.com/office/drawing/2014/main" id="{BBA634B8-0540-49D9-A920-A977FC68ABC8}"/>
-              </a:ext>
-            </a:extLst>
-          </p:cNvPr>
-          <p:cNvPicPr>
-            <a:picLocks noChangeAspect="1"/>
-          </p:cNvPicPr>
-          <p:nvPr/>
-        </p:nvPicPr>
-        <p:blipFill>
-          <a:blip r:embed="rId2"/>
-          <a:stretch>
-            <a:fillRect/>
-          </a:stretch>
-        </p:blipFill>
-        <p:spPr>
-          <a:xfrm>
-            <a:off x="838200" y="1436150"/>
-            <a:ext cx="4191000" cy="801437"/>
-          </a:xfrm>
-          <a:prstGeom prst="rect">
-            <a:avLst/>
-          </a:prstGeom>
-        </p:spPr>
-      </p:pic>
-      <p:pic>
-        <p:nvPicPr>
-          <p:cNvPr id="5" name="Рисунок 4">
-            <a:extLst>
-              <a:ext uri="{FF2B5EF4-FFF2-40B4-BE49-F238E27FC236}">
-                <a16:creationId xmlns:a16="http://schemas.microsoft.com/office/drawing/2014/main" id="{0D7C72FC-C6DC-4518-A400-079190A5487D}"/>
-              </a:ext>
-            </a:extLst>
-          </p:cNvPr>
-          <p:cNvPicPr>
-            <a:picLocks noChangeAspect="1"/>
-          </p:cNvPicPr>
-          <p:nvPr/>
-        </p:nvPicPr>
-        <p:blipFill>
-          <a:blip r:embed="rId3"/>
-          <a:stretch>
-            <a:fillRect/>
-          </a:stretch>
-        </p:blipFill>
-        <p:spPr>
-          <a:xfrm>
-            <a:off x="838200" y="3295687"/>
-            <a:ext cx="4099560" cy="845941"/>
-          </a:xfrm>
-          <a:prstGeom prst="rect">
-            <a:avLst/>
-          </a:prstGeom>
-        </p:spPr>
-      </p:pic>
-      <p:sp>
-        <p:nvSpPr>
-          <p:cNvPr id="10" name="Прямоугольник 9">
-            <a:extLst>
-              <a:ext uri="{FF2B5EF4-FFF2-40B4-BE49-F238E27FC236}">
-                <a16:creationId xmlns:a16="http://schemas.microsoft.com/office/drawing/2014/main" id="{D476531E-B0F1-47CE-B35F-23B387E54334}"/>
-              </a:ext>
-            </a:extLst>
-          </p:cNvPr>
-          <p:cNvSpPr/>
-          <p:nvPr/>
-        </p:nvSpPr>
-        <p:spPr>
-          <a:xfrm>
-            <a:off x="1882140" y="2298665"/>
-            <a:ext cx="2103120" cy="400110"/>
-          </a:xfrm>
-          <a:prstGeom prst="rect">
-            <a:avLst/>
-          </a:prstGeom>
-        </p:spPr>
-        <p:txBody>
-          <a:bodyPr wrap="square">
-            <a:spAutoFit/>
-          </a:bodyPr>
-          <a:lstStyle/>
-          <a:p>
-            <a:pPr algn="ctr"/>
-            <a:r>
-              <a:rPr lang="en-US" sz="2000" b="1" dirty="0" err="1">
-                <a:solidFill>
-                  <a:schemeClr val="accent1">
-                    <a:lumMod val="50000"/>
-                  </a:schemeClr>
-                </a:solidFill>
-              </a:rPr>
-              <a:t>TextField</a:t>
-            </a:r>
-            <a:endParaRPr lang="ru-RU" dirty="0">
+          <a:p>
+            <a:endParaRPr lang="en-US" sz="2800" b="1" dirty="0">
               <a:solidFill>
                 <a:schemeClr val="accent1">
                   <a:lumMod val="50000"/>
@@ -4166,47 +4115,30 @@
               </a:solidFill>
             </a:endParaRPr>
           </a:p>
-        </p:txBody>
-      </p:sp>
-      <p:sp>
-        <p:nvSpPr>
-          <p:cNvPr id="11" name="Прямоугольник 10">
-            <a:extLst>
-              <a:ext uri="{FF2B5EF4-FFF2-40B4-BE49-F238E27FC236}">
-                <a16:creationId xmlns:a16="http://schemas.microsoft.com/office/drawing/2014/main" id="{B9FE4DE7-CBF9-436F-9BCD-E998D25D1435}"/>
-              </a:ext>
-            </a:extLst>
-          </p:cNvPr>
-          <p:cNvSpPr/>
-          <p:nvPr/>
-        </p:nvSpPr>
-        <p:spPr>
-          <a:xfrm>
-            <a:off x="1836420" y="4226525"/>
-            <a:ext cx="2103120" cy="400110"/>
-          </a:xfrm>
-          <a:prstGeom prst="rect">
-            <a:avLst/>
-          </a:prstGeom>
-        </p:spPr>
-        <p:txBody>
-          <a:bodyPr wrap="square">
-            <a:spAutoFit/>
-          </a:bodyPr>
-          <a:lstStyle/>
-          <a:p>
-            <a:pPr algn="ctr"/>
-            <a:r>
-              <a:rPr lang="en-US" sz="2000" b="1" dirty="0" err="1">
+          <a:p>
+            <a:r>
+              <a:rPr lang="en-US" sz="2800" b="1" dirty="0">
                 <a:solidFill>
                   <a:schemeClr val="accent1">
                     <a:lumMod val="50000"/>
                   </a:schemeClr>
                 </a:solidFill>
               </a:rPr>
-              <a:t>DateField</a:t>
-            </a:r>
-            <a:endParaRPr lang="ru-RU" dirty="0">
+              <a:t>CSR – </a:t>
+            </a:r>
+            <a:r>
+              <a:rPr lang="ru-RU" sz="2800" b="1" dirty="0">
+                <a:solidFill>
+                  <a:schemeClr val="accent1">
+                    <a:lumMod val="50000"/>
+                  </a:schemeClr>
+                </a:solidFill>
+              </a:rPr>
+              <a:t>динамическое получение данных без перезагрузки страницы.</a:t>
+            </a:r>
+          </a:p>
+          <a:p>
+            <a:endParaRPr lang="ru-RU" sz="2800" b="1" dirty="0">
               <a:solidFill>
                 <a:schemeClr val="accent1">
                   <a:lumMod val="50000"/>
@@ -4214,77 +4146,30 @@
               </a:solidFill>
             </a:endParaRPr>
           </a:p>
-        </p:txBody>
-      </p:sp>
-      <p:pic>
-        <p:nvPicPr>
-          <p:cNvPr id="12" name="Рисунок 11">
-            <a:extLst>
-              <a:ext uri="{FF2B5EF4-FFF2-40B4-BE49-F238E27FC236}">
-                <a16:creationId xmlns:a16="http://schemas.microsoft.com/office/drawing/2014/main" id="{C387BAEE-2DD2-4C5B-AC67-170CBB09FE35}"/>
-              </a:ext>
-            </a:extLst>
-          </p:cNvPr>
-          <p:cNvPicPr>
-            <a:picLocks noChangeAspect="1"/>
-          </p:cNvPicPr>
-          <p:nvPr/>
-        </p:nvPicPr>
-        <p:blipFill>
-          <a:blip r:embed="rId4"/>
-          <a:stretch>
-            <a:fillRect/>
-          </a:stretch>
-        </p:blipFill>
-        <p:spPr>
-          <a:xfrm>
-            <a:off x="838200" y="4940770"/>
-            <a:ext cx="4099560" cy="846739"/>
-          </a:xfrm>
-          <a:prstGeom prst="rect">
-            <a:avLst/>
-          </a:prstGeom>
-        </p:spPr>
-      </p:pic>
-      <p:sp>
-        <p:nvSpPr>
-          <p:cNvPr id="15" name="Прямоугольник 14">
-            <a:extLst>
-              <a:ext uri="{FF2B5EF4-FFF2-40B4-BE49-F238E27FC236}">
-                <a16:creationId xmlns:a16="http://schemas.microsoft.com/office/drawing/2014/main" id="{0D243D85-959E-49F1-8EDB-92F8B3F6612A}"/>
-              </a:ext>
-            </a:extLst>
-          </p:cNvPr>
-          <p:cNvSpPr/>
-          <p:nvPr/>
-        </p:nvSpPr>
-        <p:spPr>
-          <a:xfrm>
-            <a:off x="1882140" y="5901589"/>
-            <a:ext cx="2103120" cy="400110"/>
-          </a:xfrm>
-          <a:prstGeom prst="rect">
-            <a:avLst/>
-          </a:prstGeom>
-        </p:spPr>
-        <p:txBody>
-          <a:bodyPr wrap="square">
-            <a:spAutoFit/>
-          </a:bodyPr>
-          <a:lstStyle/>
-          <a:p>
-            <a:pPr algn="ctr"/>
-            <a:r>
-              <a:rPr lang="en-US" sz="2000" b="1" dirty="0" err="1">
+          <a:p>
+            <a:r>
+              <a:rPr lang="en-US" sz="2800" b="1" dirty="0">
                 <a:solidFill>
                   <a:schemeClr val="accent1">
                     <a:lumMod val="50000"/>
                   </a:schemeClr>
                 </a:solidFill>
               </a:rPr>
-              <a:t>MoneyField</a:t>
-            </a:r>
-            <a:endParaRPr lang="ru-RU" dirty="0">
+              <a:t>SSR – </a:t>
+            </a:r>
+            <a:r>
+              <a:rPr lang="ru-RU" sz="2800" b="1" dirty="0">
+                <a:solidFill>
+                  <a:schemeClr val="accent1">
+                    <a:lumMod val="50000"/>
+                  </a:schemeClr>
+                </a:solidFill>
+              </a:rPr>
+              <a:t>перезагрузка страницы для обновления данных.</a:t>
+            </a:r>
+          </a:p>
+          <a:p>
+            <a:endParaRPr lang="ru-RU" sz="2400" b="1" dirty="0">
               <a:solidFill>
                 <a:schemeClr val="accent1">
                   <a:lumMod val="50000"/>
@@ -4292,42 +4177,68 @@
               </a:solidFill>
             </a:endParaRPr>
           </a:p>
+          <a:p>
+            <a:endParaRPr lang="ru-RU" sz="2400" dirty="0">
+              <a:solidFill>
+                <a:schemeClr val="accent1">
+                  <a:lumMod val="50000"/>
+                </a:schemeClr>
+              </a:solidFill>
+            </a:endParaRPr>
+          </a:p>
         </p:txBody>
       </p:sp>
       <p:pic>
         <p:nvPicPr>
-          <p:cNvPr id="14" name="Рисунок 13">
-            <a:extLst>
-              <a:ext uri="{FF2B5EF4-FFF2-40B4-BE49-F238E27FC236}">
-                <a16:creationId xmlns:a16="http://schemas.microsoft.com/office/drawing/2014/main" id="{C79AC156-B441-4305-8467-F34D9D8CCFA9}"/>
+          <p:cNvPr id="6146" name="Picture 2" descr="Что такое SPA - особености и примеры одностраничных приложений для бизнеса">
+            <a:extLst>
+              <a:ext uri="{FF2B5EF4-FFF2-40B4-BE49-F238E27FC236}">
+                <a16:creationId xmlns:a16="http://schemas.microsoft.com/office/drawing/2014/main" id="{6D15A0AC-65C5-46E8-ABE4-77F79E740C6E}"/>
               </a:ext>
             </a:extLst>
           </p:cNvPr>
           <p:cNvPicPr>
-            <a:picLocks noChangeAspect="1"/>
+            <a:picLocks noChangeAspect="1" noChangeArrowheads="1"/>
           </p:cNvPicPr>
           <p:nvPr/>
         </p:nvPicPr>
         <p:blipFill>
-          <a:blip r:embed="rId5"/>
+          <a:blip r:embed="rId2">
+            <a:extLst>
+              <a:ext uri="{28A0092B-C50C-407E-A947-70E740481C1C}">
+                <a14:useLocalDpi xmlns:a14="http://schemas.microsoft.com/office/drawing/2010/main" val="0"/>
+              </a:ext>
+            </a:extLst>
+          </a:blip>
+          <a:srcRect/>
           <a:stretch>
             <a:fillRect/>
           </a:stretch>
         </p:blipFill>
-        <p:spPr>
-          <a:xfrm>
-            <a:off x="6096000" y="1436148"/>
-            <a:ext cx="5534380" cy="4351355"/>
+        <p:spPr bwMode="auto">
+          <a:xfrm>
+            <a:off x="7056122" y="1252802"/>
+            <a:ext cx="4853938" cy="5391878"/>
           </a:xfrm>
           <a:prstGeom prst="rect">
             <a:avLst/>
           </a:prstGeom>
+          <a:noFill/>
+          <a:extLst>
+            <a:ext uri="{909E8E84-426E-40DD-AFC4-6F175D3DCCD1}">
+              <a14:hiddenFill xmlns:a14="http://schemas.microsoft.com/office/drawing/2010/main">
+                <a:solidFill>
+                  <a:srgbClr val="FFFFFF"/>
+                </a:solidFill>
+              </a14:hiddenFill>
+            </a:ext>
+          </a:extLst>
         </p:spPr>
       </p:pic>
     </p:spTree>
     <p:extLst>
       <p:ext uri="{BB962C8B-B14F-4D97-AF65-F5344CB8AC3E}">
-        <p14:creationId xmlns:p14="http://schemas.microsoft.com/office/powerpoint/2010/main" val="3035227290"/>
+        <p14:creationId xmlns:p14="http://schemas.microsoft.com/office/powerpoint/2010/main" val="2900264544"/>
       </p:ext>
     </p:extLst>
   </p:cSld>
@@ -4389,7 +4300,7 @@
                   </a:schemeClr>
                 </a:solidFill>
               </a:rPr>
-              <a:t>ФОРМЫ</a:t>
+              <a:t>ТЕХНИЧЕСКОЕ ЗАДАНИЕ</a:t>
             </a:r>
             <a:endParaRPr lang="ru-RU" b="1" dirty="0">
               <a:solidFill>
@@ -4454,8 +4365,8 @@
         </p:nvSpPr>
         <p:spPr>
           <a:xfrm>
-            <a:off x="2981325" y="6240702"/>
-            <a:ext cx="6229350" cy="892552"/>
+            <a:off x="504915" y="2483538"/>
+            <a:ext cx="2451931" cy="2985433"/>
           </a:xfrm>
           <a:prstGeom prst="rect">
             <a:avLst/>
@@ -4467,7 +4378,6 @@
           </a:bodyPr>
           <a:lstStyle/>
           <a:p>
-            <a:pPr algn="ctr"/>
             <a:r>
               <a:rPr lang="ru-RU" sz="2800" b="1" dirty="0">
                 <a:solidFill>
@@ -4476,7 +4386,7 @@
                   </a:schemeClr>
                 </a:solidFill>
               </a:rPr>
-              <a:t>Форма создания в модуле </a:t>
+              <a:t>Модули</a:t>
             </a:r>
             <a:r>
               <a:rPr lang="en-US" sz="2800" b="1" dirty="0">
@@ -4486,8 +4396,74 @@
                   </a:schemeClr>
                 </a:solidFill>
               </a:rPr>
-              <a:t>Clients </a:t>
-            </a:r>
+              <a:t>:</a:t>
+            </a:r>
+          </a:p>
+          <a:p>
+            <a:endParaRPr lang="en-US" sz="2800" b="1" dirty="0">
+              <a:solidFill>
+                <a:schemeClr val="accent1">
+                  <a:lumMod val="50000"/>
+                </a:schemeClr>
+              </a:solidFill>
+            </a:endParaRPr>
+          </a:p>
+          <a:p>
+            <a:pPr marL="457200" indent="-457200">
+              <a:buFont typeface="Arial" panose="020B0604020202020204" pitchFamily="34" charset="0"/>
+              <a:buChar char="•"/>
+            </a:pPr>
+            <a:r>
+              <a:rPr lang="en-US" sz="2800" b="1" dirty="0">
+                <a:solidFill>
+                  <a:schemeClr val="accent1">
+                    <a:lumMod val="50000"/>
+                  </a:schemeClr>
+                </a:solidFill>
+              </a:rPr>
+              <a:t>Clients</a:t>
+            </a:r>
+          </a:p>
+          <a:p>
+            <a:pPr marL="457200" indent="-457200">
+              <a:buFont typeface="Arial" panose="020B0604020202020204" pitchFamily="34" charset="0"/>
+              <a:buChar char="•"/>
+            </a:pPr>
+            <a:r>
+              <a:rPr lang="en-US" sz="2800" b="1" dirty="0">
+                <a:solidFill>
+                  <a:schemeClr val="accent1">
+                    <a:lumMod val="50000"/>
+                  </a:schemeClr>
+                </a:solidFill>
+              </a:rPr>
+              <a:t>Cars</a:t>
+            </a:r>
+          </a:p>
+          <a:p>
+            <a:pPr marL="457200" indent="-457200">
+              <a:buFont typeface="Arial" panose="020B0604020202020204" pitchFamily="34" charset="0"/>
+              <a:buChar char="•"/>
+            </a:pPr>
+            <a:r>
+              <a:rPr lang="en-US" sz="2800" b="1" dirty="0">
+                <a:solidFill>
+                  <a:schemeClr val="accent1">
+                    <a:lumMod val="50000"/>
+                  </a:schemeClr>
+                </a:solidFill>
+              </a:rPr>
+              <a:t>Loans</a:t>
+            </a:r>
+            <a:endParaRPr lang="ru-RU" sz="2800" b="1" dirty="0">
+              <a:solidFill>
+                <a:schemeClr val="accent1">
+                  <a:lumMod val="50000"/>
+                </a:schemeClr>
+              </a:solidFill>
+            </a:endParaRPr>
+          </a:p>
+          <a:p>
             <a:endParaRPr lang="ru-RU" sz="2400" b="1" dirty="0">
               <a:solidFill>
                 <a:schemeClr val="accent1">
@@ -4497,7 +4473,6 @@
             </a:endParaRPr>
           </a:p>
           <a:p>
-            <a:pPr algn="ctr"/>
             <a:endParaRPr lang="ru-RU" sz="2400" dirty="0">
               <a:solidFill>
                 <a:schemeClr val="accent1">
@@ -4513,11 +4488,13 @@
           <p:cNvPr id="8" name="Picture">
             <a:extLst>
               <a:ext uri="{FF2B5EF4-FFF2-40B4-BE49-F238E27FC236}">
-                <a16:creationId xmlns:a16="http://schemas.microsoft.com/office/drawing/2014/main" id="{18B546F2-CE14-4667-9D2B-027E1DAD07F7}"/>
-              </a:ext>
-            </a:extLst>
-          </p:cNvPr>
-          <p:cNvPicPr/>
+                <a16:creationId xmlns:a16="http://schemas.microsoft.com/office/drawing/2014/main" id="{26A69BFB-216B-4936-B0B3-3C615F2DBB95}"/>
+              </a:ext>
+            </a:extLst>
+          </p:cNvPr>
+          <p:cNvPicPr>
+            <a:picLocks noChangeAspect="1"/>
+          </p:cNvPicPr>
           <p:nvPr/>
         </p:nvPicPr>
         <p:blipFill>
@@ -4528,8 +4505,8 @@
         </p:blipFill>
         <p:spPr bwMode="auto">
           <a:xfrm>
-            <a:off x="2278221" y="1390648"/>
-            <a:ext cx="7635558" cy="4850093"/>
+            <a:off x="7511753" y="1342407"/>
+            <a:ext cx="4435029" cy="5335079"/>
           </a:xfrm>
           <a:prstGeom prst="rect">
             <a:avLst/>
@@ -4543,10 +4520,47 @@
           </a:ln>
         </p:spPr>
       </p:pic>
+      <p:pic>
+        <p:nvPicPr>
+          <p:cNvPr id="9" name="Picture">
+            <a:extLst>
+              <a:ext uri="{FF2B5EF4-FFF2-40B4-BE49-F238E27FC236}">
+                <a16:creationId xmlns:a16="http://schemas.microsoft.com/office/drawing/2014/main" id="{E42E9672-7539-F180-C0F1-AA720D2C47DB}"/>
+              </a:ext>
+            </a:extLst>
+          </p:cNvPr>
+          <p:cNvPicPr>
+            <a:picLocks noChangeAspect="1"/>
+          </p:cNvPicPr>
+          <p:nvPr/>
+        </p:nvPicPr>
+        <p:blipFill>
+          <a:blip r:embed="rId3"/>
+          <a:stretch>
+            <a:fillRect/>
+          </a:stretch>
+        </p:blipFill>
+        <p:spPr bwMode="auto">
+          <a:xfrm>
+            <a:off x="2667559" y="1342407"/>
+            <a:ext cx="4702741" cy="5267697"/>
+          </a:xfrm>
+          <a:prstGeom prst="rect">
+            <a:avLst/>
+          </a:prstGeom>
+          <a:noFill/>
+          <a:ln w="9525">
+            <a:noFill/>
+            <a:miter lim="800000"/>
+            <a:headEnd/>
+            <a:tailEnd/>
+          </a:ln>
+        </p:spPr>
+      </p:pic>
     </p:spTree>
     <p:extLst>
       <p:ext uri="{BB962C8B-B14F-4D97-AF65-F5344CB8AC3E}">
-        <p14:creationId xmlns:p14="http://schemas.microsoft.com/office/powerpoint/2010/main" val="2035929151"/>
+        <p14:creationId xmlns:p14="http://schemas.microsoft.com/office/powerpoint/2010/main" val="4041772857"/>
       </p:ext>
     </p:extLst>
   </p:cSld>
@@ -4596,22 +4610,27 @@
           </a:xfrm>
         </p:spPr>
         <p:txBody>
-          <a:bodyPr>
-            <a:normAutofit/>
-          </a:bodyPr>
+          <a:bodyPr/>
           <a:lstStyle/>
           <a:p>
             <a:pPr algn="ctr"/>
             <a:r>
-              <a:rPr lang="ru-RU" b="1" dirty="0">
+              <a:rPr lang="ru-RU" sz="4000" b="1" dirty="0">
                 <a:solidFill>
                   <a:schemeClr val="accent1">
                     <a:lumMod val="75000"/>
                   </a:schemeClr>
                 </a:solidFill>
               </a:rPr>
-              <a:t>ЗАКЛЮЧЕНИЕ</a:t>
-            </a:r>
+              <a:t>ОГАНИЗАЦИЯ ПРОЦЕССА РАЗРАБОТКИ</a:t>
+            </a:r>
+            <a:endParaRPr lang="ru-RU" b="1" dirty="0">
+              <a:solidFill>
+                <a:schemeClr val="accent1">
+                  <a:lumMod val="75000"/>
+                </a:schemeClr>
+              </a:solidFill>
+            </a:endParaRPr>
           </a:p>
         </p:txBody>
       </p:sp>
@@ -4656,6 +4675,1080 @@
       </p:cxnSp>
       <p:sp>
         <p:nvSpPr>
+          <p:cNvPr id="6" name="Прямоугольник 5">
+            <a:extLst>
+              <a:ext uri="{FF2B5EF4-FFF2-40B4-BE49-F238E27FC236}">
+                <a16:creationId xmlns:a16="http://schemas.microsoft.com/office/drawing/2014/main" id="{18909AB4-1897-4155-93CB-3E6C1D7435ED}"/>
+              </a:ext>
+            </a:extLst>
+          </p:cNvPr>
+          <p:cNvSpPr/>
+          <p:nvPr/>
+        </p:nvSpPr>
+        <p:spPr>
+          <a:xfrm>
+            <a:off x="1435359" y="1302609"/>
+            <a:ext cx="4660642" cy="461665"/>
+          </a:xfrm>
+          <a:prstGeom prst="rect">
+            <a:avLst/>
+          </a:prstGeom>
+        </p:spPr>
+        <p:txBody>
+          <a:bodyPr wrap="square">
+            <a:spAutoFit/>
+          </a:bodyPr>
+          <a:lstStyle/>
+          <a:p>
+            <a:r>
+              <a:rPr lang="en-US" sz="2400" b="1" dirty="0">
+                <a:solidFill>
+                  <a:schemeClr val="accent1">
+                    <a:lumMod val="50000"/>
+                  </a:schemeClr>
+                </a:solidFill>
+              </a:rPr>
+              <a:t>Agile – </a:t>
+            </a:r>
+            <a:r>
+              <a:rPr lang="ru-RU" sz="2400" b="1" dirty="0">
+                <a:solidFill>
+                  <a:schemeClr val="accent1">
+                    <a:lumMod val="50000"/>
+                  </a:schemeClr>
+                </a:solidFill>
+              </a:rPr>
+              <a:t>итерации каждую неделю</a:t>
+            </a:r>
+            <a:endParaRPr lang="en-US" sz="2400" b="1" dirty="0">
+              <a:solidFill>
+                <a:schemeClr val="accent1">
+                  <a:lumMod val="50000"/>
+                </a:schemeClr>
+              </a:solidFill>
+            </a:endParaRPr>
+          </a:p>
+        </p:txBody>
+      </p:sp>
+      <p:pic>
+        <p:nvPicPr>
+          <p:cNvPr id="10" name="Picture">
+            <a:extLst>
+              <a:ext uri="{FF2B5EF4-FFF2-40B4-BE49-F238E27FC236}">
+                <a16:creationId xmlns:a16="http://schemas.microsoft.com/office/drawing/2014/main" id="{44BB384B-A5D2-E1F1-C56A-BAB1652F6DD0}"/>
+              </a:ext>
+            </a:extLst>
+          </p:cNvPr>
+          <p:cNvPicPr>
+            <a:picLocks noChangeAspect="1"/>
+          </p:cNvPicPr>
+          <p:nvPr/>
+        </p:nvPicPr>
+        <p:blipFill>
+          <a:blip r:embed="rId2"/>
+          <a:stretch>
+            <a:fillRect/>
+          </a:stretch>
+        </p:blipFill>
+        <p:spPr bwMode="auto">
+          <a:xfrm>
+            <a:off x="1435358" y="1995108"/>
+            <a:ext cx="9321283" cy="4405317"/>
+          </a:xfrm>
+          <a:prstGeom prst="rect">
+            <a:avLst/>
+          </a:prstGeom>
+          <a:noFill/>
+          <a:ln w="9525">
+            <a:noFill/>
+            <a:miter lim="800000"/>
+            <a:headEnd/>
+            <a:tailEnd/>
+          </a:ln>
+        </p:spPr>
+      </p:pic>
+      <p:sp>
+        <p:nvSpPr>
+          <p:cNvPr id="11" name="Прямоугольник 5">
+            <a:extLst>
+              <a:ext uri="{FF2B5EF4-FFF2-40B4-BE49-F238E27FC236}">
+                <a16:creationId xmlns:a16="http://schemas.microsoft.com/office/drawing/2014/main" id="{9739F317-3A0A-F851-67D9-839151054AAC}"/>
+              </a:ext>
+            </a:extLst>
+          </p:cNvPr>
+          <p:cNvSpPr/>
+          <p:nvPr/>
+        </p:nvSpPr>
+        <p:spPr>
+          <a:xfrm>
+            <a:off x="7524196" y="1302609"/>
+            <a:ext cx="3232445" cy="461665"/>
+          </a:xfrm>
+          <a:prstGeom prst="rect">
+            <a:avLst/>
+          </a:prstGeom>
+        </p:spPr>
+        <p:txBody>
+          <a:bodyPr wrap="square">
+            <a:spAutoFit/>
+          </a:bodyPr>
+          <a:lstStyle/>
+          <a:p>
+            <a:r>
+              <a:rPr lang="en-US" sz="2400" b="1" dirty="0">
+                <a:solidFill>
+                  <a:schemeClr val="accent1">
+                    <a:lumMod val="50000"/>
+                  </a:schemeClr>
+                </a:solidFill>
+              </a:rPr>
+              <a:t>Kanban</a:t>
+            </a:r>
+            <a:r>
+              <a:rPr lang="ru-RU" sz="2400" b="1" dirty="0">
+                <a:solidFill>
+                  <a:schemeClr val="accent1">
+                    <a:lumMod val="50000"/>
+                  </a:schemeClr>
+                </a:solidFill>
+              </a:rPr>
+              <a:t> – </a:t>
+            </a:r>
+            <a:r>
+              <a:rPr lang="ru-RU" sz="2400" b="1" dirty="0" err="1">
+                <a:solidFill>
+                  <a:schemeClr val="accent1">
+                    <a:lumMod val="50000"/>
+                  </a:schemeClr>
+                </a:solidFill>
+              </a:rPr>
+              <a:t>канбан</a:t>
+            </a:r>
+            <a:r>
+              <a:rPr lang="ru-RU" sz="2400" b="1" dirty="0">
+                <a:solidFill>
+                  <a:schemeClr val="accent1">
+                    <a:lumMod val="50000"/>
+                  </a:schemeClr>
+                </a:solidFill>
+              </a:rPr>
+              <a:t>-доска </a:t>
+            </a:r>
+          </a:p>
+        </p:txBody>
+      </p:sp>
+    </p:spTree>
+    <p:extLst>
+      <p:ext uri="{BB962C8B-B14F-4D97-AF65-F5344CB8AC3E}">
+        <p14:creationId xmlns:p14="http://schemas.microsoft.com/office/powerpoint/2010/main" val="719757607"/>
+      </p:ext>
+    </p:extLst>
+  </p:cSld>
+  <p:clrMapOvr>
+    <a:masterClrMapping/>
+  </p:clrMapOvr>
+</p:sld>
+</file>
+
+<file path=ppt/slides/slide14.xml><?xml version="1.0" encoding="utf-8"?>
+<p:sld xmlns:a="http://schemas.openxmlformats.org/drawingml/2006/main" xmlns:r="http://schemas.openxmlformats.org/officeDocument/2006/relationships" xmlns:p="http://schemas.openxmlformats.org/presentationml/2006/main">
+  <p:cSld>
+    <p:spTree>
+      <p:nvGrpSpPr>
+        <p:cNvPr id="1" name=""/>
+        <p:cNvGrpSpPr/>
+        <p:nvPr/>
+      </p:nvGrpSpPr>
+      <p:grpSpPr>
+        <a:xfrm>
+          <a:off x="0" y="0"/>
+          <a:ext cx="0" cy="0"/>
+          <a:chOff x="0" y="0"/>
+          <a:chExt cx="0" cy="0"/>
+        </a:xfrm>
+      </p:grpSpPr>
+      <p:sp>
+        <p:nvSpPr>
+          <p:cNvPr id="2" name="Заголовок 1">
+            <a:extLst>
+              <a:ext uri="{FF2B5EF4-FFF2-40B4-BE49-F238E27FC236}">
+                <a16:creationId xmlns:a16="http://schemas.microsoft.com/office/drawing/2014/main" id="{ADA68195-9541-49B5-B54A-BE9A47B694A8}"/>
+              </a:ext>
+            </a:extLst>
+          </p:cNvPr>
+          <p:cNvSpPr>
+            <a:spLocks noGrp="1"/>
+          </p:cNvSpPr>
+          <p:nvPr>
+            <p:ph type="title"/>
+          </p:nvPr>
+        </p:nvSpPr>
+        <p:spPr>
+          <a:xfrm>
+            <a:off x="838200" y="-1"/>
+            <a:ext cx="10515600" cy="1169437"/>
+          </a:xfrm>
+        </p:spPr>
+        <p:txBody>
+          <a:bodyPr/>
+          <a:lstStyle/>
+          <a:p>
+            <a:pPr algn="ctr"/>
+            <a:r>
+              <a:rPr lang="ru-RU" sz="4000" b="1" dirty="0">
+                <a:solidFill>
+                  <a:schemeClr val="accent1">
+                    <a:lumMod val="75000"/>
+                  </a:schemeClr>
+                </a:solidFill>
+              </a:rPr>
+              <a:t>КОМПОНЕНТЫ ИНТЕРФЕЙСА</a:t>
+            </a:r>
+            <a:endParaRPr lang="ru-RU" b="1" dirty="0">
+              <a:solidFill>
+                <a:schemeClr val="accent1">
+                  <a:lumMod val="75000"/>
+                </a:schemeClr>
+              </a:solidFill>
+            </a:endParaRPr>
+          </a:p>
+        </p:txBody>
+      </p:sp>
+      <p:cxnSp>
+        <p:nvCxnSpPr>
+          <p:cNvPr id="7" name="Прямая соединительная линия 6">
+            <a:extLst>
+              <a:ext uri="{FF2B5EF4-FFF2-40B4-BE49-F238E27FC236}">
+                <a16:creationId xmlns:a16="http://schemas.microsoft.com/office/drawing/2014/main" id="{BEA8F852-A838-45C3-BAE1-6E4ED9623B53}"/>
+              </a:ext>
+            </a:extLst>
+          </p:cNvPr>
+          <p:cNvCxnSpPr>
+            <a:cxnSpLocks/>
+          </p:cNvCxnSpPr>
+          <p:nvPr/>
+        </p:nvCxnSpPr>
+        <p:spPr>
+          <a:xfrm>
+            <a:off x="0" y="1169438"/>
+            <a:ext cx="12192000" cy="0"/>
+          </a:xfrm>
+          <a:prstGeom prst="line">
+            <a:avLst/>
+          </a:prstGeom>
+          <a:ln/>
+        </p:spPr>
+        <p:style>
+          <a:lnRef idx="3">
+            <a:schemeClr val="accent1"/>
+          </a:lnRef>
+          <a:fillRef idx="0">
+            <a:schemeClr val="accent1"/>
+          </a:fillRef>
+          <a:effectRef idx="2">
+            <a:schemeClr val="accent1"/>
+          </a:effectRef>
+          <a:fontRef idx="minor">
+            <a:schemeClr val="tx1"/>
+          </a:fontRef>
+        </p:style>
+      </p:cxnSp>
+      <p:sp>
+        <p:nvSpPr>
+          <p:cNvPr id="6" name="Прямоугольник 5">
+            <a:extLst>
+              <a:ext uri="{FF2B5EF4-FFF2-40B4-BE49-F238E27FC236}">
+                <a16:creationId xmlns:a16="http://schemas.microsoft.com/office/drawing/2014/main" id="{18909AB4-1897-4155-93CB-3E6C1D7435ED}"/>
+              </a:ext>
+            </a:extLst>
+          </p:cNvPr>
+          <p:cNvSpPr/>
+          <p:nvPr/>
+        </p:nvSpPr>
+        <p:spPr>
+          <a:xfrm>
+            <a:off x="7807720" y="5901589"/>
+            <a:ext cx="2103120" cy="400110"/>
+          </a:xfrm>
+          <a:prstGeom prst="rect">
+            <a:avLst/>
+          </a:prstGeom>
+        </p:spPr>
+        <p:txBody>
+          <a:bodyPr wrap="square">
+            <a:spAutoFit/>
+          </a:bodyPr>
+          <a:lstStyle/>
+          <a:p>
+            <a:pPr algn="ctr"/>
+            <a:r>
+              <a:rPr lang="en-US" sz="2000" b="1" dirty="0" err="1">
+                <a:solidFill>
+                  <a:schemeClr val="accent1">
+                    <a:lumMod val="50000"/>
+                  </a:schemeClr>
+                </a:solidFill>
+              </a:rPr>
+              <a:t>ComboBox</a:t>
+            </a:r>
+            <a:endParaRPr lang="ru-RU" dirty="0">
+              <a:solidFill>
+                <a:schemeClr val="accent1">
+                  <a:lumMod val="50000"/>
+                </a:schemeClr>
+              </a:solidFill>
+            </a:endParaRPr>
+          </a:p>
+        </p:txBody>
+      </p:sp>
+      <p:pic>
+        <p:nvPicPr>
+          <p:cNvPr id="4" name="Рисунок 3">
+            <a:extLst>
+              <a:ext uri="{FF2B5EF4-FFF2-40B4-BE49-F238E27FC236}">
+                <a16:creationId xmlns:a16="http://schemas.microsoft.com/office/drawing/2014/main" id="{BBA634B8-0540-49D9-A920-A977FC68ABC8}"/>
+              </a:ext>
+            </a:extLst>
+          </p:cNvPr>
+          <p:cNvPicPr>
+            <a:picLocks noChangeAspect="1"/>
+          </p:cNvPicPr>
+          <p:nvPr/>
+        </p:nvPicPr>
+        <p:blipFill>
+          <a:blip r:embed="rId2"/>
+          <a:stretch>
+            <a:fillRect/>
+          </a:stretch>
+        </p:blipFill>
+        <p:spPr>
+          <a:xfrm>
+            <a:off x="838200" y="1436150"/>
+            <a:ext cx="4191000" cy="801437"/>
+          </a:xfrm>
+          <a:prstGeom prst="rect">
+            <a:avLst/>
+          </a:prstGeom>
+        </p:spPr>
+      </p:pic>
+      <p:pic>
+        <p:nvPicPr>
+          <p:cNvPr id="5" name="Рисунок 4">
+            <a:extLst>
+              <a:ext uri="{FF2B5EF4-FFF2-40B4-BE49-F238E27FC236}">
+                <a16:creationId xmlns:a16="http://schemas.microsoft.com/office/drawing/2014/main" id="{0D7C72FC-C6DC-4518-A400-079190A5487D}"/>
+              </a:ext>
+            </a:extLst>
+          </p:cNvPr>
+          <p:cNvPicPr>
+            <a:picLocks noChangeAspect="1"/>
+          </p:cNvPicPr>
+          <p:nvPr/>
+        </p:nvPicPr>
+        <p:blipFill>
+          <a:blip r:embed="rId3"/>
+          <a:stretch>
+            <a:fillRect/>
+          </a:stretch>
+        </p:blipFill>
+        <p:spPr>
+          <a:xfrm>
+            <a:off x="838200" y="3295687"/>
+            <a:ext cx="4099560" cy="845941"/>
+          </a:xfrm>
+          <a:prstGeom prst="rect">
+            <a:avLst/>
+          </a:prstGeom>
+        </p:spPr>
+      </p:pic>
+      <p:sp>
+        <p:nvSpPr>
+          <p:cNvPr id="10" name="Прямоугольник 9">
+            <a:extLst>
+              <a:ext uri="{FF2B5EF4-FFF2-40B4-BE49-F238E27FC236}">
+                <a16:creationId xmlns:a16="http://schemas.microsoft.com/office/drawing/2014/main" id="{D476531E-B0F1-47CE-B35F-23B387E54334}"/>
+              </a:ext>
+            </a:extLst>
+          </p:cNvPr>
+          <p:cNvSpPr/>
+          <p:nvPr/>
+        </p:nvSpPr>
+        <p:spPr>
+          <a:xfrm>
+            <a:off x="1882140" y="2298665"/>
+            <a:ext cx="2103120" cy="400110"/>
+          </a:xfrm>
+          <a:prstGeom prst="rect">
+            <a:avLst/>
+          </a:prstGeom>
+        </p:spPr>
+        <p:txBody>
+          <a:bodyPr wrap="square">
+            <a:spAutoFit/>
+          </a:bodyPr>
+          <a:lstStyle/>
+          <a:p>
+            <a:pPr algn="ctr"/>
+            <a:r>
+              <a:rPr lang="en-US" sz="2000" b="1" dirty="0" err="1">
+                <a:solidFill>
+                  <a:schemeClr val="accent1">
+                    <a:lumMod val="50000"/>
+                  </a:schemeClr>
+                </a:solidFill>
+              </a:rPr>
+              <a:t>TextField</a:t>
+            </a:r>
+            <a:endParaRPr lang="ru-RU" dirty="0">
+              <a:solidFill>
+                <a:schemeClr val="accent1">
+                  <a:lumMod val="50000"/>
+                </a:schemeClr>
+              </a:solidFill>
+            </a:endParaRPr>
+          </a:p>
+        </p:txBody>
+      </p:sp>
+      <p:sp>
+        <p:nvSpPr>
+          <p:cNvPr id="11" name="Прямоугольник 10">
+            <a:extLst>
+              <a:ext uri="{FF2B5EF4-FFF2-40B4-BE49-F238E27FC236}">
+                <a16:creationId xmlns:a16="http://schemas.microsoft.com/office/drawing/2014/main" id="{B9FE4DE7-CBF9-436F-9BCD-E998D25D1435}"/>
+              </a:ext>
+            </a:extLst>
+          </p:cNvPr>
+          <p:cNvSpPr/>
+          <p:nvPr/>
+        </p:nvSpPr>
+        <p:spPr>
+          <a:xfrm>
+            <a:off x="1836420" y="4226525"/>
+            <a:ext cx="2103120" cy="400110"/>
+          </a:xfrm>
+          <a:prstGeom prst="rect">
+            <a:avLst/>
+          </a:prstGeom>
+        </p:spPr>
+        <p:txBody>
+          <a:bodyPr wrap="square">
+            <a:spAutoFit/>
+          </a:bodyPr>
+          <a:lstStyle/>
+          <a:p>
+            <a:pPr algn="ctr"/>
+            <a:r>
+              <a:rPr lang="en-US" sz="2000" b="1" dirty="0" err="1">
+                <a:solidFill>
+                  <a:schemeClr val="accent1">
+                    <a:lumMod val="50000"/>
+                  </a:schemeClr>
+                </a:solidFill>
+              </a:rPr>
+              <a:t>DateField</a:t>
+            </a:r>
+            <a:endParaRPr lang="ru-RU" dirty="0">
+              <a:solidFill>
+                <a:schemeClr val="accent1">
+                  <a:lumMod val="50000"/>
+                </a:schemeClr>
+              </a:solidFill>
+            </a:endParaRPr>
+          </a:p>
+        </p:txBody>
+      </p:sp>
+      <p:pic>
+        <p:nvPicPr>
+          <p:cNvPr id="12" name="Рисунок 11">
+            <a:extLst>
+              <a:ext uri="{FF2B5EF4-FFF2-40B4-BE49-F238E27FC236}">
+                <a16:creationId xmlns:a16="http://schemas.microsoft.com/office/drawing/2014/main" id="{C387BAEE-2DD2-4C5B-AC67-170CBB09FE35}"/>
+              </a:ext>
+            </a:extLst>
+          </p:cNvPr>
+          <p:cNvPicPr>
+            <a:picLocks noChangeAspect="1"/>
+          </p:cNvPicPr>
+          <p:nvPr/>
+        </p:nvPicPr>
+        <p:blipFill>
+          <a:blip r:embed="rId4"/>
+          <a:stretch>
+            <a:fillRect/>
+          </a:stretch>
+        </p:blipFill>
+        <p:spPr>
+          <a:xfrm>
+            <a:off x="838200" y="4940770"/>
+            <a:ext cx="4099560" cy="846739"/>
+          </a:xfrm>
+          <a:prstGeom prst="rect">
+            <a:avLst/>
+          </a:prstGeom>
+        </p:spPr>
+      </p:pic>
+      <p:sp>
+        <p:nvSpPr>
+          <p:cNvPr id="15" name="Прямоугольник 14">
+            <a:extLst>
+              <a:ext uri="{FF2B5EF4-FFF2-40B4-BE49-F238E27FC236}">
+                <a16:creationId xmlns:a16="http://schemas.microsoft.com/office/drawing/2014/main" id="{0D243D85-959E-49F1-8EDB-92F8B3F6612A}"/>
+              </a:ext>
+            </a:extLst>
+          </p:cNvPr>
+          <p:cNvSpPr/>
+          <p:nvPr/>
+        </p:nvSpPr>
+        <p:spPr>
+          <a:xfrm>
+            <a:off x="1882140" y="5901589"/>
+            <a:ext cx="2103120" cy="400110"/>
+          </a:xfrm>
+          <a:prstGeom prst="rect">
+            <a:avLst/>
+          </a:prstGeom>
+        </p:spPr>
+        <p:txBody>
+          <a:bodyPr wrap="square">
+            <a:spAutoFit/>
+          </a:bodyPr>
+          <a:lstStyle/>
+          <a:p>
+            <a:pPr algn="ctr"/>
+            <a:r>
+              <a:rPr lang="en-US" sz="2000" b="1" dirty="0" err="1">
+                <a:solidFill>
+                  <a:schemeClr val="accent1">
+                    <a:lumMod val="50000"/>
+                  </a:schemeClr>
+                </a:solidFill>
+              </a:rPr>
+              <a:t>MoneyField</a:t>
+            </a:r>
+            <a:endParaRPr lang="ru-RU" dirty="0">
+              <a:solidFill>
+                <a:schemeClr val="accent1">
+                  <a:lumMod val="50000"/>
+                </a:schemeClr>
+              </a:solidFill>
+            </a:endParaRPr>
+          </a:p>
+        </p:txBody>
+      </p:sp>
+      <p:pic>
+        <p:nvPicPr>
+          <p:cNvPr id="14" name="Рисунок 13">
+            <a:extLst>
+              <a:ext uri="{FF2B5EF4-FFF2-40B4-BE49-F238E27FC236}">
+                <a16:creationId xmlns:a16="http://schemas.microsoft.com/office/drawing/2014/main" id="{C79AC156-B441-4305-8467-F34D9D8CCFA9}"/>
+              </a:ext>
+            </a:extLst>
+          </p:cNvPr>
+          <p:cNvPicPr>
+            <a:picLocks noChangeAspect="1"/>
+          </p:cNvPicPr>
+          <p:nvPr/>
+        </p:nvPicPr>
+        <p:blipFill>
+          <a:blip r:embed="rId5"/>
+          <a:stretch>
+            <a:fillRect/>
+          </a:stretch>
+        </p:blipFill>
+        <p:spPr>
+          <a:xfrm>
+            <a:off x="6096000" y="1436148"/>
+            <a:ext cx="5534380" cy="4351355"/>
+          </a:xfrm>
+          <a:prstGeom prst="rect">
+            <a:avLst/>
+          </a:prstGeom>
+        </p:spPr>
+      </p:pic>
+    </p:spTree>
+    <p:extLst>
+      <p:ext uri="{BB962C8B-B14F-4D97-AF65-F5344CB8AC3E}">
+        <p14:creationId xmlns:p14="http://schemas.microsoft.com/office/powerpoint/2010/main" val="3035227290"/>
+      </p:ext>
+    </p:extLst>
+  </p:cSld>
+  <p:clrMapOvr>
+    <a:masterClrMapping/>
+  </p:clrMapOvr>
+</p:sld>
+</file>
+
+<file path=ppt/slides/slide15.xml><?xml version="1.0" encoding="utf-8"?>
+<p:sld xmlns:a="http://schemas.openxmlformats.org/drawingml/2006/main" xmlns:r="http://schemas.openxmlformats.org/officeDocument/2006/relationships" xmlns:p="http://schemas.openxmlformats.org/presentationml/2006/main">
+  <p:cSld>
+    <p:spTree>
+      <p:nvGrpSpPr>
+        <p:cNvPr id="1" name=""/>
+        <p:cNvGrpSpPr/>
+        <p:nvPr/>
+      </p:nvGrpSpPr>
+      <p:grpSpPr>
+        <a:xfrm>
+          <a:off x="0" y="0"/>
+          <a:ext cx="0" cy="0"/>
+          <a:chOff x="0" y="0"/>
+          <a:chExt cx="0" cy="0"/>
+        </a:xfrm>
+      </p:grpSpPr>
+      <p:sp>
+        <p:nvSpPr>
+          <p:cNvPr id="2" name="Заголовок 1">
+            <a:extLst>
+              <a:ext uri="{FF2B5EF4-FFF2-40B4-BE49-F238E27FC236}">
+                <a16:creationId xmlns:a16="http://schemas.microsoft.com/office/drawing/2014/main" id="{ADA68195-9541-49B5-B54A-BE9A47B694A8}"/>
+              </a:ext>
+            </a:extLst>
+          </p:cNvPr>
+          <p:cNvSpPr>
+            <a:spLocks noGrp="1"/>
+          </p:cNvSpPr>
+          <p:nvPr>
+            <p:ph type="title"/>
+          </p:nvPr>
+        </p:nvSpPr>
+        <p:spPr>
+          <a:xfrm>
+            <a:off x="838200" y="-1"/>
+            <a:ext cx="10515600" cy="1169437"/>
+          </a:xfrm>
+        </p:spPr>
+        <p:txBody>
+          <a:bodyPr/>
+          <a:lstStyle/>
+          <a:p>
+            <a:pPr algn="ctr"/>
+            <a:r>
+              <a:rPr lang="ru-RU" sz="4000" b="1" dirty="0">
+                <a:solidFill>
+                  <a:schemeClr val="accent1">
+                    <a:lumMod val="75000"/>
+                  </a:schemeClr>
+                </a:solidFill>
+              </a:rPr>
+              <a:t>ФОРМЫ</a:t>
+            </a:r>
+            <a:endParaRPr lang="ru-RU" b="1" dirty="0">
+              <a:solidFill>
+                <a:schemeClr val="accent1">
+                  <a:lumMod val="75000"/>
+                </a:schemeClr>
+              </a:solidFill>
+            </a:endParaRPr>
+          </a:p>
+        </p:txBody>
+      </p:sp>
+      <p:cxnSp>
+        <p:nvCxnSpPr>
+          <p:cNvPr id="7" name="Прямая соединительная линия 6">
+            <a:extLst>
+              <a:ext uri="{FF2B5EF4-FFF2-40B4-BE49-F238E27FC236}">
+                <a16:creationId xmlns:a16="http://schemas.microsoft.com/office/drawing/2014/main" id="{BEA8F852-A838-45C3-BAE1-6E4ED9623B53}"/>
+              </a:ext>
+            </a:extLst>
+          </p:cNvPr>
+          <p:cNvCxnSpPr>
+            <a:cxnSpLocks/>
+          </p:cNvCxnSpPr>
+          <p:nvPr/>
+        </p:nvCxnSpPr>
+        <p:spPr>
+          <a:xfrm>
+            <a:off x="0" y="1169438"/>
+            <a:ext cx="12192000" cy="0"/>
+          </a:xfrm>
+          <a:prstGeom prst="line">
+            <a:avLst/>
+          </a:prstGeom>
+          <a:ln/>
+        </p:spPr>
+        <p:style>
+          <a:lnRef idx="3">
+            <a:schemeClr val="accent1"/>
+          </a:lnRef>
+          <a:fillRef idx="0">
+            <a:schemeClr val="accent1"/>
+          </a:fillRef>
+          <a:effectRef idx="2">
+            <a:schemeClr val="accent1"/>
+          </a:effectRef>
+          <a:fontRef idx="minor">
+            <a:schemeClr val="tx1"/>
+          </a:fontRef>
+        </p:style>
+      </p:cxnSp>
+      <p:sp>
+        <p:nvSpPr>
+          <p:cNvPr id="6" name="Прямоугольник 5">
+            <a:extLst>
+              <a:ext uri="{FF2B5EF4-FFF2-40B4-BE49-F238E27FC236}">
+                <a16:creationId xmlns:a16="http://schemas.microsoft.com/office/drawing/2014/main" id="{18909AB4-1897-4155-93CB-3E6C1D7435ED}"/>
+              </a:ext>
+            </a:extLst>
+          </p:cNvPr>
+          <p:cNvSpPr/>
+          <p:nvPr/>
+        </p:nvSpPr>
+        <p:spPr>
+          <a:xfrm>
+            <a:off x="2981325" y="6240702"/>
+            <a:ext cx="6229350" cy="892552"/>
+          </a:xfrm>
+          <a:prstGeom prst="rect">
+            <a:avLst/>
+          </a:prstGeom>
+        </p:spPr>
+        <p:txBody>
+          <a:bodyPr wrap="square">
+            <a:spAutoFit/>
+          </a:bodyPr>
+          <a:lstStyle/>
+          <a:p>
+            <a:pPr algn="ctr"/>
+            <a:r>
+              <a:rPr lang="ru-RU" sz="2800" b="1" dirty="0">
+                <a:solidFill>
+                  <a:schemeClr val="accent1">
+                    <a:lumMod val="50000"/>
+                  </a:schemeClr>
+                </a:solidFill>
+              </a:rPr>
+              <a:t>Форма создания в модуле </a:t>
+            </a:r>
+            <a:r>
+              <a:rPr lang="en-US" sz="2800" b="1" dirty="0">
+                <a:solidFill>
+                  <a:schemeClr val="accent1">
+                    <a:lumMod val="50000"/>
+                  </a:schemeClr>
+                </a:solidFill>
+              </a:rPr>
+              <a:t>Clients </a:t>
+            </a:r>
+            <a:endParaRPr lang="ru-RU" sz="2400" b="1" dirty="0">
+              <a:solidFill>
+                <a:schemeClr val="accent1">
+                  <a:lumMod val="50000"/>
+                </a:schemeClr>
+              </a:solidFill>
+            </a:endParaRPr>
+          </a:p>
+          <a:p>
+            <a:pPr algn="ctr"/>
+            <a:endParaRPr lang="ru-RU" sz="2400" dirty="0">
+              <a:solidFill>
+                <a:schemeClr val="accent1">
+                  <a:lumMod val="50000"/>
+                </a:schemeClr>
+              </a:solidFill>
+            </a:endParaRPr>
+          </a:p>
+        </p:txBody>
+      </p:sp>
+      <p:pic>
+        <p:nvPicPr>
+          <p:cNvPr id="8" name="Picture">
+            <a:extLst>
+              <a:ext uri="{FF2B5EF4-FFF2-40B4-BE49-F238E27FC236}">
+                <a16:creationId xmlns:a16="http://schemas.microsoft.com/office/drawing/2014/main" id="{18B546F2-CE14-4667-9D2B-027E1DAD07F7}"/>
+              </a:ext>
+            </a:extLst>
+          </p:cNvPr>
+          <p:cNvPicPr/>
+          <p:nvPr/>
+        </p:nvPicPr>
+        <p:blipFill>
+          <a:blip r:embed="rId2"/>
+          <a:stretch>
+            <a:fillRect/>
+          </a:stretch>
+        </p:blipFill>
+        <p:spPr bwMode="auto">
+          <a:xfrm>
+            <a:off x="2278221" y="1390648"/>
+            <a:ext cx="7635558" cy="4850093"/>
+          </a:xfrm>
+          <a:prstGeom prst="rect">
+            <a:avLst/>
+          </a:prstGeom>
+          <a:noFill/>
+          <a:ln w="9525">
+            <a:noFill/>
+            <a:miter lim="800000"/>
+            <a:headEnd/>
+            <a:tailEnd/>
+          </a:ln>
+        </p:spPr>
+      </p:pic>
+    </p:spTree>
+    <p:extLst>
+      <p:ext uri="{BB962C8B-B14F-4D97-AF65-F5344CB8AC3E}">
+        <p14:creationId xmlns:p14="http://schemas.microsoft.com/office/powerpoint/2010/main" val="2035929151"/>
+      </p:ext>
+    </p:extLst>
+  </p:cSld>
+  <p:clrMapOvr>
+    <a:masterClrMapping/>
+  </p:clrMapOvr>
+</p:sld>
+</file>
+
+<file path=ppt/slides/slide16.xml><?xml version="1.0" encoding="utf-8"?>
+<p:sld xmlns:a="http://schemas.openxmlformats.org/drawingml/2006/main" xmlns:r="http://schemas.openxmlformats.org/officeDocument/2006/relationships" xmlns:p="http://schemas.openxmlformats.org/presentationml/2006/main">
+  <p:cSld>
+    <p:spTree>
+      <p:nvGrpSpPr>
+        <p:cNvPr id="1" name=""/>
+        <p:cNvGrpSpPr/>
+        <p:nvPr/>
+      </p:nvGrpSpPr>
+      <p:grpSpPr>
+        <a:xfrm>
+          <a:off x="0" y="0"/>
+          <a:ext cx="0" cy="0"/>
+          <a:chOff x="0" y="0"/>
+          <a:chExt cx="0" cy="0"/>
+        </a:xfrm>
+      </p:grpSpPr>
+      <p:sp>
+        <p:nvSpPr>
+          <p:cNvPr id="2" name="Заголовок 1">
+            <a:extLst>
+              <a:ext uri="{FF2B5EF4-FFF2-40B4-BE49-F238E27FC236}">
+                <a16:creationId xmlns:a16="http://schemas.microsoft.com/office/drawing/2014/main" id="{ADA68195-9541-49B5-B54A-BE9A47B694A8}"/>
+              </a:ext>
+            </a:extLst>
+          </p:cNvPr>
+          <p:cNvSpPr>
+            <a:spLocks noGrp="1"/>
+          </p:cNvSpPr>
+          <p:nvPr>
+            <p:ph type="title"/>
+          </p:nvPr>
+        </p:nvSpPr>
+        <p:spPr>
+          <a:xfrm>
+            <a:off x="838200" y="-1"/>
+            <a:ext cx="10515600" cy="1169437"/>
+          </a:xfrm>
+        </p:spPr>
+        <p:txBody>
+          <a:bodyPr/>
+          <a:lstStyle/>
+          <a:p>
+            <a:pPr algn="ctr"/>
+            <a:r>
+              <a:rPr lang="ru-RU" sz="4000" b="1" dirty="0">
+                <a:solidFill>
+                  <a:schemeClr val="accent1">
+                    <a:lumMod val="75000"/>
+                  </a:schemeClr>
+                </a:solidFill>
+              </a:rPr>
+              <a:t>ФИНАЛЬНЫЙ ИНТЕРФЕЙС</a:t>
+            </a:r>
+            <a:endParaRPr lang="ru-RU" b="1" dirty="0">
+              <a:solidFill>
+                <a:schemeClr val="accent1">
+                  <a:lumMod val="75000"/>
+                </a:schemeClr>
+              </a:solidFill>
+            </a:endParaRPr>
+          </a:p>
+        </p:txBody>
+      </p:sp>
+      <p:cxnSp>
+        <p:nvCxnSpPr>
+          <p:cNvPr id="7" name="Прямая соединительная линия 6">
+            <a:extLst>
+              <a:ext uri="{FF2B5EF4-FFF2-40B4-BE49-F238E27FC236}">
+                <a16:creationId xmlns:a16="http://schemas.microsoft.com/office/drawing/2014/main" id="{BEA8F852-A838-45C3-BAE1-6E4ED9623B53}"/>
+              </a:ext>
+            </a:extLst>
+          </p:cNvPr>
+          <p:cNvCxnSpPr>
+            <a:cxnSpLocks/>
+          </p:cNvCxnSpPr>
+          <p:nvPr/>
+        </p:nvCxnSpPr>
+        <p:spPr>
+          <a:xfrm>
+            <a:off x="0" y="1169438"/>
+            <a:ext cx="12192000" cy="0"/>
+          </a:xfrm>
+          <a:prstGeom prst="line">
+            <a:avLst/>
+          </a:prstGeom>
+          <a:ln/>
+        </p:spPr>
+        <p:style>
+          <a:lnRef idx="3">
+            <a:schemeClr val="accent1"/>
+          </a:lnRef>
+          <a:fillRef idx="0">
+            <a:schemeClr val="accent1"/>
+          </a:fillRef>
+          <a:effectRef idx="2">
+            <a:schemeClr val="accent1"/>
+          </a:effectRef>
+          <a:fontRef idx="minor">
+            <a:schemeClr val="tx1"/>
+          </a:fontRef>
+        </p:style>
+      </p:cxnSp>
+      <p:pic>
+        <p:nvPicPr>
+          <p:cNvPr id="9" name="Picture 8">
+            <a:extLst>
+              <a:ext uri="{FF2B5EF4-FFF2-40B4-BE49-F238E27FC236}">
+                <a16:creationId xmlns:a16="http://schemas.microsoft.com/office/drawing/2014/main" id="{85C2BFE4-ABCC-CAE2-53B6-353CA1E998BC}"/>
+              </a:ext>
+            </a:extLst>
+          </p:cNvPr>
+          <p:cNvPicPr>
+            <a:picLocks noChangeAspect="1"/>
+          </p:cNvPicPr>
+          <p:nvPr/>
+        </p:nvPicPr>
+        <p:blipFill>
+          <a:blip r:embed="rId2">
+            <a:extLst>
+              <a:ext uri="{28A0092B-C50C-407E-A947-70E740481C1C}">
+                <a14:useLocalDpi xmlns:a14="http://schemas.microsoft.com/office/drawing/2010/main" val="0"/>
+              </a:ext>
+            </a:extLst>
+          </a:blip>
+          <a:stretch>
+            <a:fillRect/>
+          </a:stretch>
+        </p:blipFill>
+        <p:spPr>
+          <a:xfrm>
+            <a:off x="945636" y="1303868"/>
+            <a:ext cx="10300727" cy="5469465"/>
+          </a:xfrm>
+          <a:prstGeom prst="rect">
+            <a:avLst/>
+          </a:prstGeom>
+        </p:spPr>
+      </p:pic>
+    </p:spTree>
+    <p:extLst>
+      <p:ext uri="{BB962C8B-B14F-4D97-AF65-F5344CB8AC3E}">
+        <p14:creationId xmlns:p14="http://schemas.microsoft.com/office/powerpoint/2010/main" val="3206839243"/>
+      </p:ext>
+    </p:extLst>
+  </p:cSld>
+  <p:clrMapOvr>
+    <a:masterClrMapping/>
+  </p:clrMapOvr>
+</p:sld>
+</file>
+
+<file path=ppt/slides/slide17.xml><?xml version="1.0" encoding="utf-8"?>
+<p:sld xmlns:a="http://schemas.openxmlformats.org/drawingml/2006/main" xmlns:r="http://schemas.openxmlformats.org/officeDocument/2006/relationships" xmlns:p="http://schemas.openxmlformats.org/presentationml/2006/main">
+  <p:cSld>
+    <p:spTree>
+      <p:nvGrpSpPr>
+        <p:cNvPr id="1" name=""/>
+        <p:cNvGrpSpPr/>
+        <p:nvPr/>
+      </p:nvGrpSpPr>
+      <p:grpSpPr>
+        <a:xfrm>
+          <a:off x="0" y="0"/>
+          <a:ext cx="0" cy="0"/>
+          <a:chOff x="0" y="0"/>
+          <a:chExt cx="0" cy="0"/>
+        </a:xfrm>
+      </p:grpSpPr>
+      <p:sp>
+        <p:nvSpPr>
+          <p:cNvPr id="2" name="Заголовок 1">
+            <a:extLst>
+              <a:ext uri="{FF2B5EF4-FFF2-40B4-BE49-F238E27FC236}">
+                <a16:creationId xmlns:a16="http://schemas.microsoft.com/office/drawing/2014/main" id="{ADA68195-9541-49B5-B54A-BE9A47B694A8}"/>
+              </a:ext>
+            </a:extLst>
+          </p:cNvPr>
+          <p:cNvSpPr>
+            <a:spLocks noGrp="1"/>
+          </p:cNvSpPr>
+          <p:nvPr>
+            <p:ph type="title"/>
+          </p:nvPr>
+        </p:nvSpPr>
+        <p:spPr>
+          <a:xfrm>
+            <a:off x="838200" y="-1"/>
+            <a:ext cx="10515600" cy="1169437"/>
+          </a:xfrm>
+        </p:spPr>
+        <p:txBody>
+          <a:bodyPr>
+            <a:normAutofit/>
+          </a:bodyPr>
+          <a:lstStyle/>
+          <a:p>
+            <a:pPr algn="ctr"/>
+            <a:r>
+              <a:rPr lang="ru-RU" b="1" dirty="0">
+                <a:solidFill>
+                  <a:schemeClr val="accent1">
+                    <a:lumMod val="75000"/>
+                  </a:schemeClr>
+                </a:solidFill>
+              </a:rPr>
+              <a:t>ЗАКЛЮЧЕНИЕ</a:t>
+            </a:r>
+          </a:p>
+        </p:txBody>
+      </p:sp>
+      <p:cxnSp>
+        <p:nvCxnSpPr>
+          <p:cNvPr id="7" name="Прямая соединительная линия 6">
+            <a:extLst>
+              <a:ext uri="{FF2B5EF4-FFF2-40B4-BE49-F238E27FC236}">
+                <a16:creationId xmlns:a16="http://schemas.microsoft.com/office/drawing/2014/main" id="{BEA8F852-A838-45C3-BAE1-6E4ED9623B53}"/>
+              </a:ext>
+            </a:extLst>
+          </p:cNvPr>
+          <p:cNvCxnSpPr>
+            <a:cxnSpLocks/>
+          </p:cNvCxnSpPr>
+          <p:nvPr/>
+        </p:nvCxnSpPr>
+        <p:spPr>
+          <a:xfrm>
+            <a:off x="0" y="1169438"/>
+            <a:ext cx="12192000" cy="0"/>
+          </a:xfrm>
+          <a:prstGeom prst="line">
+            <a:avLst/>
+          </a:prstGeom>
+          <a:ln/>
+        </p:spPr>
+        <p:style>
+          <a:lnRef idx="3">
+            <a:schemeClr val="accent1"/>
+          </a:lnRef>
+          <a:fillRef idx="0">
+            <a:schemeClr val="accent1"/>
+          </a:fillRef>
+          <a:effectRef idx="2">
+            <a:schemeClr val="accent1"/>
+          </a:effectRef>
+          <a:fontRef idx="minor">
+            <a:schemeClr val="tx1"/>
+          </a:fontRef>
+        </p:style>
+      </p:cxnSp>
+      <p:sp>
+        <p:nvSpPr>
           <p:cNvPr id="12" name="Объект 2">
             <a:extLst>
               <a:ext uri="{FF2B5EF4-FFF2-40B4-BE49-F238E27FC236}">
@@ -4749,6 +5842,80 @@
     <p:extLst>
       <p:ext uri="{BB962C8B-B14F-4D97-AF65-F5344CB8AC3E}">
         <p14:creationId xmlns:p14="http://schemas.microsoft.com/office/powerpoint/2010/main" val="1290359588"/>
+      </p:ext>
+    </p:extLst>
+  </p:cSld>
+  <p:clrMapOvr>
+    <a:masterClrMapping/>
+  </p:clrMapOvr>
+</p:sld>
+</file>
+
+<file path=ppt/slides/slide18.xml><?xml version="1.0" encoding="utf-8"?>
+<p:sld xmlns:a="http://schemas.openxmlformats.org/drawingml/2006/main" xmlns:r="http://schemas.openxmlformats.org/officeDocument/2006/relationships" xmlns:p="http://schemas.openxmlformats.org/presentationml/2006/main">
+  <p:cSld>
+    <p:spTree>
+      <p:nvGrpSpPr>
+        <p:cNvPr id="1" name=""/>
+        <p:cNvGrpSpPr/>
+        <p:nvPr/>
+      </p:nvGrpSpPr>
+      <p:grpSpPr>
+        <a:xfrm>
+          <a:off x="0" y="0"/>
+          <a:ext cx="0" cy="0"/>
+          <a:chOff x="0" y="0"/>
+          <a:chExt cx="0" cy="0"/>
+        </a:xfrm>
+      </p:grpSpPr>
+      <p:sp>
+        <p:nvSpPr>
+          <p:cNvPr id="12" name="Объект 2">
+            <a:extLst>
+              <a:ext uri="{FF2B5EF4-FFF2-40B4-BE49-F238E27FC236}">
+                <a16:creationId xmlns:a16="http://schemas.microsoft.com/office/drawing/2014/main" id="{D60CF1DD-BBC5-4BE4-82BB-B94C0E32CBAA}"/>
+              </a:ext>
+            </a:extLst>
+          </p:cNvPr>
+          <p:cNvSpPr>
+            <a:spLocks noGrp="1"/>
+          </p:cNvSpPr>
+          <p:nvPr>
+            <p:ph idx="1"/>
+          </p:nvPr>
+        </p:nvSpPr>
+        <p:spPr>
+          <a:xfrm>
+            <a:off x="1078549" y="2648118"/>
+            <a:ext cx="10034902" cy="1561764"/>
+          </a:xfrm>
+        </p:spPr>
+        <p:txBody>
+          <a:bodyPr>
+            <a:normAutofit/>
+          </a:bodyPr>
+          <a:lstStyle/>
+          <a:p>
+            <a:pPr marL="0" indent="0">
+              <a:buNone/>
+            </a:pPr>
+            <a:r>
+              <a:rPr lang="ru-RU" sz="7200" b="1" dirty="0">
+                <a:solidFill>
+                  <a:schemeClr val="accent1">
+                    <a:lumMod val="50000"/>
+                  </a:schemeClr>
+                </a:solidFill>
+              </a:rPr>
+              <a:t>СПАСИБО ЗА ВНИМАНИЕ</a:t>
+            </a:r>
+          </a:p>
+        </p:txBody>
+      </p:sp>
+    </p:spTree>
+    <p:extLst>
+      <p:ext uri="{BB962C8B-B14F-4D97-AF65-F5344CB8AC3E}">
+        <p14:creationId xmlns:p14="http://schemas.microsoft.com/office/powerpoint/2010/main" val="2897079599"/>
       </p:ext>
     </p:extLst>
   </p:cSld>
@@ -6344,8 +7511,8 @@
         </p:nvSpPr>
         <p:spPr>
           <a:xfrm>
-            <a:off x="557791" y="1622076"/>
-            <a:ext cx="5799465" cy="2062103"/>
+            <a:off x="541866" y="1859143"/>
+            <a:ext cx="5799465" cy="3539430"/>
           </a:xfrm>
           <a:prstGeom prst="rect">
             <a:avLst/>
@@ -6381,6 +7548,13 @@
               </a:rPr>
               <a:t> архитектура</a:t>
             </a:r>
+            <a:endParaRPr lang="en-US" sz="3200" b="1" dirty="0">
+              <a:solidFill>
+                <a:schemeClr val="accent1">
+                  <a:lumMod val="50000"/>
+                </a:schemeClr>
+              </a:solidFill>
+            </a:endParaRPr>
           </a:p>
           <a:p>
             <a:pPr marL="285750" indent="-285750">
@@ -6388,14 +7562,14 @@
               <a:buChar char="•"/>
             </a:pPr>
             <a:r>
-              <a:rPr lang="en-US" sz="3200" b="1" dirty="0">
+              <a:rPr lang="ru-RU" sz="3200" b="1" dirty="0">
                 <a:solidFill>
                   <a:schemeClr val="accent1">
                     <a:lumMod val="50000"/>
                   </a:schemeClr>
                 </a:solidFill>
               </a:rPr>
-              <a:t>RESTful API</a:t>
+              <a:t>Реляционная БД</a:t>
             </a:r>
           </a:p>
           <a:p>
@@ -6411,7 +7585,7 @@
                   </a:schemeClr>
                 </a:solidFill>
               </a:rPr>
-              <a:t>MVC</a:t>
+              <a:t>RESTful API</a:t>
             </a:r>
           </a:p>
           <a:p>
@@ -6427,8 +7601,56 @@
                   </a:schemeClr>
                 </a:solidFill>
               </a:rPr>
+              <a:t>MVC</a:t>
+            </a:r>
+          </a:p>
+          <a:p>
+            <a:pPr marL="285750" indent="-285750">
+              <a:buFont typeface="Arial" panose="020B0604020202020204" pitchFamily="34" charset="0"/>
+              <a:buChar char="•"/>
+            </a:pPr>
+            <a:r>
+              <a:rPr lang="en-US" sz="3200" b="1" dirty="0">
+                <a:solidFill>
+                  <a:schemeClr val="accent1">
+                    <a:lumMod val="50000"/>
+                  </a:schemeClr>
+                </a:solidFill>
+              </a:rPr>
+              <a:t>Repository Pattern</a:t>
+            </a:r>
+          </a:p>
+          <a:p>
+            <a:pPr marL="285750" indent="-285750">
+              <a:buFont typeface="Arial" panose="020B0604020202020204" pitchFamily="34" charset="0"/>
+              <a:buChar char="•"/>
+            </a:pPr>
+            <a:r>
+              <a:rPr lang="en-US" sz="3200" b="1" dirty="0">
+                <a:solidFill>
+                  <a:schemeClr val="accent1">
+                    <a:lumMod val="50000"/>
+                  </a:schemeClr>
+                </a:solidFill>
+              </a:rPr>
               <a:t>SPA</a:t>
             </a:r>
+            <a:endParaRPr lang="ru-RU" sz="3200" b="1" dirty="0">
+              <a:solidFill>
+                <a:schemeClr val="accent1">
+                  <a:lumMod val="50000"/>
+                </a:schemeClr>
+              </a:solidFill>
+            </a:endParaRPr>
+          </a:p>
+          <a:p>
+            <a:endParaRPr lang="en-US" sz="3200" b="1" dirty="0">
+              <a:solidFill>
+                <a:schemeClr val="accent1">
+                  <a:lumMod val="50000"/>
+                </a:schemeClr>
+              </a:solidFill>
+            </a:endParaRPr>
           </a:p>
         </p:txBody>
       </p:sp>
@@ -6460,7 +7682,7 @@
         </p:blipFill>
         <p:spPr>
           <a:xfrm>
-            <a:off x="3726321" y="2750928"/>
+            <a:off x="4105275" y="3136415"/>
             <a:ext cx="7248525" cy="2771775"/>
           </a:xfrm>
           <a:prstGeom prst="rect">
@@ -6901,10 +8123,10 @@
       </p:cxnSp>
       <p:pic>
         <p:nvPicPr>
-          <p:cNvPr id="10" name="Picture 2" descr="ÐÐ°ÑÑÐ¸Ð½ÐºÐ¸ Ð¿Ð¾ Ð·Ð°Ð¿ÑÐ¾ÑÑ maven">
-            <a:extLst>
-              <a:ext uri="{FF2B5EF4-FFF2-40B4-BE49-F238E27FC236}">
-                <a16:creationId xmlns:a16="http://schemas.microsoft.com/office/drawing/2014/main" id="{48DB34C5-5AE8-438D-B958-6BBDBD5FE3DF}"/>
+          <p:cNvPr id="2050" name="Picture 2" descr="Java — Википедия">
+            <a:extLst>
+              <a:ext uri="{FF2B5EF4-FFF2-40B4-BE49-F238E27FC236}">
+                <a16:creationId xmlns:a16="http://schemas.microsoft.com/office/drawing/2014/main" id="{C7008FA8-E91F-4CEF-9208-6B2D3BAA8CC5}"/>
               </a:ext>
             </a:extLst>
           </p:cNvPr>
@@ -6928,8 +8150,8 @@
         </p:blipFill>
         <p:spPr bwMode="auto">
           <a:xfrm>
-            <a:off x="8218430" y="2172407"/>
-            <a:ext cx="3431130" cy="867879"/>
+            <a:off x="838200" y="1570734"/>
+            <a:ext cx="1129586" cy="2071227"/>
           </a:xfrm>
           <a:prstGeom prst="rect">
             <a:avLst/>
@@ -6948,10 +8170,10 @@
       </p:pic>
       <p:pic>
         <p:nvPicPr>
-          <p:cNvPr id="2050" name="Picture 2" descr="Java — Википедия">
-            <a:extLst>
-              <a:ext uri="{FF2B5EF4-FFF2-40B4-BE49-F238E27FC236}">
-                <a16:creationId xmlns:a16="http://schemas.microsoft.com/office/drawing/2014/main" id="{C7008FA8-E91F-4CEF-9208-6B2D3BAA8CC5}"/>
+          <p:cNvPr id="2052" name="Picture 4" descr="Spring | Home">
+            <a:extLst>
+              <a:ext uri="{FF2B5EF4-FFF2-40B4-BE49-F238E27FC236}">
+                <a16:creationId xmlns:a16="http://schemas.microsoft.com/office/drawing/2014/main" id="{B8DD0392-507F-4825-AA21-78A399268075}"/>
               </a:ext>
             </a:extLst>
           </p:cNvPr>
@@ -6975,8 +8197,8 @@
         </p:blipFill>
         <p:spPr bwMode="auto">
           <a:xfrm>
-            <a:off x="838200" y="1570734"/>
-            <a:ext cx="1129586" cy="2071227"/>
+            <a:off x="2791557" y="1291551"/>
+            <a:ext cx="5026088" cy="2513045"/>
           </a:xfrm>
           <a:prstGeom prst="rect">
             <a:avLst/>
@@ -6993,12 +8215,106 @@
           </a:extLst>
         </p:spPr>
       </p:pic>
+      <p:sp>
+        <p:nvSpPr>
+          <p:cNvPr id="6" name="Прямоугольник 5">
+            <a:extLst>
+              <a:ext uri="{FF2B5EF4-FFF2-40B4-BE49-F238E27FC236}">
+                <a16:creationId xmlns:a16="http://schemas.microsoft.com/office/drawing/2014/main" id="{18909AB4-1897-4155-93CB-3E6C1D7435ED}"/>
+              </a:ext>
+            </a:extLst>
+          </p:cNvPr>
+          <p:cNvSpPr/>
+          <p:nvPr/>
+        </p:nvSpPr>
+        <p:spPr>
+          <a:xfrm>
+            <a:off x="613775" y="1237860"/>
+            <a:ext cx="1107867" cy="369332"/>
+          </a:xfrm>
+          <a:prstGeom prst="rect">
+            <a:avLst/>
+          </a:prstGeom>
+        </p:spPr>
+        <p:txBody>
+          <a:bodyPr wrap="none">
+            <a:spAutoFit/>
+          </a:bodyPr>
+          <a:lstStyle/>
+          <a:p>
+            <a:r>
+              <a:rPr lang="en-US" b="1" dirty="0">
+                <a:solidFill>
+                  <a:schemeClr val="accent1">
+                    <a:lumMod val="50000"/>
+                  </a:schemeClr>
+                </a:solidFill>
+              </a:rPr>
+              <a:t>BACKEND</a:t>
+            </a:r>
+            <a:endParaRPr lang="ru-RU" dirty="0">
+              <a:solidFill>
+                <a:schemeClr val="accent1">
+                  <a:lumMod val="50000"/>
+                </a:schemeClr>
+              </a:solidFill>
+            </a:endParaRPr>
+          </a:p>
+        </p:txBody>
+      </p:sp>
+      <p:sp>
+        <p:nvSpPr>
+          <p:cNvPr id="8" name="Прямоугольник 7">
+            <a:extLst>
+              <a:ext uri="{FF2B5EF4-FFF2-40B4-BE49-F238E27FC236}">
+                <a16:creationId xmlns:a16="http://schemas.microsoft.com/office/drawing/2014/main" id="{6DE15F80-38DD-435B-9C8F-EC4DDA7F8E4D}"/>
+              </a:ext>
+            </a:extLst>
+          </p:cNvPr>
+          <p:cNvSpPr/>
+          <p:nvPr/>
+        </p:nvSpPr>
+        <p:spPr>
+          <a:xfrm>
+            <a:off x="613775" y="3858590"/>
+            <a:ext cx="1250022" cy="369332"/>
+          </a:xfrm>
+          <a:prstGeom prst="rect">
+            <a:avLst/>
+          </a:prstGeom>
+        </p:spPr>
+        <p:txBody>
+          <a:bodyPr wrap="none">
+            <a:spAutoFit/>
+          </a:bodyPr>
+          <a:lstStyle/>
+          <a:p>
+            <a:r>
+              <a:rPr lang="en-US" b="1" dirty="0">
+                <a:solidFill>
+                  <a:schemeClr val="accent1">
+                    <a:lumMod val="50000"/>
+                  </a:schemeClr>
+                </a:solidFill>
+              </a:rPr>
+              <a:t>FRONTEND</a:t>
+            </a:r>
+            <a:endParaRPr lang="ru-RU" dirty="0">
+              <a:solidFill>
+                <a:schemeClr val="accent1">
+                  <a:lumMod val="50000"/>
+                </a:schemeClr>
+              </a:solidFill>
+            </a:endParaRPr>
+          </a:p>
+        </p:txBody>
+      </p:sp>
       <p:pic>
         <p:nvPicPr>
-          <p:cNvPr id="2052" name="Picture 4" descr="Spring | Home">
-            <a:extLst>
-              <a:ext uri="{FF2B5EF4-FFF2-40B4-BE49-F238E27FC236}">
-                <a16:creationId xmlns:a16="http://schemas.microsoft.com/office/drawing/2014/main" id="{B8DD0392-507F-4825-AA21-78A399268075}"/>
+          <p:cNvPr id="2062" name="Picture 14">
+            <a:extLst>
+              <a:ext uri="{FF2B5EF4-FFF2-40B4-BE49-F238E27FC236}">
+                <a16:creationId xmlns:a16="http://schemas.microsoft.com/office/drawing/2014/main" id="{6D754A1A-6F99-4E52-BF19-30B0A0CC8EBF}"/>
               </a:ext>
             </a:extLst>
           </p:cNvPr>
@@ -7022,8 +8338,8 @@
         </p:blipFill>
         <p:spPr bwMode="auto">
           <a:xfrm>
-            <a:off x="2791557" y="1386065"/>
-            <a:ext cx="5026088" cy="2513045"/>
+            <a:off x="613775" y="4296346"/>
+            <a:ext cx="1862235" cy="1862235"/>
           </a:xfrm>
           <a:prstGeom prst="rect">
             <a:avLst/>
@@ -7040,106 +8356,12 @@
           </a:extLst>
         </p:spPr>
       </p:pic>
-      <p:sp>
-        <p:nvSpPr>
-          <p:cNvPr id="6" name="Прямоугольник 5">
-            <a:extLst>
-              <a:ext uri="{FF2B5EF4-FFF2-40B4-BE49-F238E27FC236}">
-                <a16:creationId xmlns:a16="http://schemas.microsoft.com/office/drawing/2014/main" id="{18909AB4-1897-4155-93CB-3E6C1D7435ED}"/>
-              </a:ext>
-            </a:extLst>
-          </p:cNvPr>
-          <p:cNvSpPr/>
-          <p:nvPr/>
-        </p:nvSpPr>
-        <p:spPr>
-          <a:xfrm>
-            <a:off x="613775" y="1237860"/>
-            <a:ext cx="1107867" cy="369332"/>
-          </a:xfrm>
-          <a:prstGeom prst="rect">
-            <a:avLst/>
-          </a:prstGeom>
-        </p:spPr>
-        <p:txBody>
-          <a:bodyPr wrap="none">
-            <a:spAutoFit/>
-          </a:bodyPr>
-          <a:lstStyle/>
-          <a:p>
-            <a:r>
-              <a:rPr lang="en-US" b="1" dirty="0">
-                <a:solidFill>
-                  <a:schemeClr val="accent1">
-                    <a:lumMod val="50000"/>
-                  </a:schemeClr>
-                </a:solidFill>
-              </a:rPr>
-              <a:t>BACKEND</a:t>
-            </a:r>
-            <a:endParaRPr lang="ru-RU" dirty="0">
-              <a:solidFill>
-                <a:schemeClr val="accent1">
-                  <a:lumMod val="50000"/>
-                </a:schemeClr>
-              </a:solidFill>
-            </a:endParaRPr>
-          </a:p>
-        </p:txBody>
-      </p:sp>
-      <p:sp>
-        <p:nvSpPr>
-          <p:cNvPr id="8" name="Прямоугольник 7">
-            <a:extLst>
-              <a:ext uri="{FF2B5EF4-FFF2-40B4-BE49-F238E27FC236}">
-                <a16:creationId xmlns:a16="http://schemas.microsoft.com/office/drawing/2014/main" id="{6DE15F80-38DD-435B-9C8F-EC4DDA7F8E4D}"/>
-              </a:ext>
-            </a:extLst>
-          </p:cNvPr>
-          <p:cNvSpPr/>
-          <p:nvPr/>
-        </p:nvSpPr>
-        <p:spPr>
-          <a:xfrm>
-            <a:off x="613775" y="3858590"/>
-            <a:ext cx="1250022" cy="369332"/>
-          </a:xfrm>
-          <a:prstGeom prst="rect">
-            <a:avLst/>
-          </a:prstGeom>
-        </p:spPr>
-        <p:txBody>
-          <a:bodyPr wrap="none">
-            <a:spAutoFit/>
-          </a:bodyPr>
-          <a:lstStyle/>
-          <a:p>
-            <a:r>
-              <a:rPr lang="en-US" b="1" dirty="0">
-                <a:solidFill>
-                  <a:schemeClr val="accent1">
-                    <a:lumMod val="50000"/>
-                  </a:schemeClr>
-                </a:solidFill>
-              </a:rPr>
-              <a:t>FRONTEND</a:t>
-            </a:r>
-            <a:endParaRPr lang="ru-RU" dirty="0">
-              <a:solidFill>
-                <a:schemeClr val="accent1">
-                  <a:lumMod val="50000"/>
-                </a:schemeClr>
-              </a:solidFill>
-            </a:endParaRPr>
-          </a:p>
-        </p:txBody>
-      </p:sp>
       <p:pic>
         <p:nvPicPr>
-          <p:cNvPr id="2062" name="Picture 14">
-            <a:extLst>
-              <a:ext uri="{FF2B5EF4-FFF2-40B4-BE49-F238E27FC236}">
-                <a16:creationId xmlns:a16="http://schemas.microsoft.com/office/drawing/2014/main" id="{6D754A1A-6F99-4E52-BF19-30B0A0CC8EBF}"/>
+          <p:cNvPr id="2064" name="Picture 16" descr="Next.js — Википедия">
+            <a:extLst>
+              <a:ext uri="{FF2B5EF4-FFF2-40B4-BE49-F238E27FC236}">
+                <a16:creationId xmlns:a16="http://schemas.microsoft.com/office/drawing/2014/main" id="{838088E9-3DDA-4C69-BE8F-E6EEE75E6FFA}"/>
               </a:ext>
             </a:extLst>
           </p:cNvPr>
@@ -7163,8 +8385,8 @@
         </p:blipFill>
         <p:spPr bwMode="auto">
           <a:xfrm>
-            <a:off x="613775" y="4296346"/>
-            <a:ext cx="1862235" cy="1862235"/>
+            <a:off x="3831800" y="4345009"/>
+            <a:ext cx="2945603" cy="1764907"/>
           </a:xfrm>
           <a:prstGeom prst="rect">
             <a:avLst/>
@@ -7183,10 +8405,10 @@
       </p:pic>
       <p:pic>
         <p:nvPicPr>
-          <p:cNvPr id="2064" name="Picture 16" descr="Next.js — Википедия">
-            <a:extLst>
-              <a:ext uri="{FF2B5EF4-FFF2-40B4-BE49-F238E27FC236}">
-                <a16:creationId xmlns:a16="http://schemas.microsoft.com/office/drawing/2014/main" id="{838088E9-3DDA-4C69-BE8F-E6EEE75E6FFA}"/>
+          <p:cNvPr id="2066" name="Picture 18" descr="Home | Yarn - Package Manager">
+            <a:extLst>
+              <a:ext uri="{FF2B5EF4-FFF2-40B4-BE49-F238E27FC236}">
+                <a16:creationId xmlns:a16="http://schemas.microsoft.com/office/drawing/2014/main" id="{884CB342-E396-450E-A159-B3C8817513E6}"/>
               </a:ext>
             </a:extLst>
           </p:cNvPr>
@@ -7210,8 +8432,8 @@
         </p:blipFill>
         <p:spPr bwMode="auto">
           <a:xfrm>
-            <a:off x="3831800" y="4345009"/>
-            <a:ext cx="2945603" cy="1764907"/>
+            <a:off x="8338557" y="4513087"/>
+            <a:ext cx="3190875" cy="1428750"/>
           </a:xfrm>
           <a:prstGeom prst="rect">
             <a:avLst/>
@@ -7230,10 +8452,10 @@
       </p:pic>
       <p:pic>
         <p:nvPicPr>
-          <p:cNvPr id="2066" name="Picture 18" descr="Home | Yarn - Package Manager">
-            <a:extLst>
-              <a:ext uri="{FF2B5EF4-FFF2-40B4-BE49-F238E27FC236}">
-                <a16:creationId xmlns:a16="http://schemas.microsoft.com/office/drawing/2014/main" id="{884CB342-E396-450E-A159-B3C8817513E6}"/>
+          <p:cNvPr id="1026" name="Picture 2">
+            <a:extLst>
+              <a:ext uri="{FF2B5EF4-FFF2-40B4-BE49-F238E27FC236}">
+                <a16:creationId xmlns:a16="http://schemas.microsoft.com/office/drawing/2014/main" id="{D27E4A3D-7A76-373B-E2C6-A07592B0F3A7}"/>
               </a:ext>
             </a:extLst>
           </p:cNvPr>
@@ -7257,8 +8479,8 @@
         </p:blipFill>
         <p:spPr bwMode="auto">
           <a:xfrm>
-            <a:off x="8338557" y="4513087"/>
-            <a:ext cx="3190875" cy="1428750"/>
+            <a:off x="7478516" y="1748611"/>
+            <a:ext cx="4910956" cy="1715471"/>
           </a:xfrm>
           <a:prstGeom prst="rect">
             <a:avLst/>
@@ -7333,22 +8555,15 @@
           <a:p>
             <a:pPr algn="ctr"/>
             <a:r>
-              <a:rPr lang="en-US" sz="4000" b="1" dirty="0">
+              <a:rPr lang="ru-RU" b="1" dirty="0">
                 <a:solidFill>
                   <a:schemeClr val="accent1">
                     <a:lumMod val="75000"/>
                   </a:schemeClr>
                 </a:solidFill>
               </a:rPr>
-              <a:t>REPOSITORY PATTERN</a:t>
-            </a:r>
-            <a:endParaRPr lang="ru-RU" b="1" dirty="0">
-              <a:solidFill>
-                <a:schemeClr val="accent1">
-                  <a:lumMod val="75000"/>
-                </a:schemeClr>
-              </a:solidFill>
-            </a:endParaRPr>
+              <a:t>БАЗА ДАННЫХ</a:t>
+            </a:r>
           </a:p>
         </p:txBody>
       </p:sp>
@@ -7391,12 +8606,84 @@
           </a:fontRef>
         </p:style>
       </p:cxnSp>
-      <p:sp>
-        <p:nvSpPr>
-          <p:cNvPr id="6" name="Прямоугольник 5">
-            <a:extLst>
-              <a:ext uri="{FF2B5EF4-FFF2-40B4-BE49-F238E27FC236}">
-                <a16:creationId xmlns:a16="http://schemas.microsoft.com/office/drawing/2014/main" id="{18909AB4-1897-4155-93CB-3E6C1D7435ED}"/>
+      <p:pic>
+        <p:nvPicPr>
+          <p:cNvPr id="5" name="Picture 4">
+            <a:extLst>
+              <a:ext uri="{FF2B5EF4-FFF2-40B4-BE49-F238E27FC236}">
+                <a16:creationId xmlns:a16="http://schemas.microsoft.com/office/drawing/2014/main" id="{D90A222D-A82E-B461-3162-FD27CD6146BF}"/>
+              </a:ext>
+            </a:extLst>
+          </p:cNvPr>
+          <p:cNvPicPr>
+            <a:picLocks noChangeAspect="1"/>
+          </p:cNvPicPr>
+          <p:nvPr/>
+        </p:nvPicPr>
+        <p:blipFill>
+          <a:blip r:embed="rId2">
+            <a:extLst>
+              <a:ext uri="{28A0092B-C50C-407E-A947-70E740481C1C}">
+                <a14:useLocalDpi xmlns:a14="http://schemas.microsoft.com/office/drawing/2010/main" val="0"/>
+              </a:ext>
+            </a:extLst>
+          </a:blip>
+          <a:stretch>
+            <a:fillRect/>
+          </a:stretch>
+        </p:blipFill>
+        <p:spPr>
+          <a:xfrm>
+            <a:off x="8518056" y="1497238"/>
+            <a:ext cx="2159336" cy="2108409"/>
+          </a:xfrm>
+          <a:prstGeom prst="rect">
+            <a:avLst/>
+          </a:prstGeom>
+        </p:spPr>
+      </p:pic>
+      <p:pic>
+        <p:nvPicPr>
+          <p:cNvPr id="11" name="Picture 10">
+            <a:extLst>
+              <a:ext uri="{FF2B5EF4-FFF2-40B4-BE49-F238E27FC236}">
+                <a16:creationId xmlns:a16="http://schemas.microsoft.com/office/drawing/2014/main" id="{3F324CFF-0303-38A2-6F51-34A26672C5D4}"/>
+              </a:ext>
+            </a:extLst>
+          </p:cNvPr>
+          <p:cNvPicPr>
+            <a:picLocks noChangeAspect="1"/>
+          </p:cNvPicPr>
+          <p:nvPr/>
+        </p:nvPicPr>
+        <p:blipFill>
+          <a:blip r:embed="rId3">
+            <a:extLst>
+              <a:ext uri="{28A0092B-C50C-407E-A947-70E740481C1C}">
+                <a14:useLocalDpi xmlns:a14="http://schemas.microsoft.com/office/drawing/2010/main" val="0"/>
+              </a:ext>
+            </a:extLst>
+          </a:blip>
+          <a:stretch>
+            <a:fillRect/>
+          </a:stretch>
+        </p:blipFill>
+        <p:spPr>
+          <a:xfrm>
+            <a:off x="8518056" y="3933452"/>
+            <a:ext cx="2159336" cy="2159336"/>
+          </a:xfrm>
+          <a:prstGeom prst="rect">
+            <a:avLst/>
+          </a:prstGeom>
+        </p:spPr>
+      </p:pic>
+      <p:sp>
+        <p:nvSpPr>
+          <p:cNvPr id="20" name="Прямоугольник 5">
+            <a:extLst>
+              <a:ext uri="{FF2B5EF4-FFF2-40B4-BE49-F238E27FC236}">
+                <a16:creationId xmlns:a16="http://schemas.microsoft.com/office/drawing/2014/main" id="{79433097-251A-D6D1-4D7B-A7C148F25782}"/>
               </a:ext>
             </a:extLst>
           </p:cNvPr>
@@ -7405,8 +8692,8 @@
         </p:nvSpPr>
         <p:spPr>
           <a:xfrm>
-            <a:off x="838200" y="1435980"/>
-            <a:ext cx="5257800" cy="1938992"/>
+            <a:off x="838201" y="1753138"/>
+            <a:ext cx="5519871" cy="1200329"/>
           </a:xfrm>
           <a:prstGeom prst="rect">
             <a:avLst/>
@@ -7419,6 +8706,16 @@
           <a:lstStyle/>
           <a:p>
             <a:r>
+              <a:rPr lang="ru-RU" sz="2400" b="1" dirty="0">
+                <a:solidFill>
+                  <a:schemeClr val="accent1">
+                    <a:lumMod val="50000"/>
+                  </a:schemeClr>
+                </a:solidFill>
+              </a:rPr>
+              <a:t>Метод анализа иерархий с применением девятибалльной шкалы по следующим критериям</a:t>
+            </a:r>
+            <a:r>
               <a:rPr lang="en-US" sz="2400" b="1" dirty="0">
                 <a:solidFill>
                   <a:schemeClr val="accent1">
@@ -7426,17 +8723,7 @@
                   </a:schemeClr>
                 </a:solidFill>
               </a:rPr>
-              <a:t>Persistence Ignorance – </a:t>
-            </a:r>
-            <a:r>
-              <a:rPr lang="ru-RU" sz="2400" b="1" dirty="0">
-                <a:solidFill>
-                  <a:schemeClr val="accent1">
-                    <a:lumMod val="50000"/>
-                  </a:schemeClr>
-                </a:solidFill>
-              </a:rPr>
-              <a:t>классы, моделирующие бизнес-домен в программном приложении, не должны зависеть от того, как они могут быть сохранены.</a:t>
+              <a:t>:</a:t>
             </a:r>
             <a:endParaRPr lang="ru-RU" sz="2400" dirty="0">
               <a:solidFill>
@@ -7448,106 +8735,12 @@
           </a:p>
         </p:txBody>
       </p:sp>
-      <p:pic>
-        <p:nvPicPr>
-          <p:cNvPr id="4106" name="Picture 10" descr="Hibernate. Everything data.">
-            <a:extLst>
-              <a:ext uri="{FF2B5EF4-FFF2-40B4-BE49-F238E27FC236}">
-                <a16:creationId xmlns:a16="http://schemas.microsoft.com/office/drawing/2014/main" id="{31A946E0-E5CF-4338-BCD0-92967EBF0A2C}"/>
-              </a:ext>
-            </a:extLst>
-          </p:cNvPr>
-          <p:cNvPicPr>
-            <a:picLocks noChangeAspect="1" noChangeArrowheads="1"/>
-          </p:cNvPicPr>
-          <p:nvPr/>
-        </p:nvPicPr>
-        <p:blipFill>
-          <a:blip r:embed="rId2">
-            <a:extLst>
-              <a:ext uri="{28A0092B-C50C-407E-A947-70E740481C1C}">
-                <a14:useLocalDpi xmlns:a14="http://schemas.microsoft.com/office/drawing/2010/main" val="0"/>
-              </a:ext>
-            </a:extLst>
-          </a:blip>
-          <a:srcRect/>
-          <a:stretch>
-            <a:fillRect/>
-          </a:stretch>
-        </p:blipFill>
-        <p:spPr bwMode="auto">
-          <a:xfrm>
-            <a:off x="5799773" y="1398113"/>
-            <a:ext cx="5823979" cy="1553061"/>
-          </a:xfrm>
-          <a:prstGeom prst="rect">
-            <a:avLst/>
-          </a:prstGeom>
-          <a:noFill/>
-          <a:extLst>
-            <a:ext uri="{909E8E84-426E-40DD-AFC4-6F175D3DCCD1}">
-              <a14:hiddenFill xmlns:a14="http://schemas.microsoft.com/office/drawing/2010/main">
-                <a:solidFill>
-                  <a:srgbClr val="FFFFFF"/>
-                </a:solidFill>
-              </a14:hiddenFill>
-            </a:ext>
-          </a:extLst>
-        </p:spPr>
-      </p:pic>
-      <p:pic>
-        <p:nvPicPr>
-          <p:cNvPr id="4108" name="Picture 12" descr="Spring Data JPA &amp; Hibernate with Cucumber – Software Testing">
-            <a:extLst>
-              <a:ext uri="{FF2B5EF4-FFF2-40B4-BE49-F238E27FC236}">
-                <a16:creationId xmlns:a16="http://schemas.microsoft.com/office/drawing/2014/main" id="{F12784F4-DB28-46DB-A412-F3CC28DC4866}"/>
-              </a:ext>
-            </a:extLst>
-          </p:cNvPr>
-          <p:cNvPicPr>
-            <a:picLocks noChangeAspect="1" noChangeArrowheads="1"/>
-          </p:cNvPicPr>
-          <p:nvPr/>
-        </p:nvPicPr>
-        <p:blipFill>
-          <a:blip r:embed="rId3">
-            <a:extLst>
-              <a:ext uri="{28A0092B-C50C-407E-A947-70E740481C1C}">
-                <a14:useLocalDpi xmlns:a14="http://schemas.microsoft.com/office/drawing/2010/main" val="0"/>
-              </a:ext>
-            </a:extLst>
-          </a:blip>
-          <a:srcRect/>
-          <a:stretch>
-            <a:fillRect/>
-          </a:stretch>
-        </p:blipFill>
-        <p:spPr bwMode="auto">
-          <a:xfrm>
-            <a:off x="6536121" y="3774504"/>
-            <a:ext cx="4351281" cy="2216307"/>
-          </a:xfrm>
-          <a:prstGeom prst="rect">
-            <a:avLst/>
-          </a:prstGeom>
-          <a:noFill/>
-          <a:extLst>
-            <a:ext uri="{909E8E84-426E-40DD-AFC4-6F175D3DCCD1}">
-              <a14:hiddenFill xmlns:a14="http://schemas.microsoft.com/office/drawing/2010/main">
-                <a:solidFill>
-                  <a:srgbClr val="FFFFFF"/>
-                </a:solidFill>
-              </a14:hiddenFill>
-            </a:ext>
-          </a:extLst>
-        </p:spPr>
-      </p:pic>
-      <p:sp>
-        <p:nvSpPr>
-          <p:cNvPr id="19" name="Прямоугольник 18">
-            <a:extLst>
-              <a:ext uri="{FF2B5EF4-FFF2-40B4-BE49-F238E27FC236}">
-                <a16:creationId xmlns:a16="http://schemas.microsoft.com/office/drawing/2014/main" id="{7EFCD501-66D6-4844-AE13-0EA92988C8EB}"/>
+      <p:sp>
+        <p:nvSpPr>
+          <p:cNvPr id="29" name="Прямоугольник 5">
+            <a:extLst>
+              <a:ext uri="{FF2B5EF4-FFF2-40B4-BE49-F238E27FC236}">
+                <a16:creationId xmlns:a16="http://schemas.microsoft.com/office/drawing/2014/main" id="{08448AB2-6B6B-7AAF-4DCA-A9686388AFF3}"/>
               </a:ext>
             </a:extLst>
           </p:cNvPr>
@@ -7556,8 +8749,8 @@
         </p:nvSpPr>
         <p:spPr>
           <a:xfrm>
-            <a:off x="838200" y="3543830"/>
-            <a:ext cx="5257800" cy="2677656"/>
+            <a:off x="838200" y="2953467"/>
+            <a:ext cx="5519871" cy="2308324"/>
           </a:xfrm>
           <a:prstGeom prst="rect">
             <a:avLst/>
@@ -7569,26 +8762,42 @@
           </a:bodyPr>
           <a:lstStyle/>
           <a:p>
-            <a:r>
-              <a:rPr lang="ru-RU" sz="2400" b="1" dirty="0" err="1">
+            <a:pPr marL="342900" indent="-342900">
+              <a:buFont typeface="Arial" panose="020B0604020202020204" pitchFamily="34" charset="0"/>
+              <a:buChar char="•"/>
+            </a:pPr>
+            <a:r>
+              <a:rPr lang="ru-RU" sz="2400" b="1" dirty="0">
                 <a:solidFill>
                   <a:schemeClr val="accent1">
                     <a:lumMod val="50000"/>
                   </a:schemeClr>
                 </a:solidFill>
               </a:rPr>
-              <a:t>Repository</a:t>
-            </a:r>
-            <a:r>
-              <a:rPr lang="en-US" sz="2400" b="1" dirty="0">
+              <a:t>Архитектура</a:t>
+            </a:r>
+          </a:p>
+          <a:p>
+            <a:pPr marL="342900" indent="-342900">
+              <a:buFont typeface="Arial" panose="020B0604020202020204" pitchFamily="34" charset="0"/>
+              <a:buChar char="•"/>
+            </a:pPr>
+            <a:r>
+              <a:rPr lang="ru-RU" sz="2400" b="1" dirty="0">
                 <a:solidFill>
                   <a:schemeClr val="accent1">
                     <a:lumMod val="50000"/>
                   </a:schemeClr>
                 </a:solidFill>
               </a:rPr>
-              <a:t> </a:t>
-            </a:r>
+              <a:t>Поддерживаемые типы данных</a:t>
+            </a:r>
+          </a:p>
+          <a:p>
+            <a:pPr marL="342900" indent="-342900">
+              <a:buFont typeface="Arial" panose="020B0604020202020204" pitchFamily="34" charset="0"/>
+              <a:buChar char="•"/>
+            </a:pPr>
             <a:r>
               <a:rPr lang="ru-RU" sz="2400" b="1" dirty="0">
                 <a:solidFill>
@@ -7597,7 +8806,105 @@
                   </a:schemeClr>
                 </a:solidFill>
               </a:rPr>
-              <a:t>– это интерфейс, который абстрагирует таблицу в БД и позволяет выполнять все необходимые задачи по хранению и обработке данных с помощью привычного разработчику языка программирования. </a:t>
+              <a:t>Поддерживаемые индексы</a:t>
+            </a:r>
+          </a:p>
+          <a:p>
+            <a:pPr marL="342900" indent="-342900">
+              <a:buFont typeface="Arial" panose="020B0604020202020204" pitchFamily="34" charset="0"/>
+              <a:buChar char="•"/>
+            </a:pPr>
+            <a:r>
+              <a:rPr lang="ru-RU" sz="2400" b="1" dirty="0">
+                <a:solidFill>
+                  <a:schemeClr val="accent1">
+                    <a:lumMod val="50000"/>
+                  </a:schemeClr>
+                </a:solidFill>
+              </a:rPr>
+              <a:t>Производительность</a:t>
+            </a:r>
+          </a:p>
+          <a:p>
+            <a:pPr marL="342900" indent="-342900">
+              <a:buFont typeface="Arial" panose="020B0604020202020204" pitchFamily="34" charset="0"/>
+              <a:buChar char="•"/>
+            </a:pPr>
+            <a:r>
+              <a:rPr lang="ru-RU" sz="2400" b="1" dirty="0">
+                <a:solidFill>
+                  <a:schemeClr val="accent1">
+                    <a:lumMod val="50000"/>
+                  </a:schemeClr>
+                </a:solidFill>
+              </a:rPr>
+              <a:t>Безопасность</a:t>
+            </a:r>
+          </a:p>
+          <a:p>
+            <a:pPr marL="342900" indent="-342900">
+              <a:buFont typeface="Arial" panose="020B0604020202020204" pitchFamily="34" charset="0"/>
+              <a:buChar char="•"/>
+            </a:pPr>
+            <a:r>
+              <a:rPr lang="ru-RU" sz="2400" b="1" dirty="0">
+                <a:solidFill>
+                  <a:schemeClr val="accent1">
+                    <a:lumMod val="50000"/>
+                  </a:schemeClr>
+                </a:solidFill>
+              </a:rPr>
+              <a:t>Поддержка</a:t>
+            </a:r>
+          </a:p>
+        </p:txBody>
+      </p:sp>
+      <p:sp>
+        <p:nvSpPr>
+          <p:cNvPr id="30" name="Прямоугольник 5">
+            <a:extLst>
+              <a:ext uri="{FF2B5EF4-FFF2-40B4-BE49-F238E27FC236}">
+                <a16:creationId xmlns:a16="http://schemas.microsoft.com/office/drawing/2014/main" id="{940F0E0F-5B3E-72A9-AF44-826B8B211FFD}"/>
+              </a:ext>
+            </a:extLst>
+          </p:cNvPr>
+          <p:cNvSpPr/>
+          <p:nvPr/>
+        </p:nvSpPr>
+        <p:spPr>
+          <a:xfrm>
+            <a:off x="838200" y="5261791"/>
+            <a:ext cx="5519871" cy="830997"/>
+          </a:xfrm>
+          <a:prstGeom prst="rect">
+            <a:avLst/>
+          </a:prstGeom>
+        </p:spPr>
+        <p:txBody>
+          <a:bodyPr wrap="square">
+            <a:spAutoFit/>
+          </a:bodyPr>
+          <a:lstStyle/>
+          <a:p>
+            <a:r>
+              <a:rPr lang="en-GB" sz="2400" b="1" dirty="0">
+                <a:solidFill>
+                  <a:schemeClr val="accent1">
+                    <a:lumMod val="50000"/>
+                  </a:schemeClr>
+                </a:solidFill>
+              </a:rPr>
+              <a:t>PostgreSQL </a:t>
+            </a:r>
+            <a:r>
+              <a:rPr lang="ru-RU" sz="2400" b="1" dirty="0">
+                <a:solidFill>
+                  <a:schemeClr val="accent1">
+                    <a:lumMod val="50000"/>
+                  </a:schemeClr>
+                </a:solidFill>
+              </a:rPr>
+              <a:t>является наиболее предпочтительным вариантом.</a:t>
             </a:r>
             <a:endParaRPr lang="ru-RU" sz="2400" dirty="0">
               <a:solidFill>
@@ -7612,7 +8919,7 @@
     </p:spTree>
     <p:extLst>
       <p:ext uri="{BB962C8B-B14F-4D97-AF65-F5344CB8AC3E}">
-        <p14:creationId xmlns:p14="http://schemas.microsoft.com/office/powerpoint/2010/main" val="2860851999"/>
+        <p14:creationId xmlns:p14="http://schemas.microsoft.com/office/powerpoint/2010/main" val="1004148271"/>
       </p:ext>
     </p:extLst>
   </p:cSld>

</xml_diff>

<commit_message>
diploma and presentation changes
</commit_message>
<xml_diff>
--- a/docs/Presentation.pptx
+++ b/docs/Presentation.pptx
@@ -4,6 +4,9 @@
   <p:sldMasterIdLst>
     <p:sldMasterId id="2147483648" r:id="rId1"/>
   </p:sldMasterIdLst>
+  <p:notesMasterIdLst>
+    <p:notesMasterId r:id="rId21"/>
+  </p:notesMasterIdLst>
   <p:sldIdLst>
     <p:sldId id="256" r:id="rId2"/>
     <p:sldId id="257" r:id="rId3"/>
@@ -16,13 +19,14 @@
     <p:sldId id="270" r:id="rId10"/>
     <p:sldId id="266" r:id="rId11"/>
     <p:sldId id="267" r:id="rId12"/>
-    <p:sldId id="271" r:id="rId13"/>
-    <p:sldId id="272" r:id="rId14"/>
-    <p:sldId id="268" r:id="rId15"/>
-    <p:sldId id="269" r:id="rId16"/>
-    <p:sldId id="273" r:id="rId17"/>
-    <p:sldId id="262" r:id="rId18"/>
-    <p:sldId id="274" r:id="rId19"/>
+    <p:sldId id="276" r:id="rId13"/>
+    <p:sldId id="275" r:id="rId14"/>
+    <p:sldId id="272" r:id="rId15"/>
+    <p:sldId id="268" r:id="rId16"/>
+    <p:sldId id="269" r:id="rId17"/>
+    <p:sldId id="273" r:id="rId18"/>
+    <p:sldId id="262" r:id="rId19"/>
+    <p:sldId id="274" r:id="rId20"/>
   </p:sldIdLst>
   <p:sldSz cx="12192000" cy="6858000"/>
   <p:notesSz cx="6858000" cy="9144000"/>
@@ -129,6 +133,356 @@
 </p:presentation>
 </file>
 
+<file path=ppt/notesMasters/notesMaster1.xml><?xml version="1.0" encoding="utf-8"?>
+<p:notesMaster xmlns:a="http://schemas.openxmlformats.org/drawingml/2006/main" xmlns:r="http://schemas.openxmlformats.org/officeDocument/2006/relationships" xmlns:p="http://schemas.openxmlformats.org/presentationml/2006/main">
+  <p:cSld>
+    <p:bg>
+      <p:bgRef idx="1001">
+        <a:schemeClr val="bg1"/>
+      </p:bgRef>
+    </p:bg>
+    <p:spTree>
+      <p:nvGrpSpPr>
+        <p:cNvPr id="1" name=""/>
+        <p:cNvGrpSpPr/>
+        <p:nvPr/>
+      </p:nvGrpSpPr>
+      <p:grpSpPr>
+        <a:xfrm>
+          <a:off x="0" y="0"/>
+          <a:ext cx="0" cy="0"/>
+          <a:chOff x="0" y="0"/>
+          <a:chExt cx="0" cy="0"/>
+        </a:xfrm>
+      </p:grpSpPr>
+      <p:sp>
+        <p:nvSpPr>
+          <p:cNvPr id="2" name="Header Placeholder 1"/>
+          <p:cNvSpPr>
+            <a:spLocks noGrp="1"/>
+          </p:cNvSpPr>
+          <p:nvPr>
+            <p:ph type="hdr" sz="quarter"/>
+          </p:nvPr>
+        </p:nvSpPr>
+        <p:spPr>
+          <a:xfrm>
+            <a:off x="0" y="0"/>
+            <a:ext cx="2971800" cy="458788"/>
+          </a:xfrm>
+          <a:prstGeom prst="rect">
+            <a:avLst/>
+          </a:prstGeom>
+        </p:spPr>
+        <p:txBody>
+          <a:bodyPr vert="horz" lIns="91440" tIns="45720" rIns="91440" bIns="45720" rtlCol="0"/>
+          <a:lstStyle>
+            <a:lvl1pPr algn="l">
+              <a:defRPr sz="1200"/>
+            </a:lvl1pPr>
+          </a:lstStyle>
+          <a:p>
+            <a:endParaRPr lang="en-RU"/>
+          </a:p>
+        </p:txBody>
+      </p:sp>
+      <p:sp>
+        <p:nvSpPr>
+          <p:cNvPr id="3" name="Date Placeholder 2"/>
+          <p:cNvSpPr>
+            <a:spLocks noGrp="1"/>
+          </p:cNvSpPr>
+          <p:nvPr>
+            <p:ph type="dt" idx="1"/>
+          </p:nvPr>
+        </p:nvSpPr>
+        <p:spPr>
+          <a:xfrm>
+            <a:off x="3884613" y="0"/>
+            <a:ext cx="2971800" cy="458788"/>
+          </a:xfrm>
+          <a:prstGeom prst="rect">
+            <a:avLst/>
+          </a:prstGeom>
+        </p:spPr>
+        <p:txBody>
+          <a:bodyPr vert="horz" lIns="91440" tIns="45720" rIns="91440" bIns="45720" rtlCol="0"/>
+          <a:lstStyle>
+            <a:lvl1pPr algn="r">
+              <a:defRPr sz="1200"/>
+            </a:lvl1pPr>
+          </a:lstStyle>
+          <a:p>
+            <a:fld id="{E8B83494-2423-DB44-AF57-0E994EC455BE}" type="datetimeFigureOut">
+              <a:rPr lang="en-RU" smtClean="0"/>
+              <a:t>19.06.2022</a:t>
+            </a:fld>
+            <a:endParaRPr lang="en-RU"/>
+          </a:p>
+        </p:txBody>
+      </p:sp>
+      <p:sp>
+        <p:nvSpPr>
+          <p:cNvPr id="4" name="Slide Image Placeholder 3"/>
+          <p:cNvSpPr>
+            <a:spLocks noGrp="1" noRot="1" noChangeAspect="1"/>
+          </p:cNvSpPr>
+          <p:nvPr>
+            <p:ph type="sldImg" idx="2"/>
+          </p:nvPr>
+        </p:nvSpPr>
+        <p:spPr>
+          <a:xfrm>
+            <a:off x="685800" y="1143000"/>
+            <a:ext cx="5486400" cy="3086100"/>
+          </a:xfrm>
+          <a:prstGeom prst="rect">
+            <a:avLst/>
+          </a:prstGeom>
+          <a:noFill/>
+          <a:ln w="12700">
+            <a:solidFill>
+              <a:prstClr val="black"/>
+            </a:solidFill>
+          </a:ln>
+        </p:spPr>
+        <p:txBody>
+          <a:bodyPr vert="horz" lIns="91440" tIns="45720" rIns="91440" bIns="45720" rtlCol="0" anchor="ctr"/>
+          <a:lstStyle/>
+          <a:p>
+            <a:endParaRPr lang="en-RU"/>
+          </a:p>
+        </p:txBody>
+      </p:sp>
+      <p:sp>
+        <p:nvSpPr>
+          <p:cNvPr id="5" name="Notes Placeholder 4"/>
+          <p:cNvSpPr>
+            <a:spLocks noGrp="1"/>
+          </p:cNvSpPr>
+          <p:nvPr>
+            <p:ph type="body" sz="quarter" idx="3"/>
+          </p:nvPr>
+        </p:nvSpPr>
+        <p:spPr>
+          <a:xfrm>
+            <a:off x="685800" y="4400550"/>
+            <a:ext cx="5486400" cy="3600450"/>
+          </a:xfrm>
+          <a:prstGeom prst="rect">
+            <a:avLst/>
+          </a:prstGeom>
+        </p:spPr>
+        <p:txBody>
+          <a:bodyPr vert="horz" lIns="91440" tIns="45720" rIns="91440" bIns="45720" rtlCol="0"/>
+          <a:lstStyle/>
+          <a:p>
+            <a:pPr lvl="0"/>
+            <a:r>
+              <a:rPr lang="en-GB"/>
+              <a:t>Click to edit Master text styles</a:t>
+            </a:r>
+          </a:p>
+          <a:p>
+            <a:pPr lvl="1"/>
+            <a:r>
+              <a:rPr lang="en-GB"/>
+              <a:t>Second level</a:t>
+            </a:r>
+          </a:p>
+          <a:p>
+            <a:pPr lvl="2"/>
+            <a:r>
+              <a:rPr lang="en-GB"/>
+              <a:t>Third level</a:t>
+            </a:r>
+          </a:p>
+          <a:p>
+            <a:pPr lvl="3"/>
+            <a:r>
+              <a:rPr lang="en-GB"/>
+              <a:t>Fourth level</a:t>
+            </a:r>
+          </a:p>
+          <a:p>
+            <a:pPr lvl="4"/>
+            <a:r>
+              <a:rPr lang="en-GB"/>
+              <a:t>Fifth level</a:t>
+            </a:r>
+            <a:endParaRPr lang="en-RU"/>
+          </a:p>
+        </p:txBody>
+      </p:sp>
+      <p:sp>
+        <p:nvSpPr>
+          <p:cNvPr id="6" name="Footer Placeholder 5"/>
+          <p:cNvSpPr>
+            <a:spLocks noGrp="1"/>
+          </p:cNvSpPr>
+          <p:nvPr>
+            <p:ph type="ftr" sz="quarter" idx="4"/>
+          </p:nvPr>
+        </p:nvSpPr>
+        <p:spPr>
+          <a:xfrm>
+            <a:off x="0" y="8685213"/>
+            <a:ext cx="2971800" cy="458787"/>
+          </a:xfrm>
+          <a:prstGeom prst="rect">
+            <a:avLst/>
+          </a:prstGeom>
+        </p:spPr>
+        <p:txBody>
+          <a:bodyPr vert="horz" lIns="91440" tIns="45720" rIns="91440" bIns="45720" rtlCol="0" anchor="b"/>
+          <a:lstStyle>
+            <a:lvl1pPr algn="l">
+              <a:defRPr sz="1200"/>
+            </a:lvl1pPr>
+          </a:lstStyle>
+          <a:p>
+            <a:endParaRPr lang="en-RU"/>
+          </a:p>
+        </p:txBody>
+      </p:sp>
+      <p:sp>
+        <p:nvSpPr>
+          <p:cNvPr id="7" name="Slide Number Placeholder 6"/>
+          <p:cNvSpPr>
+            <a:spLocks noGrp="1"/>
+          </p:cNvSpPr>
+          <p:nvPr>
+            <p:ph type="sldNum" sz="quarter" idx="5"/>
+          </p:nvPr>
+        </p:nvSpPr>
+        <p:spPr>
+          <a:xfrm>
+            <a:off x="3884613" y="8685213"/>
+            <a:ext cx="2971800" cy="458787"/>
+          </a:xfrm>
+          <a:prstGeom prst="rect">
+            <a:avLst/>
+          </a:prstGeom>
+        </p:spPr>
+        <p:txBody>
+          <a:bodyPr vert="horz" lIns="91440" tIns="45720" rIns="91440" bIns="45720" rtlCol="0" anchor="b"/>
+          <a:lstStyle>
+            <a:lvl1pPr algn="r">
+              <a:defRPr sz="1200"/>
+            </a:lvl1pPr>
+          </a:lstStyle>
+          <a:p>
+            <a:fld id="{30F5F59B-2D6D-CD4A-B3DB-D92F8AFE3DDF}" type="slidenum">
+              <a:rPr lang="en-RU" smtClean="0"/>
+              <a:t>‹#›</a:t>
+            </a:fld>
+            <a:endParaRPr lang="en-RU"/>
+          </a:p>
+        </p:txBody>
+      </p:sp>
+    </p:spTree>
+    <p:extLst>
+      <p:ext uri="{BB962C8B-B14F-4D97-AF65-F5344CB8AC3E}">
+        <p14:creationId xmlns:p14="http://schemas.microsoft.com/office/powerpoint/2010/main" val="3663882286"/>
+      </p:ext>
+    </p:extLst>
+  </p:cSld>
+  <p:clrMap bg1="lt1" tx1="dk1" bg2="lt2" tx2="dk2" accent1="accent1" accent2="accent2" accent3="accent3" accent4="accent4" accent5="accent5" accent6="accent6" hlink="hlink" folHlink="folHlink"/>
+  <p:notesStyle>
+    <a:lvl1pPr marL="0" algn="l" defTabSz="914400" rtl="0" eaLnBrk="1" latinLnBrk="0" hangingPunct="1">
+      <a:defRPr sz="1200" kern="1200">
+        <a:solidFill>
+          <a:schemeClr val="tx1"/>
+        </a:solidFill>
+        <a:latin typeface="+mn-lt"/>
+        <a:ea typeface="+mn-ea"/>
+        <a:cs typeface="+mn-cs"/>
+      </a:defRPr>
+    </a:lvl1pPr>
+    <a:lvl2pPr marL="457200" algn="l" defTabSz="914400" rtl="0" eaLnBrk="1" latinLnBrk="0" hangingPunct="1">
+      <a:defRPr sz="1200" kern="1200">
+        <a:solidFill>
+          <a:schemeClr val="tx1"/>
+        </a:solidFill>
+        <a:latin typeface="+mn-lt"/>
+        <a:ea typeface="+mn-ea"/>
+        <a:cs typeface="+mn-cs"/>
+      </a:defRPr>
+    </a:lvl2pPr>
+    <a:lvl3pPr marL="914400" algn="l" defTabSz="914400" rtl="0" eaLnBrk="1" latinLnBrk="0" hangingPunct="1">
+      <a:defRPr sz="1200" kern="1200">
+        <a:solidFill>
+          <a:schemeClr val="tx1"/>
+        </a:solidFill>
+        <a:latin typeface="+mn-lt"/>
+        <a:ea typeface="+mn-ea"/>
+        <a:cs typeface="+mn-cs"/>
+      </a:defRPr>
+    </a:lvl3pPr>
+    <a:lvl4pPr marL="1371600" algn="l" defTabSz="914400" rtl="0" eaLnBrk="1" latinLnBrk="0" hangingPunct="1">
+      <a:defRPr sz="1200" kern="1200">
+        <a:solidFill>
+          <a:schemeClr val="tx1"/>
+        </a:solidFill>
+        <a:latin typeface="+mn-lt"/>
+        <a:ea typeface="+mn-ea"/>
+        <a:cs typeface="+mn-cs"/>
+      </a:defRPr>
+    </a:lvl4pPr>
+    <a:lvl5pPr marL="1828800" algn="l" defTabSz="914400" rtl="0" eaLnBrk="1" latinLnBrk="0" hangingPunct="1">
+      <a:defRPr sz="1200" kern="1200">
+        <a:solidFill>
+          <a:schemeClr val="tx1"/>
+        </a:solidFill>
+        <a:latin typeface="+mn-lt"/>
+        <a:ea typeface="+mn-ea"/>
+        <a:cs typeface="+mn-cs"/>
+      </a:defRPr>
+    </a:lvl5pPr>
+    <a:lvl6pPr marL="2286000" algn="l" defTabSz="914400" rtl="0" eaLnBrk="1" latinLnBrk="0" hangingPunct="1">
+      <a:defRPr sz="1200" kern="1200">
+        <a:solidFill>
+          <a:schemeClr val="tx1"/>
+        </a:solidFill>
+        <a:latin typeface="+mn-lt"/>
+        <a:ea typeface="+mn-ea"/>
+        <a:cs typeface="+mn-cs"/>
+      </a:defRPr>
+    </a:lvl6pPr>
+    <a:lvl7pPr marL="2743200" algn="l" defTabSz="914400" rtl="0" eaLnBrk="1" latinLnBrk="0" hangingPunct="1">
+      <a:defRPr sz="1200" kern="1200">
+        <a:solidFill>
+          <a:schemeClr val="tx1"/>
+        </a:solidFill>
+        <a:latin typeface="+mn-lt"/>
+        <a:ea typeface="+mn-ea"/>
+        <a:cs typeface="+mn-cs"/>
+      </a:defRPr>
+    </a:lvl7pPr>
+    <a:lvl8pPr marL="3200400" algn="l" defTabSz="914400" rtl="0" eaLnBrk="1" latinLnBrk="0" hangingPunct="1">
+      <a:defRPr sz="1200" kern="1200">
+        <a:solidFill>
+          <a:schemeClr val="tx1"/>
+        </a:solidFill>
+        <a:latin typeface="+mn-lt"/>
+        <a:ea typeface="+mn-ea"/>
+        <a:cs typeface="+mn-cs"/>
+      </a:defRPr>
+    </a:lvl8pPr>
+    <a:lvl9pPr marL="3657600" algn="l" defTabSz="914400" rtl="0" eaLnBrk="1" latinLnBrk="0" hangingPunct="1">
+      <a:defRPr sz="1200" kern="1200">
+        <a:solidFill>
+          <a:schemeClr val="tx1"/>
+        </a:solidFill>
+        <a:latin typeface="+mn-lt"/>
+        <a:ea typeface="+mn-ea"/>
+        <a:cs typeface="+mn-cs"/>
+      </a:defRPr>
+    </a:lvl9pPr>
+  </p:notesStyle>
+</p:notesMaster>
+</file>
+
 <file path=ppt/slideLayouts/slideLayout1.xml><?xml version="1.0" encoding="utf-8"?>
 <p:sldLayout xmlns:a="http://schemas.openxmlformats.org/drawingml/2006/main" xmlns:r="http://schemas.openxmlformats.org/officeDocument/2006/relationships" xmlns:p="http://schemas.openxmlformats.org/presentationml/2006/main" type="title" preserve="1">
   <p:cSld name="Титульный слайд">
@@ -276,7 +630,7 @@
           <a:p>
             <a:fld id="{D5ACBE5F-0E6D-41DB-81D9-950E8D2117EC}" type="datetimeFigureOut">
               <a:rPr lang="ru-RU" smtClean="0"/>
-              <a:t>15.06.2022</a:t>
+              <a:t>19.06.2022</a:t>
             </a:fld>
             <a:endParaRPr lang="ru-RU"/>
           </a:p>
@@ -474,7 +828,7 @@
           <a:p>
             <a:fld id="{D5ACBE5F-0E6D-41DB-81D9-950E8D2117EC}" type="datetimeFigureOut">
               <a:rPr lang="ru-RU" smtClean="0"/>
-              <a:t>15.06.2022</a:t>
+              <a:t>19.06.2022</a:t>
             </a:fld>
             <a:endParaRPr lang="ru-RU"/>
           </a:p>
@@ -682,7 +1036,7 @@
           <a:p>
             <a:fld id="{D5ACBE5F-0E6D-41DB-81D9-950E8D2117EC}" type="datetimeFigureOut">
               <a:rPr lang="ru-RU" smtClean="0"/>
-              <a:t>15.06.2022</a:t>
+              <a:t>19.06.2022</a:t>
             </a:fld>
             <a:endParaRPr lang="ru-RU"/>
           </a:p>
@@ -880,7 +1234,7 @@
           <a:p>
             <a:fld id="{D5ACBE5F-0E6D-41DB-81D9-950E8D2117EC}" type="datetimeFigureOut">
               <a:rPr lang="ru-RU" smtClean="0"/>
-              <a:t>15.06.2022</a:t>
+              <a:t>19.06.2022</a:t>
             </a:fld>
             <a:endParaRPr lang="ru-RU"/>
           </a:p>
@@ -1155,7 +1509,7 @@
           <a:p>
             <a:fld id="{D5ACBE5F-0E6D-41DB-81D9-950E8D2117EC}" type="datetimeFigureOut">
               <a:rPr lang="ru-RU" smtClean="0"/>
-              <a:t>15.06.2022</a:t>
+              <a:t>19.06.2022</a:t>
             </a:fld>
             <a:endParaRPr lang="ru-RU"/>
           </a:p>
@@ -1420,7 +1774,7 @@
           <a:p>
             <a:fld id="{D5ACBE5F-0E6D-41DB-81D9-950E8D2117EC}" type="datetimeFigureOut">
               <a:rPr lang="ru-RU" smtClean="0"/>
-              <a:t>15.06.2022</a:t>
+              <a:t>19.06.2022</a:t>
             </a:fld>
             <a:endParaRPr lang="ru-RU"/>
           </a:p>
@@ -1832,7 +2186,7 @@
           <a:p>
             <a:fld id="{D5ACBE5F-0E6D-41DB-81D9-950E8D2117EC}" type="datetimeFigureOut">
               <a:rPr lang="ru-RU" smtClean="0"/>
-              <a:t>15.06.2022</a:t>
+              <a:t>19.06.2022</a:t>
             </a:fld>
             <a:endParaRPr lang="ru-RU"/>
           </a:p>
@@ -1973,7 +2327,7 @@
           <a:p>
             <a:fld id="{D5ACBE5F-0E6D-41DB-81D9-950E8D2117EC}" type="datetimeFigureOut">
               <a:rPr lang="ru-RU" smtClean="0"/>
-              <a:t>15.06.2022</a:t>
+              <a:t>19.06.2022</a:t>
             </a:fld>
             <a:endParaRPr lang="ru-RU"/>
           </a:p>
@@ -2086,7 +2440,7 @@
           <a:p>
             <a:fld id="{D5ACBE5F-0E6D-41DB-81D9-950E8D2117EC}" type="datetimeFigureOut">
               <a:rPr lang="ru-RU" smtClean="0"/>
-              <a:t>15.06.2022</a:t>
+              <a:t>19.06.2022</a:t>
             </a:fld>
             <a:endParaRPr lang="ru-RU"/>
           </a:p>
@@ -2397,7 +2751,7 @@
           <a:p>
             <a:fld id="{D5ACBE5F-0E6D-41DB-81D9-950E8D2117EC}" type="datetimeFigureOut">
               <a:rPr lang="ru-RU" smtClean="0"/>
-              <a:t>15.06.2022</a:t>
+              <a:t>19.06.2022</a:t>
             </a:fld>
             <a:endParaRPr lang="ru-RU"/>
           </a:p>
@@ -2685,7 +3039,7 @@
           <a:p>
             <a:fld id="{D5ACBE5F-0E6D-41DB-81D9-950E8D2117EC}" type="datetimeFigureOut">
               <a:rPr lang="ru-RU" smtClean="0"/>
-              <a:t>15.06.2022</a:t>
+              <a:t>19.06.2022</a:t>
             </a:fld>
             <a:endParaRPr lang="ru-RU"/>
           </a:p>
@@ -2926,7 +3280,7 @@
           <a:p>
             <a:fld id="{D5ACBE5F-0E6D-41DB-81D9-950E8D2117EC}" type="datetimeFigureOut">
               <a:rPr lang="ru-RU" smtClean="0"/>
-              <a:t>15.06.2022</a:t>
+              <a:t>19.06.2022</a:t>
             </a:fld>
             <a:endParaRPr lang="ru-RU"/>
           </a:p>
@@ -3411,8 +3765,24 @@
               <a:t>ОБУЧАЮЩИЙСЯ:  </a:t>
             </a:r>
             <a:r>
+              <a:rPr lang="ru-RU" dirty="0" err="1"/>
+              <a:t>Взюков</a:t>
+            </a:r>
+            <a:r>
               <a:rPr lang="ru-RU" dirty="0"/>
-              <a:t>Взюков О.В.</a:t>
+              <a:t> О</a:t>
+            </a:r>
+            <a:r>
+              <a:rPr lang="en-US" dirty="0" err="1"/>
+              <a:t>л</a:t>
+            </a:r>
+            <a:r>
+              <a:rPr lang="ru-RU" dirty="0" err="1"/>
+              <a:t>ег</a:t>
+            </a:r>
+            <a:r>
+              <a:rPr lang="ru-RU" dirty="0"/>
+              <a:t> Валерьевич</a:t>
             </a:r>
             <a:endParaRPr lang="ru-RU" b="1" dirty="0"/>
           </a:p>
@@ -3701,8 +4071,8 @@
         </p:nvSpPr>
         <p:spPr>
           <a:xfrm>
-            <a:off x="838200" y="1435980"/>
-            <a:ext cx="5257800" cy="1938992"/>
+            <a:off x="838200" y="4935341"/>
+            <a:ext cx="6477000" cy="461665"/>
           </a:xfrm>
           <a:prstGeom prst="rect">
             <a:avLst/>
@@ -3722,7 +4092,7 @@
                   </a:schemeClr>
                 </a:solidFill>
               </a:rPr>
-              <a:t>Persistence Ignorance – </a:t>
+              <a:t>Persistence Ignorance </a:t>
             </a:r>
             <a:r>
               <a:rPr lang="ru-RU" sz="2400" b="1" dirty="0">
@@ -3732,7 +4102,17 @@
                   </a:schemeClr>
                 </a:solidFill>
               </a:rPr>
-              <a:t>классы, моделирующие бизнес-домен в программном приложении, не должны зависеть от того, как они могут быть сохранены.</a:t>
+              <a:t>помощью </a:t>
+            </a:r>
+            <a:r>
+              <a:rPr lang="en-US" sz="2400" b="1" dirty="0">
+                <a:solidFill>
+                  <a:schemeClr val="accent1">
+                    <a:lumMod val="50000"/>
+                  </a:schemeClr>
+                </a:solidFill>
+              </a:rPr>
+              <a:t>Hibernate ORM</a:t>
             </a:r>
             <a:endParaRPr lang="ru-RU" sz="2400" dirty="0">
               <a:solidFill>
@@ -3773,8 +4153,8 @@
         </p:blipFill>
         <p:spPr bwMode="auto">
           <a:xfrm>
-            <a:off x="5799773" y="1398113"/>
-            <a:ext cx="5823979" cy="1553061"/>
+            <a:off x="7433454" y="4625647"/>
+            <a:ext cx="4053951" cy="1081054"/>
           </a:xfrm>
           <a:prstGeom prst="rect">
             <a:avLst/>
@@ -3820,8 +4200,8 @@
         </p:blipFill>
         <p:spPr bwMode="auto">
           <a:xfrm>
-            <a:off x="6536121" y="3774504"/>
-            <a:ext cx="4351281" cy="2216307"/>
+            <a:off x="8062166" y="1811345"/>
+            <a:ext cx="3028836" cy="1542725"/>
           </a:xfrm>
           <a:prstGeom prst="rect">
             <a:avLst/>
@@ -3852,8 +4232,8 @@
         </p:nvSpPr>
         <p:spPr>
           <a:xfrm>
-            <a:off x="838200" y="3543830"/>
-            <a:ext cx="5257800" cy="2677656"/>
+            <a:off x="838200" y="2351874"/>
+            <a:ext cx="5257800" cy="461665"/>
           </a:xfrm>
           <a:prstGeom prst="rect">
             <a:avLst/>
@@ -3893,7 +4273,17 @@
                   </a:schemeClr>
                 </a:solidFill>
               </a:rPr>
-              <a:t>– это интерфейс, который абстрагирует таблицу в БД и позволяет выполнять все необходимые задачи по хранению и обработке данных с помощью привычного разработчику языка программирования. </a:t>
+              <a:t>с помощью </a:t>
+            </a:r>
+            <a:r>
+              <a:rPr lang="en-US" sz="2400" b="1" dirty="0">
+                <a:solidFill>
+                  <a:schemeClr val="accent1">
+                    <a:lumMod val="50000"/>
+                  </a:schemeClr>
+                </a:solidFill>
+              </a:rPr>
+              <a:t>Spring Data JPA</a:t>
             </a:r>
             <a:endParaRPr lang="ru-RU" sz="2400" dirty="0">
               <a:solidFill>
@@ -3902,6 +4292,43 @@
                 </a:schemeClr>
               </a:solidFill>
             </a:endParaRPr>
+          </a:p>
+        </p:txBody>
+      </p:sp>
+      <p:sp>
+        <p:nvSpPr>
+          <p:cNvPr id="10" name="TextBox 9">
+            <a:extLst>
+              <a:ext uri="{FF2B5EF4-FFF2-40B4-BE49-F238E27FC236}">
+                <a16:creationId xmlns:a16="http://schemas.microsoft.com/office/drawing/2014/main" id="{BC1F4526-FDBC-17DD-4489-805F5D1BF70E}"/>
+              </a:ext>
+            </a:extLst>
+          </p:cNvPr>
+          <p:cNvSpPr txBox="1"/>
+          <p:nvPr/>
+        </p:nvSpPr>
+        <p:spPr>
+          <a:xfrm>
+            <a:off x="11660697" y="0"/>
+            <a:ext cx="531303" cy="461665"/>
+          </a:xfrm>
+          <a:prstGeom prst="rect">
+            <a:avLst/>
+          </a:prstGeom>
+          <a:noFill/>
+        </p:spPr>
+        <p:txBody>
+          <a:bodyPr wrap="square" rtlCol="0">
+            <a:spAutoFit/>
+          </a:bodyPr>
+          <a:lstStyle/>
+          <a:p>
+            <a:pPr algn="ctr"/>
+            <a:r>
+              <a:rPr lang="ru-RU" sz="2400" dirty="0"/>
+              <a:t>10</a:t>
+            </a:r>
+            <a:endParaRPr lang="en-RU" dirty="0"/>
           </a:p>
         </p:txBody>
       </p:sp>
@@ -4235,6 +4662,43 @@
           </a:extLst>
         </p:spPr>
       </p:pic>
+      <p:sp>
+        <p:nvSpPr>
+          <p:cNvPr id="8" name="TextBox 7">
+            <a:extLst>
+              <a:ext uri="{FF2B5EF4-FFF2-40B4-BE49-F238E27FC236}">
+                <a16:creationId xmlns:a16="http://schemas.microsoft.com/office/drawing/2014/main" id="{258EA106-4DC2-F372-6758-3A0D324DE2F5}"/>
+              </a:ext>
+            </a:extLst>
+          </p:cNvPr>
+          <p:cNvSpPr txBox="1"/>
+          <p:nvPr/>
+        </p:nvSpPr>
+        <p:spPr>
+          <a:xfrm>
+            <a:off x="11694253" y="0"/>
+            <a:ext cx="497747" cy="461665"/>
+          </a:xfrm>
+          <a:prstGeom prst="rect">
+            <a:avLst/>
+          </a:prstGeom>
+          <a:noFill/>
+        </p:spPr>
+        <p:txBody>
+          <a:bodyPr wrap="square" rtlCol="0">
+            <a:spAutoFit/>
+          </a:bodyPr>
+          <a:lstStyle/>
+          <a:p>
+            <a:pPr algn="ctr"/>
+            <a:r>
+              <a:rPr lang="ru-RU" sz="2400" dirty="0"/>
+              <a:t>11</a:t>
+            </a:r>
+            <a:endParaRPr lang="en-RU" dirty="0"/>
+          </a:p>
+        </p:txBody>
+      </p:sp>
     </p:spTree>
     <p:extLst>
       <p:ext uri="{BB962C8B-B14F-4D97-AF65-F5344CB8AC3E}">
@@ -4365,8 +4829,8 @@
         </p:nvSpPr>
         <p:spPr>
           <a:xfrm>
-            <a:off x="504915" y="2483538"/>
-            <a:ext cx="2451931" cy="2985433"/>
+            <a:off x="504915" y="2495444"/>
+            <a:ext cx="1769749" cy="2985433"/>
           </a:xfrm>
           <a:prstGeom prst="rect">
             <a:avLst/>
@@ -4483,12 +4947,49 @@
           </a:p>
         </p:txBody>
       </p:sp>
+      <p:sp>
+        <p:nvSpPr>
+          <p:cNvPr id="10" name="TextBox 9">
+            <a:extLst>
+              <a:ext uri="{FF2B5EF4-FFF2-40B4-BE49-F238E27FC236}">
+                <a16:creationId xmlns:a16="http://schemas.microsoft.com/office/drawing/2014/main" id="{F0BD1B17-9DD2-865F-C029-1846E761FB3B}"/>
+              </a:ext>
+            </a:extLst>
+          </p:cNvPr>
+          <p:cNvSpPr txBox="1"/>
+          <p:nvPr/>
+        </p:nvSpPr>
+        <p:spPr>
+          <a:xfrm>
+            <a:off x="11669087" y="0"/>
+            <a:ext cx="522914" cy="461665"/>
+          </a:xfrm>
+          <a:prstGeom prst="rect">
+            <a:avLst/>
+          </a:prstGeom>
+          <a:noFill/>
+        </p:spPr>
+        <p:txBody>
+          <a:bodyPr wrap="square" rtlCol="0">
+            <a:spAutoFit/>
+          </a:bodyPr>
+          <a:lstStyle/>
+          <a:p>
+            <a:pPr algn="ctr"/>
+            <a:r>
+              <a:rPr lang="ru-RU" sz="2400" dirty="0"/>
+              <a:t>12</a:t>
+            </a:r>
+            <a:endParaRPr lang="en-RU" dirty="0"/>
+          </a:p>
+        </p:txBody>
+      </p:sp>
       <p:pic>
         <p:nvPicPr>
-          <p:cNvPr id="8" name="Picture">
-            <a:extLst>
-              <a:ext uri="{FF2B5EF4-FFF2-40B4-BE49-F238E27FC236}">
-                <a16:creationId xmlns:a16="http://schemas.microsoft.com/office/drawing/2014/main" id="{26A69BFB-216B-4936-B0B3-3C615F2DBB95}"/>
+          <p:cNvPr id="4" name="Picture 3">
+            <a:extLst>
+              <a:ext uri="{FF2B5EF4-FFF2-40B4-BE49-F238E27FC236}">
+                <a16:creationId xmlns:a16="http://schemas.microsoft.com/office/drawing/2014/main" id="{049996B6-538B-8E1E-751B-84FB952716D5}"/>
               </a:ext>
             </a:extLst>
           </p:cNvPr>
@@ -4498,69 +4999,31 @@
           <p:nvPr/>
         </p:nvPicPr>
         <p:blipFill>
-          <a:blip r:embed="rId2"/>
+          <a:blip r:embed="rId2">
+            <a:extLst>
+              <a:ext uri="{28A0092B-C50C-407E-A947-70E740481C1C}">
+                <a14:useLocalDpi xmlns:a14="http://schemas.microsoft.com/office/drawing/2010/main" val="0"/>
+              </a:ext>
+            </a:extLst>
+          </a:blip>
           <a:stretch>
             <a:fillRect/>
           </a:stretch>
         </p:blipFill>
-        <p:spPr bwMode="auto">
-          <a:xfrm>
-            <a:off x="7511753" y="1342407"/>
-            <a:ext cx="4435029" cy="5335079"/>
+        <p:spPr>
+          <a:xfrm>
+            <a:off x="2274664" y="1934115"/>
+            <a:ext cx="9455033" cy="4108093"/>
           </a:xfrm>
           <a:prstGeom prst="rect">
             <a:avLst/>
           </a:prstGeom>
-          <a:noFill/>
-          <a:ln w="9525">
-            <a:noFill/>
-            <a:miter lim="800000"/>
-            <a:headEnd/>
-            <a:tailEnd/>
-          </a:ln>
-        </p:spPr>
-      </p:pic>
-      <p:pic>
-        <p:nvPicPr>
-          <p:cNvPr id="9" name="Picture">
-            <a:extLst>
-              <a:ext uri="{FF2B5EF4-FFF2-40B4-BE49-F238E27FC236}">
-                <a16:creationId xmlns:a16="http://schemas.microsoft.com/office/drawing/2014/main" id="{E42E9672-7539-F180-C0F1-AA720D2C47DB}"/>
-              </a:ext>
-            </a:extLst>
-          </p:cNvPr>
-          <p:cNvPicPr>
-            <a:picLocks noChangeAspect="1"/>
-          </p:cNvPicPr>
-          <p:nvPr/>
-        </p:nvPicPr>
-        <p:blipFill>
-          <a:blip r:embed="rId3"/>
-          <a:stretch>
-            <a:fillRect/>
-          </a:stretch>
-        </p:blipFill>
-        <p:spPr bwMode="auto">
-          <a:xfrm>
-            <a:off x="2667559" y="1342407"/>
-            <a:ext cx="4702741" cy="5267697"/>
-          </a:xfrm>
-          <a:prstGeom prst="rect">
-            <a:avLst/>
-          </a:prstGeom>
-          <a:noFill/>
-          <a:ln w="9525">
-            <a:noFill/>
-            <a:miter lim="800000"/>
-            <a:headEnd/>
-            <a:tailEnd/>
-          </a:ln>
         </p:spPr>
       </p:pic>
     </p:spTree>
     <p:extLst>
       <p:ext uri="{BB962C8B-B14F-4D97-AF65-F5344CB8AC3E}">
-        <p14:creationId xmlns:p14="http://schemas.microsoft.com/office/powerpoint/2010/main" val="4041772857"/>
+        <p14:creationId xmlns:p14="http://schemas.microsoft.com/office/powerpoint/2010/main" val="1792710534"/>
       </p:ext>
     </p:extLst>
   </p:cSld>
@@ -4622,7 +5085,7 @@
                   </a:schemeClr>
                 </a:solidFill>
               </a:rPr>
-              <a:t>ОГАНИЗАЦИЯ ПРОЦЕССА РАЗРАБОТКИ</a:t>
+              <a:t>ТЕХНИЧЕСКОЕ ЗАДАНИЕ</a:t>
             </a:r>
             <a:endParaRPr lang="ru-RU" b="1" dirty="0">
               <a:solidFill>
@@ -4675,67 +5138,47 @@
       </p:cxnSp>
       <p:sp>
         <p:nvSpPr>
-          <p:cNvPr id="6" name="Прямоугольник 5">
-            <a:extLst>
-              <a:ext uri="{FF2B5EF4-FFF2-40B4-BE49-F238E27FC236}">
-                <a16:creationId xmlns:a16="http://schemas.microsoft.com/office/drawing/2014/main" id="{18909AB4-1897-4155-93CB-3E6C1D7435ED}"/>
-              </a:ext>
-            </a:extLst>
-          </p:cNvPr>
-          <p:cNvSpPr/>
+          <p:cNvPr id="10" name="TextBox 9">
+            <a:extLst>
+              <a:ext uri="{FF2B5EF4-FFF2-40B4-BE49-F238E27FC236}">
+                <a16:creationId xmlns:a16="http://schemas.microsoft.com/office/drawing/2014/main" id="{F0BD1B17-9DD2-865F-C029-1846E761FB3B}"/>
+              </a:ext>
+            </a:extLst>
+          </p:cNvPr>
+          <p:cNvSpPr txBox="1"/>
           <p:nvPr/>
         </p:nvSpPr>
         <p:spPr>
           <a:xfrm>
-            <a:off x="1435359" y="1302609"/>
-            <a:ext cx="4660642" cy="461665"/>
+            <a:off x="11543251" y="0"/>
+            <a:ext cx="648750" cy="461665"/>
           </a:xfrm>
           <a:prstGeom prst="rect">
             <a:avLst/>
           </a:prstGeom>
-        </p:spPr>
-        <p:txBody>
-          <a:bodyPr wrap="square">
+          <a:noFill/>
+        </p:spPr>
+        <p:txBody>
+          <a:bodyPr wrap="square" rtlCol="0">
             <a:spAutoFit/>
           </a:bodyPr>
           <a:lstStyle/>
           <a:p>
-            <a:r>
-              <a:rPr lang="en-US" sz="2400" b="1" dirty="0">
-                <a:solidFill>
-                  <a:schemeClr val="accent1">
-                    <a:lumMod val="50000"/>
-                  </a:schemeClr>
-                </a:solidFill>
-              </a:rPr>
-              <a:t>Agile – </a:t>
-            </a:r>
-            <a:r>
-              <a:rPr lang="ru-RU" sz="2400" b="1" dirty="0">
-                <a:solidFill>
-                  <a:schemeClr val="accent1">
-                    <a:lumMod val="50000"/>
-                  </a:schemeClr>
-                </a:solidFill>
-              </a:rPr>
-              <a:t>итерации каждую неделю</a:t>
-            </a:r>
-            <a:endParaRPr lang="en-US" sz="2400" b="1" dirty="0">
-              <a:solidFill>
-                <a:schemeClr val="accent1">
-                  <a:lumMod val="50000"/>
-                </a:schemeClr>
-              </a:solidFill>
-            </a:endParaRPr>
+            <a:pPr algn="ctr"/>
+            <a:r>
+              <a:rPr lang="ru-RU" sz="2400" dirty="0"/>
+              <a:t>12а</a:t>
+            </a:r>
+            <a:endParaRPr lang="en-RU" dirty="0"/>
           </a:p>
         </p:txBody>
       </p:sp>
       <p:pic>
         <p:nvPicPr>
-          <p:cNvPr id="10" name="Picture">
-            <a:extLst>
-              <a:ext uri="{FF2B5EF4-FFF2-40B4-BE49-F238E27FC236}">
-                <a16:creationId xmlns:a16="http://schemas.microsoft.com/office/drawing/2014/main" id="{44BB384B-A5D2-E1F1-C56A-BAB1652F6DD0}"/>
+          <p:cNvPr id="4" name="Picture 3">
+            <a:extLst>
+              <a:ext uri="{FF2B5EF4-FFF2-40B4-BE49-F238E27FC236}">
+                <a16:creationId xmlns:a16="http://schemas.microsoft.com/office/drawing/2014/main" id="{4217B010-B772-5AEE-50E4-D5C0BD9E9D4B}"/>
               </a:ext>
             </a:extLst>
           </p:cNvPr>
@@ -4745,102 +5188,31 @@
           <p:nvPr/>
         </p:nvPicPr>
         <p:blipFill>
-          <a:blip r:embed="rId2"/>
+          <a:blip r:embed="rId2">
+            <a:extLst>
+              <a:ext uri="{28A0092B-C50C-407E-A947-70E740481C1C}">
+                <a14:useLocalDpi xmlns:a14="http://schemas.microsoft.com/office/drawing/2010/main" val="0"/>
+              </a:ext>
+            </a:extLst>
+          </a:blip>
           <a:stretch>
             <a:fillRect/>
           </a:stretch>
         </p:blipFill>
-        <p:spPr bwMode="auto">
-          <a:xfrm>
-            <a:off x="1435358" y="1995108"/>
-            <a:ext cx="9321283" cy="4405317"/>
+        <p:spPr>
+          <a:xfrm>
+            <a:off x="1997890" y="1293594"/>
+            <a:ext cx="8196219" cy="5480704"/>
           </a:xfrm>
           <a:prstGeom prst="rect">
             <a:avLst/>
           </a:prstGeom>
-          <a:noFill/>
-          <a:ln w="9525">
-            <a:noFill/>
-            <a:miter lim="800000"/>
-            <a:headEnd/>
-            <a:tailEnd/>
-          </a:ln>
         </p:spPr>
       </p:pic>
-      <p:sp>
-        <p:nvSpPr>
-          <p:cNvPr id="11" name="Прямоугольник 5">
-            <a:extLst>
-              <a:ext uri="{FF2B5EF4-FFF2-40B4-BE49-F238E27FC236}">
-                <a16:creationId xmlns:a16="http://schemas.microsoft.com/office/drawing/2014/main" id="{9739F317-3A0A-F851-67D9-839151054AAC}"/>
-              </a:ext>
-            </a:extLst>
-          </p:cNvPr>
-          <p:cNvSpPr/>
-          <p:nvPr/>
-        </p:nvSpPr>
-        <p:spPr>
-          <a:xfrm>
-            <a:off x="7524196" y="1302609"/>
-            <a:ext cx="3232445" cy="461665"/>
-          </a:xfrm>
-          <a:prstGeom prst="rect">
-            <a:avLst/>
-          </a:prstGeom>
-        </p:spPr>
-        <p:txBody>
-          <a:bodyPr wrap="square">
-            <a:spAutoFit/>
-          </a:bodyPr>
-          <a:lstStyle/>
-          <a:p>
-            <a:r>
-              <a:rPr lang="en-US" sz="2400" b="1" dirty="0">
-                <a:solidFill>
-                  <a:schemeClr val="accent1">
-                    <a:lumMod val="50000"/>
-                  </a:schemeClr>
-                </a:solidFill>
-              </a:rPr>
-              <a:t>Kanban</a:t>
-            </a:r>
-            <a:r>
-              <a:rPr lang="ru-RU" sz="2400" b="1" dirty="0">
-                <a:solidFill>
-                  <a:schemeClr val="accent1">
-                    <a:lumMod val="50000"/>
-                  </a:schemeClr>
-                </a:solidFill>
-              </a:rPr>
-              <a:t> – </a:t>
-            </a:r>
-            <a:r>
-              <a:rPr lang="ru-RU" sz="2400" b="1" dirty="0" err="1">
-                <a:solidFill>
-                  <a:schemeClr val="accent1">
-                    <a:lumMod val="50000"/>
-                  </a:schemeClr>
-                </a:solidFill>
-              </a:rPr>
-              <a:t>канбан</a:t>
-            </a:r>
-            <a:r>
-              <a:rPr lang="ru-RU" sz="2400" b="1" dirty="0">
-                <a:solidFill>
-                  <a:schemeClr val="accent1">
-                    <a:lumMod val="50000"/>
-                  </a:schemeClr>
-                </a:solidFill>
-              </a:rPr>
-              <a:t>-доска </a:t>
-            </a:r>
-          </a:p>
-        </p:txBody>
-      </p:sp>
     </p:spTree>
     <p:extLst>
       <p:ext uri="{BB962C8B-B14F-4D97-AF65-F5344CB8AC3E}">
-        <p14:creationId xmlns:p14="http://schemas.microsoft.com/office/powerpoint/2010/main" val="719757607"/>
+        <p14:creationId xmlns:p14="http://schemas.microsoft.com/office/powerpoint/2010/main" val="616035962"/>
       </p:ext>
     </p:extLst>
   </p:cSld>
@@ -4902,7 +5274,7 @@
                   </a:schemeClr>
                 </a:solidFill>
               </a:rPr>
-              <a:t>КОМПОНЕНТЫ ИНТЕРФЕЙСА</a:t>
+              <a:t>ОГАНИЗАЦИЯ ПРОЦЕССА РАЗРАБОТКИ</a:t>
             </a:r>
             <a:endParaRPr lang="ru-RU" b="1" dirty="0">
               <a:solidFill>
@@ -4967,8 +5339,8 @@
         </p:nvSpPr>
         <p:spPr>
           <a:xfrm>
-            <a:off x="7807720" y="5901589"/>
-            <a:ext cx="2103120" cy="400110"/>
+            <a:off x="1435359" y="1302609"/>
+            <a:ext cx="4660642" cy="461665"/>
           </a:xfrm>
           <a:prstGeom prst="rect">
             <a:avLst/>
@@ -4980,18 +5352,27 @@
           </a:bodyPr>
           <a:lstStyle/>
           <a:p>
-            <a:pPr algn="ctr"/>
-            <a:r>
-              <a:rPr lang="en-US" sz="2000" b="1" dirty="0" err="1">
+            <a:r>
+              <a:rPr lang="en-US" sz="2400" b="1" dirty="0">
                 <a:solidFill>
                   <a:schemeClr val="accent1">
                     <a:lumMod val="50000"/>
                   </a:schemeClr>
                 </a:solidFill>
               </a:rPr>
-              <a:t>ComboBox</a:t>
-            </a:r>
-            <a:endParaRPr lang="ru-RU" dirty="0">
+              <a:t>Agile – </a:t>
+            </a:r>
+            <a:r>
+              <a:rPr lang="ru-RU" sz="2400" b="1" dirty="0">
+                <a:solidFill>
+                  <a:schemeClr val="accent1">
+                    <a:lumMod val="50000"/>
+                  </a:schemeClr>
+                </a:solidFill>
+              </a:rPr>
+              <a:t>итерации каждую неделю</a:t>
+            </a:r>
+            <a:endParaRPr lang="en-US" sz="2400" b="1" dirty="0">
               <a:solidFill>
                 <a:schemeClr val="accent1">
                   <a:lumMod val="50000"/>
@@ -5003,10 +5384,10 @@
       </p:sp>
       <p:pic>
         <p:nvPicPr>
-          <p:cNvPr id="4" name="Рисунок 3">
-            <a:extLst>
-              <a:ext uri="{FF2B5EF4-FFF2-40B4-BE49-F238E27FC236}">
-                <a16:creationId xmlns:a16="http://schemas.microsoft.com/office/drawing/2014/main" id="{BBA634B8-0540-49D9-A920-A977FC68ABC8}"/>
+          <p:cNvPr id="10" name="Picture">
+            <a:extLst>
+              <a:ext uri="{FF2B5EF4-FFF2-40B4-BE49-F238E27FC236}">
+                <a16:creationId xmlns:a16="http://schemas.microsoft.com/office/drawing/2014/main" id="{44BB384B-A5D2-E1F1-C56A-BAB1652F6DD0}"/>
               </a:ext>
             </a:extLst>
           </p:cNvPr>
@@ -5021,254 +5402,134 @@
             <a:fillRect/>
           </a:stretch>
         </p:blipFill>
-        <p:spPr>
-          <a:xfrm>
-            <a:off x="838200" y="1436150"/>
-            <a:ext cx="4191000" cy="801437"/>
+        <p:spPr bwMode="auto">
+          <a:xfrm>
+            <a:off x="1435358" y="1995108"/>
+            <a:ext cx="9321283" cy="4405317"/>
           </a:xfrm>
           <a:prstGeom prst="rect">
             <a:avLst/>
           </a:prstGeom>
+          <a:noFill/>
+          <a:ln w="9525">
+            <a:noFill/>
+            <a:miter lim="800000"/>
+            <a:headEnd/>
+            <a:tailEnd/>
+          </a:ln>
         </p:spPr>
       </p:pic>
-      <p:pic>
-        <p:nvPicPr>
-          <p:cNvPr id="5" name="Рисунок 4">
-            <a:extLst>
-              <a:ext uri="{FF2B5EF4-FFF2-40B4-BE49-F238E27FC236}">
-                <a16:creationId xmlns:a16="http://schemas.microsoft.com/office/drawing/2014/main" id="{0D7C72FC-C6DC-4518-A400-079190A5487D}"/>
-              </a:ext>
-            </a:extLst>
-          </p:cNvPr>
-          <p:cNvPicPr>
-            <a:picLocks noChangeAspect="1"/>
-          </p:cNvPicPr>
+      <p:sp>
+        <p:nvSpPr>
+          <p:cNvPr id="11" name="Прямоугольник 5">
+            <a:extLst>
+              <a:ext uri="{FF2B5EF4-FFF2-40B4-BE49-F238E27FC236}">
+                <a16:creationId xmlns:a16="http://schemas.microsoft.com/office/drawing/2014/main" id="{9739F317-3A0A-F851-67D9-839151054AAC}"/>
+              </a:ext>
+            </a:extLst>
+          </p:cNvPr>
+          <p:cNvSpPr/>
           <p:nvPr/>
-        </p:nvPicPr>
-        <p:blipFill>
-          <a:blip r:embed="rId3"/>
-          <a:stretch>
-            <a:fillRect/>
-          </a:stretch>
-        </p:blipFill>
-        <p:spPr>
-          <a:xfrm>
-            <a:off x="838200" y="3295687"/>
-            <a:ext cx="4099560" cy="845941"/>
+        </p:nvSpPr>
+        <p:spPr>
+          <a:xfrm>
+            <a:off x="7524196" y="1302609"/>
+            <a:ext cx="3232445" cy="461665"/>
           </a:xfrm>
           <a:prstGeom prst="rect">
             <a:avLst/>
           </a:prstGeom>
         </p:spPr>
-      </p:pic>
-      <p:sp>
-        <p:nvSpPr>
-          <p:cNvPr id="10" name="Прямоугольник 9">
-            <a:extLst>
-              <a:ext uri="{FF2B5EF4-FFF2-40B4-BE49-F238E27FC236}">
-                <a16:creationId xmlns:a16="http://schemas.microsoft.com/office/drawing/2014/main" id="{D476531E-B0F1-47CE-B35F-23B387E54334}"/>
-              </a:ext>
-            </a:extLst>
-          </p:cNvPr>
-          <p:cNvSpPr/>
+        <p:txBody>
+          <a:bodyPr wrap="square">
+            <a:spAutoFit/>
+          </a:bodyPr>
+          <a:lstStyle/>
+          <a:p>
+            <a:r>
+              <a:rPr lang="en-US" sz="2400" b="1" dirty="0">
+                <a:solidFill>
+                  <a:schemeClr val="accent1">
+                    <a:lumMod val="50000"/>
+                  </a:schemeClr>
+                </a:solidFill>
+              </a:rPr>
+              <a:t>Kanban</a:t>
+            </a:r>
+            <a:r>
+              <a:rPr lang="ru-RU" sz="2400" b="1" dirty="0">
+                <a:solidFill>
+                  <a:schemeClr val="accent1">
+                    <a:lumMod val="50000"/>
+                  </a:schemeClr>
+                </a:solidFill>
+              </a:rPr>
+              <a:t> – </a:t>
+            </a:r>
+            <a:r>
+              <a:rPr lang="ru-RU" sz="2400" b="1" dirty="0" err="1">
+                <a:solidFill>
+                  <a:schemeClr val="accent1">
+                    <a:lumMod val="50000"/>
+                  </a:schemeClr>
+                </a:solidFill>
+              </a:rPr>
+              <a:t>канбан</a:t>
+            </a:r>
+            <a:r>
+              <a:rPr lang="ru-RU" sz="2400" b="1" dirty="0">
+                <a:solidFill>
+                  <a:schemeClr val="accent1">
+                    <a:lumMod val="50000"/>
+                  </a:schemeClr>
+                </a:solidFill>
+              </a:rPr>
+              <a:t>-доска </a:t>
+            </a:r>
+          </a:p>
+        </p:txBody>
+      </p:sp>
+      <p:sp>
+        <p:nvSpPr>
+          <p:cNvPr id="8" name="TextBox 7">
+            <a:extLst>
+              <a:ext uri="{FF2B5EF4-FFF2-40B4-BE49-F238E27FC236}">
+                <a16:creationId xmlns:a16="http://schemas.microsoft.com/office/drawing/2014/main" id="{A7146C8A-1BE8-BFD5-68A3-9730C4E7F079}"/>
+              </a:ext>
+            </a:extLst>
+          </p:cNvPr>
+          <p:cNvSpPr txBox="1"/>
           <p:nvPr/>
         </p:nvSpPr>
         <p:spPr>
           <a:xfrm>
-            <a:off x="1882140" y="2298665"/>
-            <a:ext cx="2103120" cy="400110"/>
+            <a:off x="11694253" y="0"/>
+            <a:ext cx="497747" cy="461665"/>
           </a:xfrm>
           <a:prstGeom prst="rect">
             <a:avLst/>
           </a:prstGeom>
-        </p:spPr>
-        <p:txBody>
-          <a:bodyPr wrap="square">
+          <a:noFill/>
+        </p:spPr>
+        <p:txBody>
+          <a:bodyPr wrap="square" rtlCol="0">
             <a:spAutoFit/>
           </a:bodyPr>
           <a:lstStyle/>
           <a:p>
             <a:pPr algn="ctr"/>
             <a:r>
-              <a:rPr lang="en-US" sz="2000" b="1" dirty="0" err="1">
-                <a:solidFill>
-                  <a:schemeClr val="accent1">
-                    <a:lumMod val="50000"/>
-                  </a:schemeClr>
-                </a:solidFill>
-              </a:rPr>
-              <a:t>TextField</a:t>
-            </a:r>
-            <a:endParaRPr lang="ru-RU" dirty="0">
-              <a:solidFill>
-                <a:schemeClr val="accent1">
-                  <a:lumMod val="50000"/>
-                </a:schemeClr>
-              </a:solidFill>
-            </a:endParaRPr>
-          </a:p>
-        </p:txBody>
-      </p:sp>
-      <p:sp>
-        <p:nvSpPr>
-          <p:cNvPr id="11" name="Прямоугольник 10">
-            <a:extLst>
-              <a:ext uri="{FF2B5EF4-FFF2-40B4-BE49-F238E27FC236}">
-                <a16:creationId xmlns:a16="http://schemas.microsoft.com/office/drawing/2014/main" id="{B9FE4DE7-CBF9-436F-9BCD-E998D25D1435}"/>
-              </a:ext>
-            </a:extLst>
-          </p:cNvPr>
-          <p:cNvSpPr/>
-          <p:nvPr/>
-        </p:nvSpPr>
-        <p:spPr>
-          <a:xfrm>
-            <a:off x="1836420" y="4226525"/>
-            <a:ext cx="2103120" cy="400110"/>
-          </a:xfrm>
-          <a:prstGeom prst="rect">
-            <a:avLst/>
-          </a:prstGeom>
-        </p:spPr>
-        <p:txBody>
-          <a:bodyPr wrap="square">
-            <a:spAutoFit/>
-          </a:bodyPr>
-          <a:lstStyle/>
-          <a:p>
-            <a:pPr algn="ctr"/>
-            <a:r>
-              <a:rPr lang="en-US" sz="2000" b="1" dirty="0" err="1">
-                <a:solidFill>
-                  <a:schemeClr val="accent1">
-                    <a:lumMod val="50000"/>
-                  </a:schemeClr>
-                </a:solidFill>
-              </a:rPr>
-              <a:t>DateField</a:t>
-            </a:r>
-            <a:endParaRPr lang="ru-RU" dirty="0">
-              <a:solidFill>
-                <a:schemeClr val="accent1">
-                  <a:lumMod val="50000"/>
-                </a:schemeClr>
-              </a:solidFill>
-            </a:endParaRPr>
-          </a:p>
-        </p:txBody>
-      </p:sp>
-      <p:pic>
-        <p:nvPicPr>
-          <p:cNvPr id="12" name="Рисунок 11">
-            <a:extLst>
-              <a:ext uri="{FF2B5EF4-FFF2-40B4-BE49-F238E27FC236}">
-                <a16:creationId xmlns:a16="http://schemas.microsoft.com/office/drawing/2014/main" id="{C387BAEE-2DD2-4C5B-AC67-170CBB09FE35}"/>
-              </a:ext>
-            </a:extLst>
-          </p:cNvPr>
-          <p:cNvPicPr>
-            <a:picLocks noChangeAspect="1"/>
-          </p:cNvPicPr>
-          <p:nvPr/>
-        </p:nvPicPr>
-        <p:blipFill>
-          <a:blip r:embed="rId4"/>
-          <a:stretch>
-            <a:fillRect/>
-          </a:stretch>
-        </p:blipFill>
-        <p:spPr>
-          <a:xfrm>
-            <a:off x="838200" y="4940770"/>
-            <a:ext cx="4099560" cy="846739"/>
-          </a:xfrm>
-          <a:prstGeom prst="rect">
-            <a:avLst/>
-          </a:prstGeom>
-        </p:spPr>
-      </p:pic>
-      <p:sp>
-        <p:nvSpPr>
-          <p:cNvPr id="15" name="Прямоугольник 14">
-            <a:extLst>
-              <a:ext uri="{FF2B5EF4-FFF2-40B4-BE49-F238E27FC236}">
-                <a16:creationId xmlns:a16="http://schemas.microsoft.com/office/drawing/2014/main" id="{0D243D85-959E-49F1-8EDB-92F8B3F6612A}"/>
-              </a:ext>
-            </a:extLst>
-          </p:cNvPr>
-          <p:cNvSpPr/>
-          <p:nvPr/>
-        </p:nvSpPr>
-        <p:spPr>
-          <a:xfrm>
-            <a:off x="1882140" y="5901589"/>
-            <a:ext cx="2103120" cy="400110"/>
-          </a:xfrm>
-          <a:prstGeom prst="rect">
-            <a:avLst/>
-          </a:prstGeom>
-        </p:spPr>
-        <p:txBody>
-          <a:bodyPr wrap="square">
-            <a:spAutoFit/>
-          </a:bodyPr>
-          <a:lstStyle/>
-          <a:p>
-            <a:pPr algn="ctr"/>
-            <a:r>
-              <a:rPr lang="en-US" sz="2000" b="1" dirty="0" err="1">
-                <a:solidFill>
-                  <a:schemeClr val="accent1">
-                    <a:lumMod val="50000"/>
-                  </a:schemeClr>
-                </a:solidFill>
-              </a:rPr>
-              <a:t>MoneyField</a:t>
-            </a:r>
-            <a:endParaRPr lang="ru-RU" dirty="0">
-              <a:solidFill>
-                <a:schemeClr val="accent1">
-                  <a:lumMod val="50000"/>
-                </a:schemeClr>
-              </a:solidFill>
-            </a:endParaRPr>
-          </a:p>
-        </p:txBody>
-      </p:sp>
-      <p:pic>
-        <p:nvPicPr>
-          <p:cNvPr id="14" name="Рисунок 13">
-            <a:extLst>
-              <a:ext uri="{FF2B5EF4-FFF2-40B4-BE49-F238E27FC236}">
-                <a16:creationId xmlns:a16="http://schemas.microsoft.com/office/drawing/2014/main" id="{C79AC156-B441-4305-8467-F34D9D8CCFA9}"/>
-              </a:ext>
-            </a:extLst>
-          </p:cNvPr>
-          <p:cNvPicPr>
-            <a:picLocks noChangeAspect="1"/>
-          </p:cNvPicPr>
-          <p:nvPr/>
-        </p:nvPicPr>
-        <p:blipFill>
-          <a:blip r:embed="rId5"/>
-          <a:stretch>
-            <a:fillRect/>
-          </a:stretch>
-        </p:blipFill>
-        <p:spPr>
-          <a:xfrm>
-            <a:off x="6096000" y="1436148"/>
-            <a:ext cx="5534380" cy="4351355"/>
-          </a:xfrm>
-          <a:prstGeom prst="rect">
-            <a:avLst/>
-          </a:prstGeom>
-        </p:spPr>
-      </p:pic>
+              <a:rPr lang="ru-RU" sz="2400" dirty="0"/>
+              <a:t>13</a:t>
+            </a:r>
+            <a:endParaRPr lang="en-RU" dirty="0"/>
+          </a:p>
+        </p:txBody>
+      </p:sp>
     </p:spTree>
     <p:extLst>
       <p:ext uri="{BB962C8B-B14F-4D97-AF65-F5344CB8AC3E}">
-        <p14:creationId xmlns:p14="http://schemas.microsoft.com/office/powerpoint/2010/main" val="3035227290"/>
+        <p14:creationId xmlns:p14="http://schemas.microsoft.com/office/powerpoint/2010/main" val="719757607"/>
       </p:ext>
     </p:extLst>
   </p:cSld>
@@ -5330,7 +5591,7 @@
                   </a:schemeClr>
                 </a:solidFill>
               </a:rPr>
-              <a:t>ФОРМЫ</a:t>
+              <a:t>КОМПОНЕНТЫ ИНТЕРФЕЙСА</a:t>
             </a:r>
             <a:endParaRPr lang="ru-RU" b="1" dirty="0">
               <a:solidFill>
@@ -5395,8 +5656,8 @@
         </p:nvSpPr>
         <p:spPr>
           <a:xfrm>
-            <a:off x="2981325" y="6240702"/>
-            <a:ext cx="6229350" cy="892552"/>
+            <a:off x="7807720" y="5901589"/>
+            <a:ext cx="2103120" cy="400110"/>
           </a:xfrm>
           <a:prstGeom prst="rect">
             <a:avLst/>
@@ -5410,26 +5671,16 @@
           <a:p>
             <a:pPr algn="ctr"/>
             <a:r>
-              <a:rPr lang="ru-RU" sz="2800" b="1" dirty="0">
+              <a:rPr lang="en-US" sz="2000" b="1" dirty="0" err="1">
                 <a:solidFill>
                   <a:schemeClr val="accent1">
                     <a:lumMod val="50000"/>
                   </a:schemeClr>
                 </a:solidFill>
               </a:rPr>
-              <a:t>Форма создания в модуле </a:t>
-            </a:r>
-            <a:r>
-              <a:rPr lang="en-US" sz="2800" b="1" dirty="0">
-                <a:solidFill>
-                  <a:schemeClr val="accent1">
-                    <a:lumMod val="50000"/>
-                  </a:schemeClr>
-                </a:solidFill>
-              </a:rPr>
-              <a:t>Clients </a:t>
-            </a:r>
-            <a:endParaRPr lang="ru-RU" sz="2400" b="1" dirty="0">
+              <a:t>ComboBox</a:t>
+            </a:r>
+            <a:endParaRPr lang="ru-RU" dirty="0">
               <a:solidFill>
                 <a:schemeClr val="accent1">
                   <a:lumMod val="50000"/>
@@ -5437,28 +5688,20 @@
               </a:solidFill>
             </a:endParaRPr>
           </a:p>
-          <a:p>
-            <a:pPr algn="ctr"/>
-            <a:endParaRPr lang="ru-RU" sz="2400" dirty="0">
-              <a:solidFill>
-                <a:schemeClr val="accent1">
-                  <a:lumMod val="50000"/>
-                </a:schemeClr>
-              </a:solidFill>
-            </a:endParaRPr>
-          </a:p>
         </p:txBody>
       </p:sp>
       <p:pic>
         <p:nvPicPr>
-          <p:cNvPr id="8" name="Picture">
-            <a:extLst>
-              <a:ext uri="{FF2B5EF4-FFF2-40B4-BE49-F238E27FC236}">
-                <a16:creationId xmlns:a16="http://schemas.microsoft.com/office/drawing/2014/main" id="{18B546F2-CE14-4667-9D2B-027E1DAD07F7}"/>
-              </a:ext>
-            </a:extLst>
-          </p:cNvPr>
-          <p:cNvPicPr/>
+          <p:cNvPr id="4" name="Рисунок 3">
+            <a:extLst>
+              <a:ext uri="{FF2B5EF4-FFF2-40B4-BE49-F238E27FC236}">
+                <a16:creationId xmlns:a16="http://schemas.microsoft.com/office/drawing/2014/main" id="{BBA634B8-0540-49D9-A920-A977FC68ABC8}"/>
+              </a:ext>
+            </a:extLst>
+          </p:cNvPr>
+          <p:cNvPicPr>
+            <a:picLocks noChangeAspect="1"/>
+          </p:cNvPicPr>
           <p:nvPr/>
         </p:nvPicPr>
         <p:blipFill>
@@ -5467,27 +5710,291 @@
             <a:fillRect/>
           </a:stretch>
         </p:blipFill>
-        <p:spPr bwMode="auto">
-          <a:xfrm>
-            <a:off x="2278221" y="1390648"/>
-            <a:ext cx="7635558" cy="4850093"/>
+        <p:spPr>
+          <a:xfrm>
+            <a:off x="838200" y="1436150"/>
+            <a:ext cx="4191000" cy="801437"/>
+          </a:xfrm>
+          <a:prstGeom prst="rect">
+            <a:avLst/>
+          </a:prstGeom>
+        </p:spPr>
+      </p:pic>
+      <p:pic>
+        <p:nvPicPr>
+          <p:cNvPr id="5" name="Рисунок 4">
+            <a:extLst>
+              <a:ext uri="{FF2B5EF4-FFF2-40B4-BE49-F238E27FC236}">
+                <a16:creationId xmlns:a16="http://schemas.microsoft.com/office/drawing/2014/main" id="{0D7C72FC-C6DC-4518-A400-079190A5487D}"/>
+              </a:ext>
+            </a:extLst>
+          </p:cNvPr>
+          <p:cNvPicPr>
+            <a:picLocks noChangeAspect="1"/>
+          </p:cNvPicPr>
+          <p:nvPr/>
+        </p:nvPicPr>
+        <p:blipFill>
+          <a:blip r:embed="rId3"/>
+          <a:stretch>
+            <a:fillRect/>
+          </a:stretch>
+        </p:blipFill>
+        <p:spPr>
+          <a:xfrm>
+            <a:off x="838200" y="3295687"/>
+            <a:ext cx="4099560" cy="845941"/>
+          </a:xfrm>
+          <a:prstGeom prst="rect">
+            <a:avLst/>
+          </a:prstGeom>
+        </p:spPr>
+      </p:pic>
+      <p:sp>
+        <p:nvSpPr>
+          <p:cNvPr id="10" name="Прямоугольник 9">
+            <a:extLst>
+              <a:ext uri="{FF2B5EF4-FFF2-40B4-BE49-F238E27FC236}">
+                <a16:creationId xmlns:a16="http://schemas.microsoft.com/office/drawing/2014/main" id="{D476531E-B0F1-47CE-B35F-23B387E54334}"/>
+              </a:ext>
+            </a:extLst>
+          </p:cNvPr>
+          <p:cNvSpPr/>
+          <p:nvPr/>
+        </p:nvSpPr>
+        <p:spPr>
+          <a:xfrm>
+            <a:off x="1882140" y="2298665"/>
+            <a:ext cx="2103120" cy="400110"/>
+          </a:xfrm>
+          <a:prstGeom prst="rect">
+            <a:avLst/>
+          </a:prstGeom>
+        </p:spPr>
+        <p:txBody>
+          <a:bodyPr wrap="square">
+            <a:spAutoFit/>
+          </a:bodyPr>
+          <a:lstStyle/>
+          <a:p>
+            <a:pPr algn="ctr"/>
+            <a:r>
+              <a:rPr lang="en-US" sz="2000" b="1" dirty="0" err="1">
+                <a:solidFill>
+                  <a:schemeClr val="accent1">
+                    <a:lumMod val="50000"/>
+                  </a:schemeClr>
+                </a:solidFill>
+              </a:rPr>
+              <a:t>TextField</a:t>
+            </a:r>
+            <a:endParaRPr lang="ru-RU" dirty="0">
+              <a:solidFill>
+                <a:schemeClr val="accent1">
+                  <a:lumMod val="50000"/>
+                </a:schemeClr>
+              </a:solidFill>
+            </a:endParaRPr>
+          </a:p>
+        </p:txBody>
+      </p:sp>
+      <p:sp>
+        <p:nvSpPr>
+          <p:cNvPr id="11" name="Прямоугольник 10">
+            <a:extLst>
+              <a:ext uri="{FF2B5EF4-FFF2-40B4-BE49-F238E27FC236}">
+                <a16:creationId xmlns:a16="http://schemas.microsoft.com/office/drawing/2014/main" id="{B9FE4DE7-CBF9-436F-9BCD-E998D25D1435}"/>
+              </a:ext>
+            </a:extLst>
+          </p:cNvPr>
+          <p:cNvSpPr/>
+          <p:nvPr/>
+        </p:nvSpPr>
+        <p:spPr>
+          <a:xfrm>
+            <a:off x="1836420" y="4226525"/>
+            <a:ext cx="2103120" cy="400110"/>
+          </a:xfrm>
+          <a:prstGeom prst="rect">
+            <a:avLst/>
+          </a:prstGeom>
+        </p:spPr>
+        <p:txBody>
+          <a:bodyPr wrap="square">
+            <a:spAutoFit/>
+          </a:bodyPr>
+          <a:lstStyle/>
+          <a:p>
+            <a:pPr algn="ctr"/>
+            <a:r>
+              <a:rPr lang="en-US" sz="2000" b="1" dirty="0" err="1">
+                <a:solidFill>
+                  <a:schemeClr val="accent1">
+                    <a:lumMod val="50000"/>
+                  </a:schemeClr>
+                </a:solidFill>
+              </a:rPr>
+              <a:t>DateField</a:t>
+            </a:r>
+            <a:endParaRPr lang="ru-RU" dirty="0">
+              <a:solidFill>
+                <a:schemeClr val="accent1">
+                  <a:lumMod val="50000"/>
+                </a:schemeClr>
+              </a:solidFill>
+            </a:endParaRPr>
+          </a:p>
+        </p:txBody>
+      </p:sp>
+      <p:pic>
+        <p:nvPicPr>
+          <p:cNvPr id="12" name="Рисунок 11">
+            <a:extLst>
+              <a:ext uri="{FF2B5EF4-FFF2-40B4-BE49-F238E27FC236}">
+                <a16:creationId xmlns:a16="http://schemas.microsoft.com/office/drawing/2014/main" id="{C387BAEE-2DD2-4C5B-AC67-170CBB09FE35}"/>
+              </a:ext>
+            </a:extLst>
+          </p:cNvPr>
+          <p:cNvPicPr>
+            <a:picLocks noChangeAspect="1"/>
+          </p:cNvPicPr>
+          <p:nvPr/>
+        </p:nvPicPr>
+        <p:blipFill>
+          <a:blip r:embed="rId4"/>
+          <a:stretch>
+            <a:fillRect/>
+          </a:stretch>
+        </p:blipFill>
+        <p:spPr>
+          <a:xfrm>
+            <a:off x="838200" y="4940770"/>
+            <a:ext cx="4099560" cy="846739"/>
+          </a:xfrm>
+          <a:prstGeom prst="rect">
+            <a:avLst/>
+          </a:prstGeom>
+        </p:spPr>
+      </p:pic>
+      <p:sp>
+        <p:nvSpPr>
+          <p:cNvPr id="15" name="Прямоугольник 14">
+            <a:extLst>
+              <a:ext uri="{FF2B5EF4-FFF2-40B4-BE49-F238E27FC236}">
+                <a16:creationId xmlns:a16="http://schemas.microsoft.com/office/drawing/2014/main" id="{0D243D85-959E-49F1-8EDB-92F8B3F6612A}"/>
+              </a:ext>
+            </a:extLst>
+          </p:cNvPr>
+          <p:cNvSpPr/>
+          <p:nvPr/>
+        </p:nvSpPr>
+        <p:spPr>
+          <a:xfrm>
+            <a:off x="1882140" y="5901589"/>
+            <a:ext cx="2103120" cy="400110"/>
+          </a:xfrm>
+          <a:prstGeom prst="rect">
+            <a:avLst/>
+          </a:prstGeom>
+        </p:spPr>
+        <p:txBody>
+          <a:bodyPr wrap="square">
+            <a:spAutoFit/>
+          </a:bodyPr>
+          <a:lstStyle/>
+          <a:p>
+            <a:pPr algn="ctr"/>
+            <a:r>
+              <a:rPr lang="en-US" sz="2000" b="1" dirty="0" err="1">
+                <a:solidFill>
+                  <a:schemeClr val="accent1">
+                    <a:lumMod val="50000"/>
+                  </a:schemeClr>
+                </a:solidFill>
+              </a:rPr>
+              <a:t>MoneyField</a:t>
+            </a:r>
+            <a:endParaRPr lang="ru-RU" dirty="0">
+              <a:solidFill>
+                <a:schemeClr val="accent1">
+                  <a:lumMod val="50000"/>
+                </a:schemeClr>
+              </a:solidFill>
+            </a:endParaRPr>
+          </a:p>
+        </p:txBody>
+      </p:sp>
+      <p:pic>
+        <p:nvPicPr>
+          <p:cNvPr id="14" name="Рисунок 13">
+            <a:extLst>
+              <a:ext uri="{FF2B5EF4-FFF2-40B4-BE49-F238E27FC236}">
+                <a16:creationId xmlns:a16="http://schemas.microsoft.com/office/drawing/2014/main" id="{C79AC156-B441-4305-8467-F34D9D8CCFA9}"/>
+              </a:ext>
+            </a:extLst>
+          </p:cNvPr>
+          <p:cNvPicPr>
+            <a:picLocks noChangeAspect="1"/>
+          </p:cNvPicPr>
+          <p:nvPr/>
+        </p:nvPicPr>
+        <p:blipFill>
+          <a:blip r:embed="rId5"/>
+          <a:stretch>
+            <a:fillRect/>
+          </a:stretch>
+        </p:blipFill>
+        <p:spPr>
+          <a:xfrm>
+            <a:off x="6096000" y="1436148"/>
+            <a:ext cx="5534380" cy="4351355"/>
+          </a:xfrm>
+          <a:prstGeom prst="rect">
+            <a:avLst/>
+          </a:prstGeom>
+        </p:spPr>
+      </p:pic>
+      <p:sp>
+        <p:nvSpPr>
+          <p:cNvPr id="13" name="TextBox 12">
+            <a:extLst>
+              <a:ext uri="{FF2B5EF4-FFF2-40B4-BE49-F238E27FC236}">
+                <a16:creationId xmlns:a16="http://schemas.microsoft.com/office/drawing/2014/main" id="{D150D134-A3DB-EDEE-1AB2-F7D715BC2077}"/>
+              </a:ext>
+            </a:extLst>
+          </p:cNvPr>
+          <p:cNvSpPr txBox="1"/>
+          <p:nvPr/>
+        </p:nvSpPr>
+        <p:spPr>
+          <a:xfrm>
+            <a:off x="11630381" y="0"/>
+            <a:ext cx="561620" cy="461665"/>
           </a:xfrm>
           <a:prstGeom prst="rect">
             <a:avLst/>
           </a:prstGeom>
           <a:noFill/>
-          <a:ln w="9525">
-            <a:noFill/>
-            <a:miter lim="800000"/>
-            <a:headEnd/>
-            <a:tailEnd/>
-          </a:ln>
-        </p:spPr>
-      </p:pic>
+        </p:spPr>
+        <p:txBody>
+          <a:bodyPr wrap="square" rtlCol="0">
+            <a:spAutoFit/>
+          </a:bodyPr>
+          <a:lstStyle/>
+          <a:p>
+            <a:pPr algn="ctr"/>
+            <a:r>
+              <a:rPr lang="ru-RU" sz="2400" dirty="0"/>
+              <a:t>14</a:t>
+            </a:r>
+            <a:endParaRPr lang="en-RU" dirty="0"/>
+          </a:p>
+        </p:txBody>
+      </p:sp>
     </p:spTree>
     <p:extLst>
       <p:ext uri="{BB962C8B-B14F-4D97-AF65-F5344CB8AC3E}">
-        <p14:creationId xmlns:p14="http://schemas.microsoft.com/office/powerpoint/2010/main" val="2035929151"/>
+        <p14:creationId xmlns:p14="http://schemas.microsoft.com/office/powerpoint/2010/main" val="3035227290"/>
       </p:ext>
     </p:extLst>
   </p:cSld>
@@ -5549,7 +6056,7 @@
                   </a:schemeClr>
                 </a:solidFill>
               </a:rPr>
-              <a:t>ФИНАЛЬНЫЙ ИНТЕРФЕЙС</a:t>
+              <a:t>ФОРМЫ</a:t>
             </a:r>
             <a:endParaRPr lang="ru-RU" b="1" dirty="0">
               <a:solidFill>
@@ -5600,46 +6107,150 @@
           </a:fontRef>
         </p:style>
       </p:cxnSp>
+      <p:sp>
+        <p:nvSpPr>
+          <p:cNvPr id="6" name="Прямоугольник 5">
+            <a:extLst>
+              <a:ext uri="{FF2B5EF4-FFF2-40B4-BE49-F238E27FC236}">
+                <a16:creationId xmlns:a16="http://schemas.microsoft.com/office/drawing/2014/main" id="{18909AB4-1897-4155-93CB-3E6C1D7435ED}"/>
+              </a:ext>
+            </a:extLst>
+          </p:cNvPr>
+          <p:cNvSpPr/>
+          <p:nvPr/>
+        </p:nvSpPr>
+        <p:spPr>
+          <a:xfrm>
+            <a:off x="2981325" y="6240702"/>
+            <a:ext cx="6229350" cy="892552"/>
+          </a:xfrm>
+          <a:prstGeom prst="rect">
+            <a:avLst/>
+          </a:prstGeom>
+        </p:spPr>
+        <p:txBody>
+          <a:bodyPr wrap="square">
+            <a:spAutoFit/>
+          </a:bodyPr>
+          <a:lstStyle/>
+          <a:p>
+            <a:pPr algn="ctr"/>
+            <a:r>
+              <a:rPr lang="ru-RU" sz="2800" b="1" dirty="0">
+                <a:solidFill>
+                  <a:schemeClr val="accent1">
+                    <a:lumMod val="50000"/>
+                  </a:schemeClr>
+                </a:solidFill>
+              </a:rPr>
+              <a:t>Форма создания в модуле </a:t>
+            </a:r>
+            <a:r>
+              <a:rPr lang="en-US" sz="2800" b="1" dirty="0">
+                <a:solidFill>
+                  <a:schemeClr val="accent1">
+                    <a:lumMod val="50000"/>
+                  </a:schemeClr>
+                </a:solidFill>
+              </a:rPr>
+              <a:t>Clients </a:t>
+            </a:r>
+            <a:endParaRPr lang="ru-RU" sz="2400" b="1" dirty="0">
+              <a:solidFill>
+                <a:schemeClr val="accent1">
+                  <a:lumMod val="50000"/>
+                </a:schemeClr>
+              </a:solidFill>
+            </a:endParaRPr>
+          </a:p>
+          <a:p>
+            <a:pPr algn="ctr"/>
+            <a:endParaRPr lang="ru-RU" sz="2400" dirty="0">
+              <a:solidFill>
+                <a:schemeClr val="accent1">
+                  <a:lumMod val="50000"/>
+                </a:schemeClr>
+              </a:solidFill>
+            </a:endParaRPr>
+          </a:p>
+        </p:txBody>
+      </p:sp>
       <p:pic>
         <p:nvPicPr>
-          <p:cNvPr id="9" name="Picture 8">
-            <a:extLst>
-              <a:ext uri="{FF2B5EF4-FFF2-40B4-BE49-F238E27FC236}">
-                <a16:creationId xmlns:a16="http://schemas.microsoft.com/office/drawing/2014/main" id="{85C2BFE4-ABCC-CAE2-53B6-353CA1E998BC}"/>
-              </a:ext>
-            </a:extLst>
-          </p:cNvPr>
-          <p:cNvPicPr>
-            <a:picLocks noChangeAspect="1"/>
-          </p:cNvPicPr>
+          <p:cNvPr id="8" name="Picture">
+            <a:extLst>
+              <a:ext uri="{FF2B5EF4-FFF2-40B4-BE49-F238E27FC236}">
+                <a16:creationId xmlns:a16="http://schemas.microsoft.com/office/drawing/2014/main" id="{18B546F2-CE14-4667-9D2B-027E1DAD07F7}"/>
+              </a:ext>
+            </a:extLst>
+          </p:cNvPr>
+          <p:cNvPicPr/>
           <p:nvPr/>
         </p:nvPicPr>
         <p:blipFill>
-          <a:blip r:embed="rId2">
-            <a:extLst>
-              <a:ext uri="{28A0092B-C50C-407E-A947-70E740481C1C}">
-                <a14:useLocalDpi xmlns:a14="http://schemas.microsoft.com/office/drawing/2010/main" val="0"/>
-              </a:ext>
-            </a:extLst>
-          </a:blip>
+          <a:blip r:embed="rId2"/>
           <a:stretch>
             <a:fillRect/>
           </a:stretch>
         </p:blipFill>
-        <p:spPr>
-          <a:xfrm>
-            <a:off x="945636" y="1303868"/>
-            <a:ext cx="10300727" cy="5469465"/>
+        <p:spPr bwMode="auto">
+          <a:xfrm>
+            <a:off x="2278221" y="1390648"/>
+            <a:ext cx="7635558" cy="4850093"/>
           </a:xfrm>
           <a:prstGeom prst="rect">
             <a:avLst/>
           </a:prstGeom>
+          <a:noFill/>
+          <a:ln w="9525">
+            <a:noFill/>
+            <a:miter lim="800000"/>
+            <a:headEnd/>
+            <a:tailEnd/>
+          </a:ln>
         </p:spPr>
       </p:pic>
+      <p:sp>
+        <p:nvSpPr>
+          <p:cNvPr id="9" name="TextBox 8">
+            <a:extLst>
+              <a:ext uri="{FF2B5EF4-FFF2-40B4-BE49-F238E27FC236}">
+                <a16:creationId xmlns:a16="http://schemas.microsoft.com/office/drawing/2014/main" id="{67580ED0-C8A5-9BDA-9785-7CC2084EC28D}"/>
+              </a:ext>
+            </a:extLst>
+          </p:cNvPr>
+          <p:cNvSpPr txBox="1"/>
+          <p:nvPr/>
+        </p:nvSpPr>
+        <p:spPr>
+          <a:xfrm>
+            <a:off x="11694253" y="0"/>
+            <a:ext cx="497747" cy="461665"/>
+          </a:xfrm>
+          <a:prstGeom prst="rect">
+            <a:avLst/>
+          </a:prstGeom>
+          <a:noFill/>
+        </p:spPr>
+        <p:txBody>
+          <a:bodyPr wrap="square" rtlCol="0">
+            <a:spAutoFit/>
+          </a:bodyPr>
+          <a:lstStyle/>
+          <a:p>
+            <a:pPr algn="ctr"/>
+            <a:r>
+              <a:rPr lang="ru-RU" sz="2400" dirty="0"/>
+              <a:t>15</a:t>
+            </a:r>
+            <a:endParaRPr lang="en-RU" dirty="0"/>
+          </a:p>
+        </p:txBody>
+      </p:sp>
     </p:spTree>
     <p:extLst>
       <p:ext uri="{BB962C8B-B14F-4D97-AF65-F5344CB8AC3E}">
-        <p14:creationId xmlns:p14="http://schemas.microsoft.com/office/powerpoint/2010/main" val="3206839243"/>
+        <p14:creationId xmlns:p14="http://schemas.microsoft.com/office/powerpoint/2010/main" val="2035929151"/>
       </p:ext>
     </p:extLst>
   </p:cSld>
@@ -5689,22 +6300,27 @@
           </a:xfrm>
         </p:spPr>
         <p:txBody>
-          <a:bodyPr>
-            <a:normAutofit/>
-          </a:bodyPr>
+          <a:bodyPr/>
           <a:lstStyle/>
           <a:p>
             <a:pPr algn="ctr"/>
             <a:r>
-              <a:rPr lang="ru-RU" b="1" dirty="0">
+              <a:rPr lang="ru-RU" sz="4000" b="1" dirty="0">
                 <a:solidFill>
                   <a:schemeClr val="accent1">
                     <a:lumMod val="75000"/>
                   </a:schemeClr>
                 </a:solidFill>
               </a:rPr>
-              <a:t>ЗАКЛЮЧЕНИЕ</a:t>
-            </a:r>
+              <a:t>ФИНАЛЬНЫЙ ИНТЕРФЕЙС</a:t>
+            </a:r>
+            <a:endParaRPr lang="ru-RU" b="1" dirty="0">
+              <a:solidFill>
+                <a:schemeClr val="accent1">
+                  <a:lumMod val="75000"/>
+                </a:schemeClr>
+              </a:solidFill>
+            </a:endParaRPr>
           </a:p>
         </p:txBody>
       </p:sp>
@@ -5747,6 +6363,258 @@
           </a:fontRef>
         </p:style>
       </p:cxnSp>
+      <p:pic>
+        <p:nvPicPr>
+          <p:cNvPr id="9" name="Picture 8">
+            <a:extLst>
+              <a:ext uri="{FF2B5EF4-FFF2-40B4-BE49-F238E27FC236}">
+                <a16:creationId xmlns:a16="http://schemas.microsoft.com/office/drawing/2014/main" id="{85C2BFE4-ABCC-CAE2-53B6-353CA1E998BC}"/>
+              </a:ext>
+            </a:extLst>
+          </p:cNvPr>
+          <p:cNvPicPr>
+            <a:picLocks noChangeAspect="1"/>
+          </p:cNvPicPr>
+          <p:nvPr/>
+        </p:nvPicPr>
+        <p:blipFill>
+          <a:blip r:embed="rId2">
+            <a:extLst>
+              <a:ext uri="{28A0092B-C50C-407E-A947-70E740481C1C}">
+                <a14:useLocalDpi xmlns:a14="http://schemas.microsoft.com/office/drawing/2010/main" val="0"/>
+              </a:ext>
+            </a:extLst>
+          </a:blip>
+          <a:stretch>
+            <a:fillRect/>
+          </a:stretch>
+        </p:blipFill>
+        <p:spPr>
+          <a:xfrm>
+            <a:off x="1478126" y="1303870"/>
+            <a:ext cx="9235748" cy="4903984"/>
+          </a:xfrm>
+          <a:prstGeom prst="rect">
+            <a:avLst/>
+          </a:prstGeom>
+        </p:spPr>
+      </p:pic>
+      <p:sp>
+        <p:nvSpPr>
+          <p:cNvPr id="6" name="TextBox 5">
+            <a:extLst>
+              <a:ext uri="{FF2B5EF4-FFF2-40B4-BE49-F238E27FC236}">
+                <a16:creationId xmlns:a16="http://schemas.microsoft.com/office/drawing/2014/main" id="{1E233463-2CDD-9B08-F955-FACAAFD99BD3}"/>
+              </a:ext>
+            </a:extLst>
+          </p:cNvPr>
+          <p:cNvSpPr txBox="1"/>
+          <p:nvPr/>
+        </p:nvSpPr>
+        <p:spPr>
+          <a:xfrm>
+            <a:off x="11694253" y="0"/>
+            <a:ext cx="497747" cy="461665"/>
+          </a:xfrm>
+          <a:prstGeom prst="rect">
+            <a:avLst/>
+          </a:prstGeom>
+          <a:noFill/>
+        </p:spPr>
+        <p:txBody>
+          <a:bodyPr wrap="square" rtlCol="0">
+            <a:spAutoFit/>
+          </a:bodyPr>
+          <a:lstStyle/>
+          <a:p>
+            <a:pPr algn="ctr"/>
+            <a:r>
+              <a:rPr lang="ru-RU" sz="2400" dirty="0"/>
+              <a:t>16</a:t>
+            </a:r>
+            <a:endParaRPr lang="en-RU" dirty="0"/>
+          </a:p>
+        </p:txBody>
+      </p:sp>
+      <p:sp>
+        <p:nvSpPr>
+          <p:cNvPr id="8" name="Прямоугольник 5">
+            <a:extLst>
+              <a:ext uri="{FF2B5EF4-FFF2-40B4-BE49-F238E27FC236}">
+                <a16:creationId xmlns:a16="http://schemas.microsoft.com/office/drawing/2014/main" id="{670BCF55-1409-2FBE-7959-3C445F9BB1C3}"/>
+              </a:ext>
+            </a:extLst>
+          </p:cNvPr>
+          <p:cNvSpPr/>
+          <p:nvPr/>
+        </p:nvSpPr>
+        <p:spPr>
+          <a:xfrm>
+            <a:off x="1909762" y="6258396"/>
+            <a:ext cx="8372476" cy="892552"/>
+          </a:xfrm>
+          <a:prstGeom prst="rect">
+            <a:avLst/>
+          </a:prstGeom>
+        </p:spPr>
+        <p:txBody>
+          <a:bodyPr wrap="square">
+            <a:spAutoFit/>
+          </a:bodyPr>
+          <a:lstStyle/>
+          <a:p>
+            <a:pPr algn="ctr"/>
+            <a:r>
+              <a:rPr lang="ru-RU" sz="2800" b="1" dirty="0">
+                <a:solidFill>
+                  <a:schemeClr val="accent1">
+                    <a:lumMod val="50000"/>
+                  </a:schemeClr>
+                </a:solidFill>
+              </a:rPr>
+              <a:t>Финальный интерфейс на примере модуля </a:t>
+            </a:r>
+            <a:r>
+              <a:rPr lang="en-US" sz="2800" b="1" dirty="0">
+                <a:solidFill>
+                  <a:schemeClr val="accent1">
+                    <a:lumMod val="50000"/>
+                  </a:schemeClr>
+                </a:solidFill>
+              </a:rPr>
+              <a:t>Clients</a:t>
+            </a:r>
+            <a:endParaRPr lang="ru-RU" sz="2400" b="1" dirty="0">
+              <a:solidFill>
+                <a:schemeClr val="accent1">
+                  <a:lumMod val="50000"/>
+                </a:schemeClr>
+              </a:solidFill>
+            </a:endParaRPr>
+          </a:p>
+          <a:p>
+            <a:pPr algn="ctr"/>
+            <a:endParaRPr lang="ru-RU" sz="2400" dirty="0">
+              <a:solidFill>
+                <a:schemeClr val="accent1">
+                  <a:lumMod val="50000"/>
+                </a:schemeClr>
+              </a:solidFill>
+            </a:endParaRPr>
+          </a:p>
+        </p:txBody>
+      </p:sp>
+    </p:spTree>
+    <p:extLst>
+      <p:ext uri="{BB962C8B-B14F-4D97-AF65-F5344CB8AC3E}">
+        <p14:creationId xmlns:p14="http://schemas.microsoft.com/office/powerpoint/2010/main" val="3206839243"/>
+      </p:ext>
+    </p:extLst>
+  </p:cSld>
+  <p:clrMapOvr>
+    <a:masterClrMapping/>
+  </p:clrMapOvr>
+</p:sld>
+</file>
+
+<file path=ppt/slides/slide18.xml><?xml version="1.0" encoding="utf-8"?>
+<p:sld xmlns:a="http://schemas.openxmlformats.org/drawingml/2006/main" xmlns:r="http://schemas.openxmlformats.org/officeDocument/2006/relationships" xmlns:p="http://schemas.openxmlformats.org/presentationml/2006/main">
+  <p:cSld>
+    <p:spTree>
+      <p:nvGrpSpPr>
+        <p:cNvPr id="1" name=""/>
+        <p:cNvGrpSpPr/>
+        <p:nvPr/>
+      </p:nvGrpSpPr>
+      <p:grpSpPr>
+        <a:xfrm>
+          <a:off x="0" y="0"/>
+          <a:ext cx="0" cy="0"/>
+          <a:chOff x="0" y="0"/>
+          <a:chExt cx="0" cy="0"/>
+        </a:xfrm>
+      </p:grpSpPr>
+      <p:sp>
+        <p:nvSpPr>
+          <p:cNvPr id="2" name="Заголовок 1">
+            <a:extLst>
+              <a:ext uri="{FF2B5EF4-FFF2-40B4-BE49-F238E27FC236}">
+                <a16:creationId xmlns:a16="http://schemas.microsoft.com/office/drawing/2014/main" id="{ADA68195-9541-49B5-B54A-BE9A47B694A8}"/>
+              </a:ext>
+            </a:extLst>
+          </p:cNvPr>
+          <p:cNvSpPr>
+            <a:spLocks noGrp="1"/>
+          </p:cNvSpPr>
+          <p:nvPr>
+            <p:ph type="title"/>
+          </p:nvPr>
+        </p:nvSpPr>
+        <p:spPr>
+          <a:xfrm>
+            <a:off x="838200" y="-1"/>
+            <a:ext cx="10515600" cy="1169437"/>
+          </a:xfrm>
+        </p:spPr>
+        <p:txBody>
+          <a:bodyPr>
+            <a:normAutofit/>
+          </a:bodyPr>
+          <a:lstStyle/>
+          <a:p>
+            <a:pPr algn="ctr"/>
+            <a:r>
+              <a:rPr lang="ru-RU" b="1" dirty="0">
+                <a:solidFill>
+                  <a:schemeClr val="accent1">
+                    <a:lumMod val="75000"/>
+                  </a:schemeClr>
+                </a:solidFill>
+              </a:rPr>
+              <a:t>ЗАКЛЮЧЕНИЕ</a:t>
+            </a:r>
+          </a:p>
+        </p:txBody>
+      </p:sp>
+      <p:cxnSp>
+        <p:nvCxnSpPr>
+          <p:cNvPr id="7" name="Прямая соединительная линия 6">
+            <a:extLst>
+              <a:ext uri="{FF2B5EF4-FFF2-40B4-BE49-F238E27FC236}">
+                <a16:creationId xmlns:a16="http://schemas.microsoft.com/office/drawing/2014/main" id="{BEA8F852-A838-45C3-BAE1-6E4ED9623B53}"/>
+              </a:ext>
+            </a:extLst>
+          </p:cNvPr>
+          <p:cNvCxnSpPr>
+            <a:cxnSpLocks/>
+          </p:cNvCxnSpPr>
+          <p:nvPr/>
+        </p:nvCxnSpPr>
+        <p:spPr>
+          <a:xfrm>
+            <a:off x="0" y="1169438"/>
+            <a:ext cx="12192000" cy="0"/>
+          </a:xfrm>
+          <a:prstGeom prst="line">
+            <a:avLst/>
+          </a:prstGeom>
+          <a:ln/>
+        </p:spPr>
+        <p:style>
+          <a:lnRef idx="3">
+            <a:schemeClr val="accent1"/>
+          </a:lnRef>
+          <a:fillRef idx="0">
+            <a:schemeClr val="accent1"/>
+          </a:fillRef>
+          <a:effectRef idx="2">
+            <a:schemeClr val="accent1"/>
+          </a:effectRef>
+          <a:fontRef idx="minor">
+            <a:schemeClr val="tx1"/>
+          </a:fontRef>
+        </p:style>
+      </p:cxnSp>
       <p:sp>
         <p:nvSpPr>
           <p:cNvPr id="12" name="Объект 2">
@@ -5765,17 +6633,17 @@
         </p:nvSpPr>
         <p:spPr>
           <a:xfrm>
-            <a:off x="1412032" y="1960954"/>
-            <a:ext cx="9742714" cy="4290554"/>
+            <a:off x="1224643" y="2330069"/>
+            <a:ext cx="9742714" cy="3147934"/>
           </a:xfrm>
         </p:spPr>
         <p:txBody>
           <a:bodyPr>
-            <a:normAutofit lnSpcReduction="10000"/>
+            <a:normAutofit/>
           </a:bodyPr>
           <a:lstStyle/>
           <a:p>
-            <a:pPr marL="0" indent="0">
+            <a:pPr marL="0" indent="0" algn="ctr">
               <a:buNone/>
             </a:pPr>
             <a:r>
@@ -5786,11 +6654,56 @@
                   </a:schemeClr>
                 </a:solidFill>
               </a:rPr>
-              <a:t>Без CRM-систем в наше время способны функционировать только бизнесы, сделки которых исчисляются единицами. У любого бизнеса от малого до большого должна быть подобная система, настроенная и отточенная для максимального соответствия установленным практикам и бизнес-процессам.</a:t>
-            </a:r>
-          </a:p>
-          <a:p>
-            <a:pPr marL="0" indent="0">
+              <a:t>Проанализированы существующие системы.</a:t>
+            </a:r>
+          </a:p>
+          <a:p>
+            <a:pPr marL="0" indent="0" algn="ctr">
+              <a:buNone/>
+            </a:pPr>
+            <a:r>
+              <a:rPr lang="ru-RU" b="1" dirty="0">
+                <a:solidFill>
+                  <a:schemeClr val="accent1">
+                    <a:lumMod val="50000"/>
+                  </a:schemeClr>
+                </a:solidFill>
+              </a:rPr>
+              <a:t>Составлена архитектура.</a:t>
+            </a:r>
+          </a:p>
+          <a:p>
+            <a:pPr marL="0" indent="0" algn="ctr">
+              <a:buNone/>
+            </a:pPr>
+            <a:r>
+              <a:rPr lang="ru-RU" b="1" dirty="0">
+                <a:solidFill>
+                  <a:schemeClr val="accent1">
+                    <a:lumMod val="50000"/>
+                  </a:schemeClr>
+                </a:solidFill>
+              </a:rPr>
+              <a:t>Проанализированы и подобраны технологии.</a:t>
+            </a:r>
+          </a:p>
+          <a:p>
+            <a:pPr marL="0" indent="0" algn="ctr">
+              <a:buNone/>
+            </a:pPr>
+            <a:r>
+              <a:rPr lang="ru-RU" b="1" dirty="0">
+                <a:solidFill>
+                  <a:schemeClr val="accent1">
+                    <a:lumMod val="50000"/>
+                  </a:schemeClr>
+                </a:solidFill>
+              </a:rPr>
+              <a:t>Разработан каркас и программный конструктор.</a:t>
+            </a:r>
+          </a:p>
+          <a:p>
+            <a:pPr marL="0" indent="0" algn="ctr">
               <a:buNone/>
             </a:pPr>
             <a:endParaRPr lang="ru-RU" b="1" dirty="0">
@@ -5802,7 +6715,7 @@
             </a:endParaRPr>
           </a:p>
           <a:p>
-            <a:pPr marL="0" indent="0">
+            <a:pPr marL="0" indent="0" algn="ctr">
               <a:buNone/>
             </a:pPr>
             <a:r>
@@ -5813,7 +6726,7 @@
                   </a:schemeClr>
                 </a:solidFill>
               </a:rPr>
-              <a:t>Примененные технологии, шаблоны проектирования и практики позволили создать программный конструктор, который ускоряет и упрощает разработку </a:t>
+              <a:t>Готовое решение упрощает и ускоряет разработку</a:t>
             </a:r>
             <a:r>
               <a:rPr lang="en-US" b="1" dirty="0">
@@ -5823,18 +6736,52 @@
                   </a:schemeClr>
                 </a:solidFill>
               </a:rPr>
-              <a:t>CRM</a:t>
-            </a:r>
-            <a:r>
-              <a:rPr lang="ru-RU" b="1" dirty="0">
-                <a:solidFill>
-                  <a:schemeClr val="accent1">
-                    <a:lumMod val="50000"/>
-                  </a:schemeClr>
-                </a:solidFill>
-              </a:rPr>
-              <a:t>-систем, позволяя заботиться только о бизнес-логике.</a:t>
-            </a:r>
+              <a:t>.</a:t>
+            </a:r>
+            <a:endParaRPr lang="ru-RU" b="1" dirty="0">
+              <a:solidFill>
+                <a:schemeClr val="accent1">
+                  <a:lumMod val="50000"/>
+                </a:schemeClr>
+              </a:solidFill>
+            </a:endParaRPr>
+          </a:p>
+        </p:txBody>
+      </p:sp>
+      <p:sp>
+        <p:nvSpPr>
+          <p:cNvPr id="6" name="TextBox 5">
+            <a:extLst>
+              <a:ext uri="{FF2B5EF4-FFF2-40B4-BE49-F238E27FC236}">
+                <a16:creationId xmlns:a16="http://schemas.microsoft.com/office/drawing/2014/main" id="{F396B529-028C-27E9-E169-B11F867CBAB1}"/>
+              </a:ext>
+            </a:extLst>
+          </p:cNvPr>
+          <p:cNvSpPr txBox="1"/>
+          <p:nvPr/>
+        </p:nvSpPr>
+        <p:spPr>
+          <a:xfrm>
+            <a:off x="11685865" y="0"/>
+            <a:ext cx="506136" cy="461665"/>
+          </a:xfrm>
+          <a:prstGeom prst="rect">
+            <a:avLst/>
+          </a:prstGeom>
+          <a:noFill/>
+        </p:spPr>
+        <p:txBody>
+          <a:bodyPr wrap="square" rtlCol="0">
+            <a:spAutoFit/>
+          </a:bodyPr>
+          <a:lstStyle/>
+          <a:p>
+            <a:pPr algn="ctr"/>
+            <a:r>
+              <a:rPr lang="ru-RU" sz="2400" dirty="0"/>
+              <a:t>17</a:t>
+            </a:r>
+            <a:endParaRPr lang="en-RU" dirty="0"/>
           </a:p>
         </p:txBody>
       </p:sp>
@@ -5851,7 +6798,7 @@
 </p:sld>
 </file>
 
-<file path=ppt/slides/slide18.xml><?xml version="1.0" encoding="utf-8"?>
+<file path=ppt/slides/slide19.xml><?xml version="1.0" encoding="utf-8"?>
 <p:sld xmlns:a="http://schemas.openxmlformats.org/drawingml/2006/main" xmlns:r="http://schemas.openxmlformats.org/officeDocument/2006/relationships" xmlns:p="http://schemas.openxmlformats.org/presentationml/2006/main">
   <p:cSld>
     <p:spTree>
@@ -6007,13 +6954,13 @@
         </p:nvSpPr>
         <p:spPr>
           <a:xfrm>
-            <a:off x="838200" y="1408858"/>
-            <a:ext cx="10515600" cy="2559763"/>
+            <a:off x="838200" y="1969542"/>
+            <a:ext cx="10515600" cy="3834576"/>
           </a:xfrm>
         </p:spPr>
         <p:txBody>
           <a:bodyPr>
-            <a:normAutofit/>
+            <a:noAutofit/>
           </a:bodyPr>
           <a:lstStyle/>
           <a:p>
@@ -6021,54 +6968,74 @@
               <a:buNone/>
             </a:pPr>
             <a:r>
-              <a:rPr lang="ru-RU" b="1" dirty="0">
+              <a:rPr lang="ru-RU" sz="4000" b="1" dirty="0">
                 <a:solidFill>
                   <a:schemeClr val="accent1">
                     <a:lumMod val="50000"/>
                   </a:schemeClr>
                 </a:solidFill>
               </a:rPr>
-              <a:t>Определенные бизнес сферы требуют специфичные </a:t>
-            </a:r>
-            <a:r>
-              <a:rPr lang="en-US" b="1" dirty="0">
+              <a:t>Бизнесу требуется специфичные </a:t>
+            </a:r>
+            <a:r>
+              <a:rPr lang="en-GB" sz="4000" b="1" dirty="0">
                 <a:solidFill>
                   <a:schemeClr val="accent1">
                     <a:lumMod val="50000"/>
                   </a:schemeClr>
                 </a:solidFill>
               </a:rPr>
-              <a:t>CRM</a:t>
-            </a:r>
-            <a:r>
-              <a:rPr lang="ru-RU" b="1" dirty="0">
+              <a:t>CRM-</a:t>
+            </a:r>
+            <a:r>
+              <a:rPr lang="ru-RU" sz="4000" b="1" dirty="0">
                 <a:solidFill>
                   <a:schemeClr val="accent1">
                     <a:lumMod val="50000"/>
                   </a:schemeClr>
                 </a:solidFill>
               </a:rPr>
-              <a:t>-системы для автоматизации и учета взаимоотношений с клиентами, что в свою очередь вызывает необходимость в разработке внутренней </a:t>
-            </a:r>
-            <a:r>
-              <a:rPr lang="en-US" b="1" dirty="0">
+              <a:t>системы</a:t>
+            </a:r>
+            <a:r>
+              <a:rPr lang="en-US" sz="4000" b="1" dirty="0">
                 <a:solidFill>
                   <a:schemeClr val="accent1">
                     <a:lumMod val="50000"/>
                   </a:schemeClr>
                 </a:solidFill>
               </a:rPr>
-              <a:t>CRM</a:t>
-            </a:r>
-            <a:r>
-              <a:rPr lang="ru-RU" b="1" dirty="0">
+              <a:t>:</a:t>
+            </a:r>
+            <a:r>
+              <a:rPr lang="ru-RU" sz="4000" b="1" dirty="0">
                 <a:solidFill>
                   <a:schemeClr val="accent1">
                     <a:lumMod val="50000"/>
                   </a:schemeClr>
                 </a:solidFill>
               </a:rPr>
-              <a:t> системы.</a:t>
+              <a:t> разработка внутренних </a:t>
+            </a:r>
+            <a:r>
+              <a:rPr lang="en-GB" sz="4000" b="1" dirty="0">
+                <a:solidFill>
+                  <a:schemeClr val="accent1">
+                    <a:lumMod val="50000"/>
+                  </a:schemeClr>
+                </a:solidFill>
+              </a:rPr>
+              <a:t>CRM-</a:t>
+            </a:r>
+            <a:r>
+              <a:rPr lang="ru-RU" sz="4000" b="1" dirty="0">
+                <a:solidFill>
+                  <a:schemeClr val="accent1">
+                    <a:lumMod val="50000"/>
+                  </a:schemeClr>
+                </a:solidFill>
+              </a:rPr>
+              <a:t>систем</a:t>
             </a:r>
           </a:p>
           <a:p>
@@ -6076,199 +7043,85 @@
               <a:buNone/>
             </a:pPr>
             <a:r>
-              <a:rPr lang="ru-RU" b="1" dirty="0">
+              <a:rPr lang="ru-RU" sz="4000" b="1" dirty="0">
                 <a:solidFill>
                   <a:schemeClr val="accent1">
                     <a:lumMod val="50000"/>
                   </a:schemeClr>
                 </a:solidFill>
               </a:rPr>
-              <a:t>Также уход </a:t>
-            </a:r>
-            <a:r>
-              <a:rPr lang="en-US" b="1" dirty="0">
+              <a:t> </a:t>
+            </a:r>
+          </a:p>
+          <a:p>
+            <a:pPr marL="0" indent="0">
+              <a:buNone/>
+            </a:pPr>
+            <a:endParaRPr lang="ru-RU" sz="4000" b="1" dirty="0">
+              <a:solidFill>
+                <a:schemeClr val="accent1">
+                  <a:lumMod val="50000"/>
+                </a:schemeClr>
+              </a:solidFill>
+            </a:endParaRPr>
+          </a:p>
+          <a:p>
+            <a:pPr marL="0" indent="0">
+              <a:buNone/>
+            </a:pPr>
+            <a:r>
+              <a:rPr lang="ru-RU" sz="4000" b="1" dirty="0">
                 <a:solidFill>
                   <a:schemeClr val="accent1">
                     <a:lumMod val="50000"/>
                   </a:schemeClr>
                 </a:solidFill>
               </a:rPr>
+              <a:t>Уход </a:t>
+            </a:r>
+            <a:r>
+              <a:rPr lang="en-GB" sz="4000" b="1" dirty="0">
+                <a:solidFill>
+                  <a:schemeClr val="accent1">
+                    <a:lumMod val="50000"/>
+                  </a:schemeClr>
+                </a:solidFill>
+              </a:rPr>
               <a:t>IT </a:t>
             </a:r>
             <a:r>
-              <a:rPr lang="ru-RU" b="1" dirty="0">
+              <a:rPr lang="ru-RU" sz="4000" b="1" dirty="0">
                 <a:solidFill>
                   <a:schemeClr val="accent1">
                     <a:lumMod val="50000"/>
                   </a:schemeClr>
                 </a:solidFill>
               </a:rPr>
-              <a:t>гигантов из России значит уход популярных </a:t>
-            </a:r>
-            <a:r>
-              <a:rPr lang="en-US" b="1" dirty="0">
+              <a:t>гигантов из России</a:t>
+            </a:r>
+            <a:r>
+              <a:rPr lang="en-US" sz="4000" b="1" dirty="0">
                 <a:solidFill>
                   <a:schemeClr val="accent1">
                     <a:lumMod val="50000"/>
                   </a:schemeClr>
                 </a:solidFill>
               </a:rPr>
-              <a:t>CRM</a:t>
-            </a:r>
-            <a:r>
-              <a:rPr lang="ru-RU" b="1" dirty="0">
+              <a:t>:</a:t>
+            </a:r>
+            <a:r>
+              <a:rPr lang="ru-RU" sz="4000" b="1" dirty="0">
                 <a:solidFill>
                   <a:schemeClr val="accent1">
                     <a:lumMod val="50000"/>
                   </a:schemeClr>
                 </a:solidFill>
               </a:rPr>
-              <a:t> систем.</a:t>
-            </a:r>
-          </a:p>
-        </p:txBody>
-      </p:sp>
-      <p:pic>
-        <p:nvPicPr>
-          <p:cNvPr id="1026" name="Picture 2" descr="Salesforce — Википедия">
-            <a:extLst>
-              <a:ext uri="{FF2B5EF4-FFF2-40B4-BE49-F238E27FC236}">
-                <a16:creationId xmlns:a16="http://schemas.microsoft.com/office/drawing/2014/main" id="{36A75BA3-3180-434A-95E5-4D8C3757346B}"/>
-              </a:ext>
-            </a:extLst>
-          </p:cNvPr>
-          <p:cNvPicPr>
-            <a:picLocks noChangeAspect="1" noChangeArrowheads="1"/>
-          </p:cNvPicPr>
-          <p:nvPr/>
-        </p:nvPicPr>
-        <p:blipFill>
-          <a:blip r:embed="rId2">
-            <a:extLst>
-              <a:ext uri="{28A0092B-C50C-407E-A947-70E740481C1C}">
-                <a14:useLocalDpi xmlns:a14="http://schemas.microsoft.com/office/drawing/2010/main" val="0"/>
-              </a:ext>
-            </a:extLst>
-          </a:blip>
-          <a:srcRect/>
-          <a:stretch>
-            <a:fillRect/>
-          </a:stretch>
-        </p:blipFill>
-        <p:spPr bwMode="auto">
-          <a:xfrm>
-            <a:off x="696686" y="4186325"/>
-            <a:ext cx="2900687" cy="2030622"/>
-          </a:xfrm>
-          <a:prstGeom prst="rect">
-            <a:avLst/>
-          </a:prstGeom>
-          <a:noFill/>
-          <a:extLst>
-            <a:ext uri="{909E8E84-426E-40DD-AFC4-6F175D3DCCD1}">
-              <a14:hiddenFill xmlns:a14="http://schemas.microsoft.com/office/drawing/2010/main">
-                <a:solidFill>
-                  <a:srgbClr val="FFFFFF"/>
-                </a:solidFill>
-              </a14:hiddenFill>
-            </a:ext>
-          </a:extLst>
-        </p:spPr>
-      </p:pic>
-      <p:pic>
-        <p:nvPicPr>
-          <p:cNvPr id="1028" name="Picture 4">
-            <a:extLst>
-              <a:ext uri="{FF2B5EF4-FFF2-40B4-BE49-F238E27FC236}">
-                <a16:creationId xmlns:a16="http://schemas.microsoft.com/office/drawing/2014/main" id="{6B04A12A-CEC2-461C-9BF5-A5B9278046C4}"/>
-              </a:ext>
-            </a:extLst>
-          </p:cNvPr>
-          <p:cNvPicPr>
-            <a:picLocks noChangeAspect="1" noChangeArrowheads="1"/>
-          </p:cNvPicPr>
-          <p:nvPr/>
-        </p:nvPicPr>
-        <p:blipFill>
-          <a:blip r:embed="rId3">
-            <a:extLst>
-              <a:ext uri="{28A0092B-C50C-407E-A947-70E740481C1C}">
-                <a14:useLocalDpi xmlns:a14="http://schemas.microsoft.com/office/drawing/2010/main" val="0"/>
-              </a:ext>
-            </a:extLst>
-          </a:blip>
-          <a:srcRect/>
-          <a:stretch>
-            <a:fillRect/>
-          </a:stretch>
-        </p:blipFill>
-        <p:spPr bwMode="auto">
-          <a:xfrm>
-            <a:off x="3597373" y="3986712"/>
-            <a:ext cx="4322324" cy="2429847"/>
-          </a:xfrm>
-          <a:prstGeom prst="rect">
-            <a:avLst/>
-          </a:prstGeom>
-          <a:noFill/>
-          <a:extLst>
-            <a:ext uri="{909E8E84-426E-40DD-AFC4-6F175D3DCCD1}">
-              <a14:hiddenFill xmlns:a14="http://schemas.microsoft.com/office/drawing/2010/main">
-                <a:solidFill>
-                  <a:srgbClr val="FFFFFF"/>
-                </a:solidFill>
-              </a14:hiddenFill>
-            </a:ext>
-          </a:extLst>
-        </p:spPr>
-      </p:pic>
-      <p:pic>
-        <p:nvPicPr>
-          <p:cNvPr id="1030" name="Picture 6" descr="Freshworks - Maximum Customer Engagement - SMC Consulting">
-            <a:extLst>
-              <a:ext uri="{FF2B5EF4-FFF2-40B4-BE49-F238E27FC236}">
-                <a16:creationId xmlns:a16="http://schemas.microsoft.com/office/drawing/2014/main" id="{5CA5604C-7F49-4000-B886-A4080004D20A}"/>
-              </a:ext>
-            </a:extLst>
-          </p:cNvPr>
-          <p:cNvPicPr>
-            <a:picLocks noChangeAspect="1" noChangeArrowheads="1"/>
-          </p:cNvPicPr>
-          <p:nvPr/>
-        </p:nvPicPr>
-        <p:blipFill>
-          <a:blip r:embed="rId4">
-            <a:extLst>
-              <a:ext uri="{28A0092B-C50C-407E-A947-70E740481C1C}">
-                <a14:useLocalDpi xmlns:a14="http://schemas.microsoft.com/office/drawing/2010/main" val="0"/>
-              </a:ext>
-            </a:extLst>
-          </a:blip>
-          <a:srcRect/>
-          <a:stretch>
-            <a:fillRect/>
-          </a:stretch>
-        </p:blipFill>
-        <p:spPr bwMode="auto">
-          <a:xfrm>
-            <a:off x="7919697" y="4186325"/>
-            <a:ext cx="3810000" cy="1905000"/>
-          </a:xfrm>
-          <a:prstGeom prst="rect">
-            <a:avLst/>
-          </a:prstGeom>
-          <a:noFill/>
-          <a:extLst>
-            <a:ext uri="{909E8E84-426E-40DD-AFC4-6F175D3DCCD1}">
-              <a14:hiddenFill xmlns:a14="http://schemas.microsoft.com/office/drawing/2010/main">
-                <a:solidFill>
-                  <a:srgbClr val="FFFFFF"/>
-                </a:solidFill>
-              </a14:hiddenFill>
-            </a:ext>
-          </a:extLst>
-        </p:spPr>
-      </p:pic>
+              <a:t> потребность в замещении </a:t>
+            </a:r>
+          </a:p>
+        </p:txBody>
+      </p:sp>
       <p:cxnSp>
         <p:nvCxnSpPr>
           <p:cNvPr id="7" name="Прямая соединительная линия 6">
@@ -6308,6 +7161,43 @@
           </a:fontRef>
         </p:style>
       </p:cxnSp>
+      <p:sp>
+        <p:nvSpPr>
+          <p:cNvPr id="5" name="TextBox 4">
+            <a:extLst>
+              <a:ext uri="{FF2B5EF4-FFF2-40B4-BE49-F238E27FC236}">
+                <a16:creationId xmlns:a16="http://schemas.microsoft.com/office/drawing/2014/main" id="{5DEDFAAF-5BED-4166-6BF5-A7AF5E6A065E}"/>
+              </a:ext>
+            </a:extLst>
+          </p:cNvPr>
+          <p:cNvSpPr txBox="1"/>
+          <p:nvPr/>
+        </p:nvSpPr>
+        <p:spPr>
+          <a:xfrm>
+            <a:off x="11729697" y="0"/>
+            <a:ext cx="462303" cy="461665"/>
+          </a:xfrm>
+          <a:prstGeom prst="rect">
+            <a:avLst/>
+          </a:prstGeom>
+          <a:noFill/>
+        </p:spPr>
+        <p:txBody>
+          <a:bodyPr wrap="square" rtlCol="0">
+            <a:spAutoFit/>
+          </a:bodyPr>
+          <a:lstStyle/>
+          <a:p>
+            <a:pPr algn="ctr"/>
+            <a:r>
+              <a:rPr lang="ru-RU" sz="2400" dirty="0"/>
+              <a:t>2</a:t>
+            </a:r>
+            <a:endParaRPr lang="en-RU" sz="2400" dirty="0"/>
+          </a:p>
+        </p:txBody>
+      </p:sp>
     </p:spTree>
     <p:extLst>
       <p:ext uri="{BB962C8B-B14F-4D97-AF65-F5344CB8AC3E}">
@@ -6362,7 +7252,7 @@
         </p:spPr>
         <p:txBody>
           <a:bodyPr>
-            <a:normAutofit fontScale="90000"/>
+            <a:normAutofit/>
           </a:bodyPr>
           <a:lstStyle/>
           <a:p>
@@ -6375,7 +7265,7 @@
                   </a:schemeClr>
                 </a:solidFill>
               </a:rPr>
-              <a:t>ЗАДАЧИ ВЫПУСКНОЙ КВАЛИФИЦИРОВАННОЙ РАБОТЫ</a:t>
+              <a:t>ЗАДАЧИ РАБОТЫ</a:t>
             </a:r>
           </a:p>
         </p:txBody>
@@ -6437,7 +7327,7 @@
         </p:nvSpPr>
         <p:spPr>
           <a:xfrm>
-            <a:off x="1412032" y="1960954"/>
+            <a:off x="1621757" y="1734451"/>
             <a:ext cx="9742714" cy="4290554"/>
           </a:xfrm>
         </p:spPr>
@@ -6447,6 +7337,9 @@
           </a:bodyPr>
           <a:lstStyle/>
           <a:p>
+            <a:pPr marL="0" indent="0">
+              <a:buNone/>
+            </a:pPr>
             <a:r>
               <a:rPr lang="ru-RU" sz="4000" b="1" dirty="0">
                 <a:solidFill>
@@ -6486,6 +7379,9 @@
             </a:endParaRPr>
           </a:p>
           <a:p>
+            <a:pPr marL="0" indent="0">
+              <a:buNone/>
+            </a:pPr>
             <a:r>
               <a:rPr lang="ru-RU" sz="4000" b="1" dirty="0">
                 <a:solidFill>
@@ -6498,6 +7394,9 @@
             </a:r>
           </a:p>
           <a:p>
+            <a:pPr marL="0" indent="0">
+              <a:buNone/>
+            </a:pPr>
             <a:r>
               <a:rPr lang="ru-RU" sz="4000" b="1" dirty="0">
                 <a:solidFill>
@@ -6510,6 +7409,9 @@
             </a:r>
           </a:p>
           <a:p>
+            <a:pPr marL="0" indent="0">
+              <a:buNone/>
+            </a:pPr>
             <a:r>
               <a:rPr lang="ru-RU" sz="4000" b="1" dirty="0">
                 <a:solidFill>
@@ -6522,6 +7424,9 @@
             </a:r>
           </a:p>
           <a:p>
+            <a:pPr marL="0" indent="0">
+              <a:buNone/>
+            </a:pPr>
             <a:r>
               <a:rPr lang="ru-RU" sz="4000" b="1" dirty="0">
                 <a:solidFill>
@@ -6584,7 +7489,7 @@
         </p:blipFill>
         <p:spPr bwMode="auto">
           <a:xfrm>
-            <a:off x="680670" y="2016468"/>
+            <a:off x="890395" y="1789965"/>
             <a:ext cx="557662" cy="557662"/>
           </a:xfrm>
           <a:prstGeom prst="rect">
@@ -6631,7 +7536,7 @@
         </p:blipFill>
         <p:spPr bwMode="auto">
           <a:xfrm>
-            <a:off x="680669" y="2660280"/>
+            <a:off x="890394" y="2433777"/>
             <a:ext cx="557662" cy="557662"/>
           </a:xfrm>
           <a:prstGeom prst="rect">
@@ -6678,7 +7583,7 @@
         </p:blipFill>
         <p:spPr bwMode="auto">
           <a:xfrm>
-            <a:off x="680668" y="3364677"/>
+            <a:off x="890393" y="3138174"/>
             <a:ext cx="557662" cy="557662"/>
           </a:xfrm>
           <a:prstGeom prst="rect">
@@ -6725,7 +7630,7 @@
         </p:blipFill>
         <p:spPr bwMode="auto">
           <a:xfrm>
-            <a:off x="680667" y="4039623"/>
+            <a:off x="890392" y="3813120"/>
             <a:ext cx="557662" cy="557662"/>
           </a:xfrm>
           <a:prstGeom prst="rect">
@@ -6772,7 +7677,7 @@
         </p:blipFill>
         <p:spPr bwMode="auto">
           <a:xfrm>
-            <a:off x="680666" y="5216868"/>
+            <a:off x="890391" y="4990365"/>
             <a:ext cx="557662" cy="557662"/>
           </a:xfrm>
           <a:prstGeom prst="rect">
@@ -6790,6 +7695,43 @@
           </a:extLst>
         </p:spPr>
       </p:pic>
+      <p:sp>
+        <p:nvSpPr>
+          <p:cNvPr id="14" name="TextBox 13">
+            <a:extLst>
+              <a:ext uri="{FF2B5EF4-FFF2-40B4-BE49-F238E27FC236}">
+                <a16:creationId xmlns:a16="http://schemas.microsoft.com/office/drawing/2014/main" id="{DFC61A5C-C2DC-041A-FC74-662D4574CEB4}"/>
+              </a:ext>
+            </a:extLst>
+          </p:cNvPr>
+          <p:cNvSpPr txBox="1"/>
+          <p:nvPr/>
+        </p:nvSpPr>
+        <p:spPr>
+          <a:xfrm>
+            <a:off x="11729697" y="0"/>
+            <a:ext cx="462303" cy="461665"/>
+          </a:xfrm>
+          <a:prstGeom prst="rect">
+            <a:avLst/>
+          </a:prstGeom>
+          <a:noFill/>
+        </p:spPr>
+        <p:txBody>
+          <a:bodyPr wrap="square" rtlCol="0">
+            <a:spAutoFit/>
+          </a:bodyPr>
+          <a:lstStyle/>
+          <a:p>
+            <a:pPr algn="ctr"/>
+            <a:r>
+              <a:rPr lang="ru-RU" sz="2400" dirty="0"/>
+              <a:t>3</a:t>
+            </a:r>
+            <a:endParaRPr lang="en-RU" sz="2400" dirty="0"/>
+          </a:p>
+        </p:txBody>
+      </p:sp>
     </p:spTree>
     <p:extLst>
       <p:ext uri="{BB962C8B-B14F-4D97-AF65-F5344CB8AC3E}">
@@ -6843,12 +7785,14 @@
           </a:xfrm>
         </p:spPr>
         <p:txBody>
-          <a:bodyPr/>
+          <a:bodyPr>
+            <a:normAutofit/>
+          </a:bodyPr>
           <a:lstStyle/>
           <a:p>
             <a:pPr algn="ctr"/>
             <a:r>
-              <a:rPr lang="ru-RU" sz="4000" b="1" dirty="0">
+              <a:rPr lang="ru-RU" b="1" dirty="0">
                 <a:solidFill>
                   <a:schemeClr val="accent1">
                     <a:lumMod val="75000"/>
@@ -6858,7 +7802,7 @@
               <a:t>ТИПЫ </a:t>
             </a:r>
             <a:r>
-              <a:rPr lang="en-US" sz="4000" b="1" dirty="0">
+              <a:rPr lang="en-US" b="1" dirty="0">
                 <a:solidFill>
                   <a:schemeClr val="accent1">
                     <a:lumMod val="75000"/>
@@ -6868,7 +7812,7 @@
               <a:t>CRM</a:t>
             </a:r>
             <a:r>
-              <a:rPr lang="ru-RU" sz="4000" b="1" dirty="0">
+              <a:rPr lang="ru-RU" b="1" dirty="0">
                 <a:solidFill>
                   <a:schemeClr val="accent1">
                     <a:lumMod val="75000"/>
@@ -6877,7 +7821,7 @@
               </a:rPr>
               <a:t>-СИСТЕМ</a:t>
             </a:r>
-            <a:endParaRPr lang="ru-RU" b="1" dirty="0">
+            <a:endParaRPr lang="ru-RU" sz="4800" b="1" dirty="0">
               <a:solidFill>
                 <a:schemeClr val="accent1">
                   <a:lumMod val="75000"/>
@@ -6905,13 +7849,13 @@
         </p:nvSpPr>
         <p:spPr>
           <a:xfrm>
-            <a:off x="838200" y="1744760"/>
-            <a:ext cx="10515600" cy="4799099"/>
+            <a:off x="1515261" y="1896589"/>
+            <a:ext cx="9161477" cy="4018476"/>
           </a:xfrm>
         </p:spPr>
         <p:txBody>
           <a:bodyPr>
-            <a:normAutofit/>
+            <a:normAutofit lnSpcReduction="10000"/>
           </a:bodyPr>
           <a:lstStyle/>
           <a:p>
@@ -6923,7 +7867,7 @@
                   </a:schemeClr>
                 </a:solidFill>
               </a:rPr>
-              <a:t>Стратегические CRM – привлечение и удержание прибыльных клиентов</a:t>
+              <a:t>Стратегические CRM – привлечение и удержание</a:t>
             </a:r>
             <a:r>
               <a:rPr lang="en-US" sz="3200" b="1" dirty="0">
@@ -6933,8 +7877,27 @@
                   </a:schemeClr>
                 </a:solidFill>
               </a:rPr>
-              <a:t>;</a:t>
-            </a:r>
+              <a:t> </a:t>
+            </a:r>
+            <a:r>
+              <a:rPr lang="ru-RU" sz="3200" b="1" dirty="0">
+                <a:solidFill>
+                  <a:schemeClr val="accent1">
+                    <a:lumMod val="50000"/>
+                  </a:schemeClr>
+                </a:solidFill>
+              </a:rPr>
+              <a:t>клиентов</a:t>
+            </a:r>
+            <a:br>
+              <a:rPr lang="ru-RU" sz="3200" b="1" dirty="0">
+                <a:solidFill>
+                  <a:schemeClr val="accent1">
+                    <a:lumMod val="50000"/>
+                  </a:schemeClr>
+                </a:solidFill>
+              </a:rPr>
+            </a:br>
             <a:endParaRPr lang="ru-RU" sz="3200" b="1" dirty="0">
               <a:solidFill>
                 <a:schemeClr val="accent1">
@@ -6952,18 +7915,17 @@
                   </a:schemeClr>
                 </a:solidFill>
               </a:rPr>
-              <a:t>Операционные CRM – продажа, маркетинг и обслуживание клиентов</a:t>
-            </a:r>
-            <a:r>
-              <a:rPr lang="en-US" sz="3200" b="1" dirty="0">
+              <a:t>Операционные CRM – обслуживание</a:t>
+            </a:r>
+            <a:br>
+              <a:rPr lang="ru-RU" sz="3200" b="1" dirty="0">
                 <a:solidFill>
                   <a:schemeClr val="accent1">
                     <a:lumMod val="50000"/>
                   </a:schemeClr>
                 </a:solidFill>
               </a:rPr>
-              <a:t>;</a:t>
-            </a:r>
+            </a:br>
             <a:endParaRPr lang="ru-RU" sz="3200" b="1" dirty="0">
               <a:solidFill>
                 <a:schemeClr val="accent1">
@@ -6981,18 +7943,17 @@
                   </a:schemeClr>
                 </a:solidFill>
               </a:rPr>
-              <a:t>Аналитические CRM – сбор, интерпретация, разделение, хранение, изменение, обработка и представление данных, связанных с клиентом</a:t>
-            </a:r>
-            <a:r>
-              <a:rPr lang="en-US" sz="3200" b="1" dirty="0">
+              <a:t>Аналитические CRM – обработка данных</a:t>
+            </a:r>
+            <a:br>
+              <a:rPr lang="ru-RU" sz="3200" b="1" dirty="0">
                 <a:solidFill>
                   <a:schemeClr val="accent1">
                     <a:lumMod val="50000"/>
                   </a:schemeClr>
                 </a:solidFill>
               </a:rPr>
-              <a:t>;</a:t>
-            </a:r>
+            </a:br>
             <a:endParaRPr lang="ru-RU" sz="3200" b="1" dirty="0">
               <a:solidFill>
                 <a:schemeClr val="accent1">
@@ -7020,7 +7981,7 @@
                   </a:schemeClr>
                 </a:solidFill>
               </a:rPr>
-              <a:t> CRM – созданием платформы для объединения внешних заинтересованных сторон.</a:t>
+              <a:t> CRM – объединение заинтересованных сторон</a:t>
             </a:r>
           </a:p>
         </p:txBody>
@@ -7064,6 +8025,43 @@
           </a:fontRef>
         </p:style>
       </p:cxnSp>
+      <p:sp>
+        <p:nvSpPr>
+          <p:cNvPr id="6" name="TextBox 5">
+            <a:extLst>
+              <a:ext uri="{FF2B5EF4-FFF2-40B4-BE49-F238E27FC236}">
+                <a16:creationId xmlns:a16="http://schemas.microsoft.com/office/drawing/2014/main" id="{5D3A8448-7C57-6B71-7214-438EF73CDF2C}"/>
+              </a:ext>
+            </a:extLst>
+          </p:cNvPr>
+          <p:cNvSpPr txBox="1"/>
+          <p:nvPr/>
+        </p:nvSpPr>
+        <p:spPr>
+          <a:xfrm>
+            <a:off x="11729697" y="0"/>
+            <a:ext cx="462303" cy="461665"/>
+          </a:xfrm>
+          <a:prstGeom prst="rect">
+            <a:avLst/>
+          </a:prstGeom>
+          <a:noFill/>
+        </p:spPr>
+        <p:txBody>
+          <a:bodyPr wrap="square" rtlCol="0">
+            <a:spAutoFit/>
+          </a:bodyPr>
+          <a:lstStyle/>
+          <a:p>
+            <a:pPr algn="ctr"/>
+            <a:r>
+              <a:rPr lang="ru-RU" sz="2400" dirty="0"/>
+              <a:t>4</a:t>
+            </a:r>
+            <a:endParaRPr lang="en-RU" sz="2400" dirty="0"/>
+          </a:p>
+        </p:txBody>
+      </p:sp>
     </p:spTree>
     <p:extLst>
       <p:ext uri="{BB962C8B-B14F-4D97-AF65-F5344CB8AC3E}">
@@ -7213,8 +8211,8 @@
         </p:nvSpPr>
         <p:spPr>
           <a:xfrm>
-            <a:off x="957943" y="1886309"/>
-            <a:ext cx="8509518" cy="4290554"/>
+            <a:off x="1410949" y="1886309"/>
+            <a:ext cx="6508259" cy="4290554"/>
           </a:xfrm>
         </p:spPr>
         <p:txBody>
@@ -7231,11 +8229,9 @@
                   </a:schemeClr>
                 </a:solidFill>
               </a:rPr>
-              <a:t>Хранилище данных – система для хранения данных о клиенте;</a:t>
-            </a:r>
-          </a:p>
-          <a:p>
-            <a:r>
+              <a:t>Хранилище данных</a:t>
+            </a:r>
+            <a:br>
               <a:rPr lang="ru-RU" sz="4000" b="1" dirty="0">
                 <a:solidFill>
                   <a:schemeClr val="accent1">
@@ -7243,11 +8239,8 @@
                   </a:schemeClr>
                 </a:solidFill>
               </a:rPr>
-              <a:t>Прослойка бизнес-логики – система для обработки данных;</a:t>
-            </a:r>
-          </a:p>
-          <a:p>
-            <a:r>
+            </a:br>
+            <a:br>
               <a:rPr lang="ru-RU" sz="4000" b="1" dirty="0">
                 <a:solidFill>
                   <a:schemeClr val="accent1">
@@ -7255,7 +8248,62 @@
                   </a:schemeClr>
                 </a:solidFill>
               </a:rPr>
-              <a:t>Графический интерфейс – основной компонент для взаимодействия пользователя с системой.</a:t>
+            </a:br>
+            <a:endParaRPr lang="ru-RU" sz="4000" b="1" dirty="0">
+              <a:solidFill>
+                <a:schemeClr val="accent1">
+                  <a:lumMod val="50000"/>
+                </a:schemeClr>
+              </a:solidFill>
+            </a:endParaRPr>
+          </a:p>
+          <a:p>
+            <a:r>
+              <a:rPr lang="ru-RU" sz="4000" b="1" dirty="0">
+                <a:solidFill>
+                  <a:schemeClr val="accent1">
+                    <a:lumMod val="50000"/>
+                  </a:schemeClr>
+                </a:solidFill>
+              </a:rPr>
+              <a:t>Прослойка бизнес-логики</a:t>
+            </a:r>
+            <a:br>
+              <a:rPr lang="ru-RU" sz="4000" b="1" dirty="0">
+                <a:solidFill>
+                  <a:schemeClr val="accent1">
+                    <a:lumMod val="50000"/>
+                  </a:schemeClr>
+                </a:solidFill>
+              </a:rPr>
+            </a:br>
+            <a:br>
+              <a:rPr lang="ru-RU" sz="4000" b="1" dirty="0">
+                <a:solidFill>
+                  <a:schemeClr val="accent1">
+                    <a:lumMod val="50000"/>
+                  </a:schemeClr>
+                </a:solidFill>
+              </a:rPr>
+            </a:br>
+            <a:endParaRPr lang="ru-RU" sz="4000" b="1" dirty="0">
+              <a:solidFill>
+                <a:schemeClr val="accent1">
+                  <a:lumMod val="50000"/>
+                </a:schemeClr>
+              </a:solidFill>
+            </a:endParaRPr>
+          </a:p>
+          <a:p>
+            <a:r>
+              <a:rPr lang="ru-RU" sz="4000" b="1" dirty="0">
+                <a:solidFill>
+                  <a:schemeClr val="accent1">
+                    <a:lumMod val="50000"/>
+                  </a:schemeClr>
+                </a:solidFill>
+              </a:rPr>
+              <a:t>Графический интерфейс</a:t>
             </a:r>
           </a:p>
         </p:txBody>
@@ -7289,7 +8337,7 @@
         </p:blipFill>
         <p:spPr bwMode="auto">
           <a:xfrm>
-            <a:off x="9953620" y="2979576"/>
+            <a:off x="9165054" y="2979576"/>
             <a:ext cx="1446746" cy="1617323"/>
           </a:xfrm>
           <a:prstGeom prst="rect">
@@ -7335,7 +8383,7 @@
         </p:blipFill>
         <p:spPr>
           <a:xfrm>
-            <a:off x="9953620" y="4805159"/>
+            <a:off x="9165054" y="4805159"/>
             <a:ext cx="1446745" cy="1446745"/>
           </a:xfrm>
           <a:prstGeom prst="rect">
@@ -7371,7 +8419,7 @@
         </p:blipFill>
         <p:spPr>
           <a:xfrm>
-            <a:off x="9953619" y="1458565"/>
+            <a:off x="9165053" y="1458565"/>
             <a:ext cx="1446746" cy="1446746"/>
           </a:xfrm>
           <a:prstGeom prst="rect">
@@ -7379,6 +8427,43 @@
           </a:prstGeom>
         </p:spPr>
       </p:pic>
+      <p:sp>
+        <p:nvSpPr>
+          <p:cNvPr id="9" name="TextBox 8">
+            <a:extLst>
+              <a:ext uri="{FF2B5EF4-FFF2-40B4-BE49-F238E27FC236}">
+                <a16:creationId xmlns:a16="http://schemas.microsoft.com/office/drawing/2014/main" id="{4DFFB276-3057-8674-D06E-8801CB01EAA1}"/>
+              </a:ext>
+            </a:extLst>
+          </p:cNvPr>
+          <p:cNvSpPr txBox="1"/>
+          <p:nvPr/>
+        </p:nvSpPr>
+        <p:spPr>
+          <a:xfrm>
+            <a:off x="11729697" y="0"/>
+            <a:ext cx="462303" cy="461665"/>
+          </a:xfrm>
+          <a:prstGeom prst="rect">
+            <a:avLst/>
+          </a:prstGeom>
+          <a:noFill/>
+        </p:spPr>
+        <p:txBody>
+          <a:bodyPr wrap="square" rtlCol="0">
+            <a:spAutoFit/>
+          </a:bodyPr>
+          <a:lstStyle/>
+          <a:p>
+            <a:pPr algn="ctr"/>
+            <a:r>
+              <a:rPr lang="ru-RU" sz="2400" dirty="0"/>
+              <a:t>5</a:t>
+            </a:r>
+            <a:endParaRPr lang="en-RU" sz="2400" dirty="0"/>
+          </a:p>
+        </p:txBody>
+      </p:sp>
     </p:spTree>
     <p:extLst>
       <p:ext uri="{BB962C8B-B14F-4D97-AF65-F5344CB8AC3E}">
@@ -7511,8 +8596,8 @@
         </p:nvSpPr>
         <p:spPr>
           <a:xfrm>
-            <a:off x="541866" y="1859143"/>
-            <a:ext cx="5799465" cy="3539430"/>
+            <a:off x="3359478" y="5775782"/>
+            <a:ext cx="5473040" cy="584775"/>
           </a:xfrm>
           <a:prstGeom prst="rect">
             <a:avLst/>
@@ -7524,10 +8609,7 @@
           </a:bodyPr>
           <a:lstStyle/>
           <a:p>
-            <a:pPr marL="285750" indent="-285750">
-              <a:buFont typeface="Arial" panose="020B0604020202020204" pitchFamily="34" charset="0"/>
-              <a:buChar char="•"/>
-            </a:pPr>
+            <a:pPr algn="ctr"/>
             <a:r>
               <a:rPr lang="ru-RU" sz="3200" b="1" dirty="0" err="1">
                 <a:solidFill>
@@ -7556,102 +8638,6 @@
               </a:solidFill>
             </a:endParaRPr>
           </a:p>
-          <a:p>
-            <a:pPr marL="285750" indent="-285750">
-              <a:buFont typeface="Arial" panose="020B0604020202020204" pitchFamily="34" charset="0"/>
-              <a:buChar char="•"/>
-            </a:pPr>
-            <a:r>
-              <a:rPr lang="ru-RU" sz="3200" b="1" dirty="0">
-                <a:solidFill>
-                  <a:schemeClr val="accent1">
-                    <a:lumMod val="50000"/>
-                  </a:schemeClr>
-                </a:solidFill>
-              </a:rPr>
-              <a:t>Реляционная БД</a:t>
-            </a:r>
-          </a:p>
-          <a:p>
-            <a:pPr marL="285750" indent="-285750">
-              <a:buFont typeface="Arial" panose="020B0604020202020204" pitchFamily="34" charset="0"/>
-              <a:buChar char="•"/>
-            </a:pPr>
-            <a:r>
-              <a:rPr lang="en-US" sz="3200" b="1" dirty="0">
-                <a:solidFill>
-                  <a:schemeClr val="accent1">
-                    <a:lumMod val="50000"/>
-                  </a:schemeClr>
-                </a:solidFill>
-              </a:rPr>
-              <a:t>RESTful API</a:t>
-            </a:r>
-          </a:p>
-          <a:p>
-            <a:pPr marL="285750" indent="-285750">
-              <a:buFont typeface="Arial" panose="020B0604020202020204" pitchFamily="34" charset="0"/>
-              <a:buChar char="•"/>
-            </a:pPr>
-            <a:r>
-              <a:rPr lang="en-US" sz="3200" b="1" dirty="0">
-                <a:solidFill>
-                  <a:schemeClr val="accent1">
-                    <a:lumMod val="50000"/>
-                  </a:schemeClr>
-                </a:solidFill>
-              </a:rPr>
-              <a:t>MVC</a:t>
-            </a:r>
-          </a:p>
-          <a:p>
-            <a:pPr marL="285750" indent="-285750">
-              <a:buFont typeface="Arial" panose="020B0604020202020204" pitchFamily="34" charset="0"/>
-              <a:buChar char="•"/>
-            </a:pPr>
-            <a:r>
-              <a:rPr lang="en-US" sz="3200" b="1" dirty="0">
-                <a:solidFill>
-                  <a:schemeClr val="accent1">
-                    <a:lumMod val="50000"/>
-                  </a:schemeClr>
-                </a:solidFill>
-              </a:rPr>
-              <a:t>Repository Pattern</a:t>
-            </a:r>
-          </a:p>
-          <a:p>
-            <a:pPr marL="285750" indent="-285750">
-              <a:buFont typeface="Arial" panose="020B0604020202020204" pitchFamily="34" charset="0"/>
-              <a:buChar char="•"/>
-            </a:pPr>
-            <a:r>
-              <a:rPr lang="en-US" sz="3200" b="1" dirty="0">
-                <a:solidFill>
-                  <a:schemeClr val="accent1">
-                    <a:lumMod val="50000"/>
-                  </a:schemeClr>
-                </a:solidFill>
-              </a:rPr>
-              <a:t>SPA</a:t>
-            </a:r>
-            <a:endParaRPr lang="ru-RU" sz="3200" b="1" dirty="0">
-              <a:solidFill>
-                <a:schemeClr val="accent1">
-                  <a:lumMod val="50000"/>
-                </a:schemeClr>
-              </a:solidFill>
-            </a:endParaRPr>
-          </a:p>
-          <a:p>
-            <a:endParaRPr lang="en-US" sz="3200" b="1" dirty="0">
-              <a:solidFill>
-                <a:schemeClr val="accent1">
-                  <a:lumMod val="50000"/>
-                </a:schemeClr>
-              </a:solidFill>
-            </a:endParaRPr>
-          </a:p>
         </p:txBody>
       </p:sp>
       <p:pic>
@@ -7682,14 +8668,51 @@
         </p:blipFill>
         <p:spPr>
           <a:xfrm>
-            <a:off x="4105275" y="3136415"/>
-            <a:ext cx="7248525" cy="2771775"/>
+            <a:off x="700757" y="1648767"/>
+            <a:ext cx="10790482" cy="4126189"/>
           </a:xfrm>
           <a:prstGeom prst="rect">
             <a:avLst/>
           </a:prstGeom>
         </p:spPr>
       </p:pic>
+      <p:sp>
+        <p:nvSpPr>
+          <p:cNvPr id="8" name="TextBox 7">
+            <a:extLst>
+              <a:ext uri="{FF2B5EF4-FFF2-40B4-BE49-F238E27FC236}">
+                <a16:creationId xmlns:a16="http://schemas.microsoft.com/office/drawing/2014/main" id="{F2084BDD-95AA-1B5F-CF1A-8ECBAF9767E7}"/>
+              </a:ext>
+            </a:extLst>
+          </p:cNvPr>
+          <p:cNvSpPr txBox="1"/>
+          <p:nvPr/>
+        </p:nvSpPr>
+        <p:spPr>
+          <a:xfrm>
+            <a:off x="11729697" y="0"/>
+            <a:ext cx="462303" cy="461665"/>
+          </a:xfrm>
+          <a:prstGeom prst="rect">
+            <a:avLst/>
+          </a:prstGeom>
+          <a:noFill/>
+        </p:spPr>
+        <p:txBody>
+          <a:bodyPr wrap="square" rtlCol="0">
+            <a:spAutoFit/>
+          </a:bodyPr>
+          <a:lstStyle/>
+          <a:p>
+            <a:pPr algn="ctr"/>
+            <a:r>
+              <a:rPr lang="ru-RU" sz="2400" dirty="0"/>
+              <a:t>6</a:t>
+            </a:r>
+            <a:endParaRPr lang="en-RU" dirty="0"/>
+          </a:p>
+        </p:txBody>
+      </p:sp>
     </p:spTree>
     <p:extLst>
       <p:ext uri="{BB962C8B-B14F-4D97-AF65-F5344CB8AC3E}">
@@ -8005,6 +9028,43 @@
           </a:extLst>
         </p:spPr>
       </p:pic>
+      <p:sp>
+        <p:nvSpPr>
+          <p:cNvPr id="8" name="TextBox 7">
+            <a:extLst>
+              <a:ext uri="{FF2B5EF4-FFF2-40B4-BE49-F238E27FC236}">
+                <a16:creationId xmlns:a16="http://schemas.microsoft.com/office/drawing/2014/main" id="{30500B9F-D2A9-6CF0-099F-35DAB6399137}"/>
+              </a:ext>
+            </a:extLst>
+          </p:cNvPr>
+          <p:cNvSpPr txBox="1"/>
+          <p:nvPr/>
+        </p:nvSpPr>
+        <p:spPr>
+          <a:xfrm>
+            <a:off x="11729697" y="0"/>
+            <a:ext cx="462303" cy="461665"/>
+          </a:xfrm>
+          <a:prstGeom prst="rect">
+            <a:avLst/>
+          </a:prstGeom>
+          <a:noFill/>
+        </p:spPr>
+        <p:txBody>
+          <a:bodyPr wrap="square" rtlCol="0">
+            <a:spAutoFit/>
+          </a:bodyPr>
+          <a:lstStyle/>
+          <a:p>
+            <a:pPr algn="ctr"/>
+            <a:r>
+              <a:rPr lang="ru-RU" sz="2400" dirty="0"/>
+              <a:t>7</a:t>
+            </a:r>
+            <a:endParaRPr lang="en-RU" sz="2400" dirty="0"/>
+          </a:p>
+        </p:txBody>
+      </p:sp>
     </p:spTree>
     <p:extLst>
       <p:ext uri="{BB962C8B-B14F-4D97-AF65-F5344CB8AC3E}">
@@ -8150,8 +9210,8 @@
         </p:blipFill>
         <p:spPr bwMode="auto">
           <a:xfrm>
-            <a:off x="838200" y="1570734"/>
-            <a:ext cx="1129586" cy="2071227"/>
+            <a:off x="838200" y="1746697"/>
+            <a:ext cx="1033621" cy="1895264"/>
           </a:xfrm>
           <a:prstGeom prst="rect">
             <a:avLst/>
@@ -8197,8 +9257,8 @@
         </p:blipFill>
         <p:spPr bwMode="auto">
           <a:xfrm>
-            <a:off x="2791557" y="1291551"/>
-            <a:ext cx="5026088" cy="2513045"/>
+            <a:off x="2791557" y="1505050"/>
+            <a:ext cx="4599090" cy="2299546"/>
           </a:xfrm>
           <a:prstGeom prst="rect">
             <a:avLst/>
@@ -8230,7 +9290,7 @@
         <p:spPr>
           <a:xfrm>
             <a:off x="613775" y="1237860"/>
-            <a:ext cx="1107867" cy="369332"/>
+            <a:ext cx="1415580" cy="461665"/>
           </a:xfrm>
           <a:prstGeom prst="rect">
             <a:avLst/>
@@ -8243,7 +9303,7 @@
           <a:lstStyle/>
           <a:p>
             <a:r>
-              <a:rPr lang="en-US" b="1" dirty="0">
+              <a:rPr lang="en-US" sz="2400" b="1" dirty="0">
                 <a:solidFill>
                   <a:schemeClr val="accent1">
                     <a:lumMod val="50000"/>
@@ -8277,7 +9337,7 @@
         <p:spPr>
           <a:xfrm>
             <a:off x="613775" y="3858590"/>
-            <a:ext cx="1250022" cy="369332"/>
+            <a:ext cx="1605119" cy="461665"/>
           </a:xfrm>
           <a:prstGeom prst="rect">
             <a:avLst/>
@@ -8290,7 +9350,7 @@
           <a:lstStyle/>
           <a:p>
             <a:r>
-              <a:rPr lang="en-US" b="1" dirty="0">
+              <a:rPr lang="en-US" sz="2400" b="1" dirty="0">
                 <a:solidFill>
                   <a:schemeClr val="accent1">
                     <a:lumMod val="50000"/>
@@ -8338,8 +9398,8 @@
         </p:blipFill>
         <p:spPr bwMode="auto">
           <a:xfrm>
-            <a:off x="613775" y="4296346"/>
-            <a:ext cx="1862235" cy="1862235"/>
+            <a:off x="613776" y="4454553"/>
+            <a:ext cx="1704027" cy="1704027"/>
           </a:xfrm>
           <a:prstGeom prst="rect">
             <a:avLst/>
@@ -8385,8 +9445,8 @@
         </p:blipFill>
         <p:spPr bwMode="auto">
           <a:xfrm>
-            <a:off x="3831800" y="4345009"/>
-            <a:ext cx="2945603" cy="1764907"/>
+            <a:off x="3831800" y="4494948"/>
+            <a:ext cx="2695357" cy="1614968"/>
           </a:xfrm>
           <a:prstGeom prst="rect">
             <a:avLst/>
@@ -8432,8 +9492,8 @@
         </p:blipFill>
         <p:spPr bwMode="auto">
           <a:xfrm>
-            <a:off x="8338557" y="4513087"/>
-            <a:ext cx="3190875" cy="1428750"/>
+            <a:off x="8338557" y="4634467"/>
+            <a:ext cx="2919791" cy="1307369"/>
           </a:xfrm>
           <a:prstGeom prst="rect">
             <a:avLst/>
@@ -8479,8 +9539,8 @@
         </p:blipFill>
         <p:spPr bwMode="auto">
           <a:xfrm>
-            <a:off x="7478516" y="1748611"/>
-            <a:ext cx="4910956" cy="1715471"/>
+            <a:off x="7478516" y="1894350"/>
+            <a:ext cx="4493740" cy="1569731"/>
           </a:xfrm>
           <a:prstGeom prst="rect">
             <a:avLst/>
@@ -8497,6 +9557,43 @@
           </a:extLst>
         </p:spPr>
       </p:pic>
+      <p:sp>
+        <p:nvSpPr>
+          <p:cNvPr id="13" name="TextBox 12">
+            <a:extLst>
+              <a:ext uri="{FF2B5EF4-FFF2-40B4-BE49-F238E27FC236}">
+                <a16:creationId xmlns:a16="http://schemas.microsoft.com/office/drawing/2014/main" id="{E1D1D85B-CE25-7D5A-A46F-B44E20F59F72}"/>
+              </a:ext>
+            </a:extLst>
+          </p:cNvPr>
+          <p:cNvSpPr txBox="1"/>
+          <p:nvPr/>
+        </p:nvSpPr>
+        <p:spPr>
+          <a:xfrm>
+            <a:off x="11729697" y="0"/>
+            <a:ext cx="462303" cy="461665"/>
+          </a:xfrm>
+          <a:prstGeom prst="rect">
+            <a:avLst/>
+          </a:prstGeom>
+          <a:noFill/>
+        </p:spPr>
+        <p:txBody>
+          <a:bodyPr wrap="square" rtlCol="0">
+            <a:spAutoFit/>
+          </a:bodyPr>
+          <a:lstStyle/>
+          <a:p>
+            <a:pPr algn="ctr"/>
+            <a:r>
+              <a:rPr lang="ru-RU" sz="2400" dirty="0"/>
+              <a:t>8</a:t>
+            </a:r>
+            <a:endParaRPr lang="en-RU" dirty="0"/>
+          </a:p>
+        </p:txBody>
+      </p:sp>
     </p:spTree>
     <p:extLst>
       <p:ext uri="{BB962C8B-B14F-4D97-AF65-F5344CB8AC3E}">
@@ -8634,7 +9731,7 @@
         </p:blipFill>
         <p:spPr>
           <a:xfrm>
-            <a:off x="8518056" y="1497238"/>
+            <a:off x="506570" y="2688475"/>
             <a:ext cx="2159336" cy="2108409"/>
           </a:xfrm>
           <a:prstGeom prst="rect">
@@ -8670,7 +9767,7 @@
         </p:blipFill>
         <p:spPr>
           <a:xfrm>
-            <a:off x="8518056" y="3933452"/>
+            <a:off x="9526091" y="2663011"/>
             <a:ext cx="2159336" cy="2159336"/>
           </a:xfrm>
           <a:prstGeom prst="rect">
@@ -8692,7 +9789,7 @@
         </p:nvSpPr>
         <p:spPr>
           <a:xfrm>
-            <a:off x="838201" y="1753138"/>
+            <a:off x="3336064" y="1665496"/>
             <a:ext cx="5519871" cy="1200329"/>
           </a:xfrm>
           <a:prstGeom prst="rect">
@@ -8705,6 +9802,17 @@
           </a:bodyPr>
           <a:lstStyle/>
           <a:p>
+            <a:pPr algn="ctr"/>
+            <a:r>
+              <a:rPr lang="en-GB" sz="2400" b="1" dirty="0">
+                <a:solidFill>
+                  <a:schemeClr val="accent1">
+                    <a:lumMod val="50000"/>
+                  </a:schemeClr>
+                </a:solidFill>
+              </a:rPr>
+              <a:t>PostgreSQL </a:t>
+            </a:r>
             <a:r>
               <a:rPr lang="ru-RU" sz="2400" b="1" dirty="0">
                 <a:solidFill>
@@ -8713,7 +9821,80 @@
                   </a:schemeClr>
                 </a:solidFill>
               </a:rPr>
-              <a:t>Метод анализа иерархий с применением девятибалльной шкалы по следующим критериям</a:t>
+              <a:t>или </a:t>
+            </a:r>
+            <a:r>
+              <a:rPr lang="en-GB" sz="2400" b="1" dirty="0">
+                <a:solidFill>
+                  <a:schemeClr val="accent1">
+                    <a:lumMod val="50000"/>
+                  </a:schemeClr>
+                </a:solidFill>
+              </a:rPr>
+              <a:t>MySQL?</a:t>
+            </a:r>
+          </a:p>
+          <a:p>
+            <a:pPr algn="ctr"/>
+            <a:br>
+              <a:rPr lang="ru-RU" sz="2400" b="1" dirty="0">
+                <a:solidFill>
+                  <a:schemeClr val="accent1">
+                    <a:lumMod val="50000"/>
+                  </a:schemeClr>
+                </a:solidFill>
+              </a:rPr>
+            </a:br>
+            <a:r>
+              <a:rPr lang="ru-RU" sz="2400" b="1" dirty="0">
+                <a:solidFill>
+                  <a:schemeClr val="accent1">
+                    <a:lumMod val="50000"/>
+                  </a:schemeClr>
+                </a:solidFill>
+              </a:rPr>
+              <a:t>Метод анализа иерархий</a:t>
+            </a:r>
+          </a:p>
+        </p:txBody>
+      </p:sp>
+      <p:sp>
+        <p:nvSpPr>
+          <p:cNvPr id="29" name="Прямоугольник 5">
+            <a:extLst>
+              <a:ext uri="{FF2B5EF4-FFF2-40B4-BE49-F238E27FC236}">
+                <a16:creationId xmlns:a16="http://schemas.microsoft.com/office/drawing/2014/main" id="{08448AB2-6B6B-7AAF-4DCA-A9686388AFF3}"/>
+              </a:ext>
+            </a:extLst>
+          </p:cNvPr>
+          <p:cNvSpPr/>
+          <p:nvPr/>
+        </p:nvSpPr>
+        <p:spPr>
+          <a:xfrm>
+            <a:off x="3336062" y="2861523"/>
+            <a:ext cx="5519871" cy="2677656"/>
+          </a:xfrm>
+          <a:prstGeom prst="rect">
+            <a:avLst/>
+          </a:prstGeom>
+        </p:spPr>
+        <p:txBody>
+          <a:bodyPr wrap="square">
+            <a:spAutoFit/>
+          </a:bodyPr>
+          <a:lstStyle/>
+          <a:p>
+            <a:pPr algn="ctr"/>
+            <a:r>
+              <a:rPr lang="ru-RU" sz="2400" b="1" dirty="0">
+                <a:solidFill>
+                  <a:schemeClr val="accent1">
+                    <a:lumMod val="50000"/>
+                  </a:schemeClr>
+                </a:solidFill>
+              </a:rPr>
+              <a:t>Критерии</a:t>
             </a:r>
             <a:r>
               <a:rPr lang="en-US" sz="2400" b="1" dirty="0">
@@ -8724,6 +9905,141 @@
                 </a:solidFill>
               </a:rPr>
               <a:t>:</a:t>
+            </a:r>
+            <a:br>
+              <a:rPr lang="en-US" sz="2400" b="1" dirty="0">
+                <a:solidFill>
+                  <a:schemeClr val="accent1">
+                    <a:lumMod val="50000"/>
+                  </a:schemeClr>
+                </a:solidFill>
+              </a:rPr>
+            </a:br>
+            <a:r>
+              <a:rPr lang="ru-RU" sz="2400" b="1" dirty="0">
+                <a:solidFill>
+                  <a:schemeClr val="accent1">
+                    <a:lumMod val="50000"/>
+                  </a:schemeClr>
+                </a:solidFill>
+              </a:rPr>
+              <a:t>Архитектура</a:t>
+            </a:r>
+          </a:p>
+          <a:p>
+            <a:pPr algn="ctr"/>
+            <a:r>
+              <a:rPr lang="ru-RU" sz="2400" b="1" dirty="0">
+                <a:solidFill>
+                  <a:schemeClr val="accent1">
+                    <a:lumMod val="50000"/>
+                  </a:schemeClr>
+                </a:solidFill>
+              </a:rPr>
+              <a:t>Поддерживаемые типы данных</a:t>
+            </a:r>
+          </a:p>
+          <a:p>
+            <a:pPr algn="ctr"/>
+            <a:r>
+              <a:rPr lang="ru-RU" sz="2400" b="1" dirty="0">
+                <a:solidFill>
+                  <a:schemeClr val="accent1">
+                    <a:lumMod val="50000"/>
+                  </a:schemeClr>
+                </a:solidFill>
+              </a:rPr>
+              <a:t>Поддерживаемые индексы</a:t>
+            </a:r>
+          </a:p>
+          <a:p>
+            <a:pPr algn="ctr"/>
+            <a:r>
+              <a:rPr lang="ru-RU" sz="2400" b="1" dirty="0">
+                <a:solidFill>
+                  <a:schemeClr val="accent1">
+                    <a:lumMod val="50000"/>
+                  </a:schemeClr>
+                </a:solidFill>
+              </a:rPr>
+              <a:t>Производительность</a:t>
+            </a:r>
+          </a:p>
+          <a:p>
+            <a:pPr algn="ctr"/>
+            <a:r>
+              <a:rPr lang="ru-RU" sz="2400" b="1" dirty="0">
+                <a:solidFill>
+                  <a:schemeClr val="accent1">
+                    <a:lumMod val="50000"/>
+                  </a:schemeClr>
+                </a:solidFill>
+              </a:rPr>
+              <a:t>Безопасность</a:t>
+            </a:r>
+          </a:p>
+          <a:p>
+            <a:pPr algn="ctr"/>
+            <a:r>
+              <a:rPr lang="ru-RU" sz="2400" b="1" dirty="0">
+                <a:solidFill>
+                  <a:schemeClr val="accent1">
+                    <a:lumMod val="50000"/>
+                  </a:schemeClr>
+                </a:solidFill>
+              </a:rPr>
+              <a:t>Поддержка</a:t>
+            </a:r>
+          </a:p>
+        </p:txBody>
+      </p:sp>
+      <p:sp>
+        <p:nvSpPr>
+          <p:cNvPr id="30" name="Прямоугольник 5">
+            <a:extLst>
+              <a:ext uri="{FF2B5EF4-FFF2-40B4-BE49-F238E27FC236}">
+                <a16:creationId xmlns:a16="http://schemas.microsoft.com/office/drawing/2014/main" id="{940F0E0F-5B3E-72A9-AF44-826B8B211FFD}"/>
+              </a:ext>
+            </a:extLst>
+          </p:cNvPr>
+          <p:cNvSpPr/>
+          <p:nvPr/>
+        </p:nvSpPr>
+        <p:spPr>
+          <a:xfrm>
+            <a:off x="3336062" y="5534876"/>
+            <a:ext cx="5519871" cy="461665"/>
+          </a:xfrm>
+          <a:prstGeom prst="rect">
+            <a:avLst/>
+          </a:prstGeom>
+        </p:spPr>
+        <p:txBody>
+          <a:bodyPr wrap="square">
+            <a:spAutoFit/>
+          </a:bodyPr>
+          <a:lstStyle/>
+          <a:p>
+            <a:pPr algn="ctr"/>
+            <a:r>
+              <a:rPr lang="en-GB" sz="2400" b="1" dirty="0">
+                <a:solidFill>
+                  <a:schemeClr val="accent1">
+                    <a:lumMod val="50000"/>
+                  </a:schemeClr>
+                </a:solidFill>
+              </a:rPr>
+              <a:t>PostgreSQL</a:t>
+            </a:r>
+            <a:r>
+              <a:rPr lang="ru-RU" sz="2400" b="1" dirty="0">
+                <a:solidFill>
+                  <a:schemeClr val="accent1">
+                    <a:lumMod val="50000"/>
+                  </a:schemeClr>
+                </a:solidFill>
+              </a:rPr>
+              <a:t>!</a:t>
             </a:r>
             <a:endParaRPr lang="ru-RU" sz="2400" dirty="0">
               <a:solidFill>
@@ -8737,182 +10053,38 @@
       </p:sp>
       <p:sp>
         <p:nvSpPr>
-          <p:cNvPr id="29" name="Прямоугольник 5">
-            <a:extLst>
-              <a:ext uri="{FF2B5EF4-FFF2-40B4-BE49-F238E27FC236}">
-                <a16:creationId xmlns:a16="http://schemas.microsoft.com/office/drawing/2014/main" id="{08448AB2-6B6B-7AAF-4DCA-A9686388AFF3}"/>
-              </a:ext>
-            </a:extLst>
-          </p:cNvPr>
-          <p:cNvSpPr/>
+          <p:cNvPr id="10" name="TextBox 9">
+            <a:extLst>
+              <a:ext uri="{FF2B5EF4-FFF2-40B4-BE49-F238E27FC236}">
+                <a16:creationId xmlns:a16="http://schemas.microsoft.com/office/drawing/2014/main" id="{40573D9F-C58B-E83C-8AD6-22F2437F5972}"/>
+              </a:ext>
+            </a:extLst>
+          </p:cNvPr>
+          <p:cNvSpPr txBox="1"/>
           <p:nvPr/>
         </p:nvSpPr>
         <p:spPr>
           <a:xfrm>
-            <a:off x="838200" y="2953467"/>
-            <a:ext cx="5519871" cy="2308324"/>
+            <a:off x="11729697" y="0"/>
+            <a:ext cx="462303" cy="461665"/>
           </a:xfrm>
           <a:prstGeom prst="rect">
             <a:avLst/>
           </a:prstGeom>
-        </p:spPr>
-        <p:txBody>
-          <a:bodyPr wrap="square">
+          <a:noFill/>
+        </p:spPr>
+        <p:txBody>
+          <a:bodyPr wrap="square" rtlCol="0">
             <a:spAutoFit/>
           </a:bodyPr>
           <a:lstStyle/>
           <a:p>
-            <a:pPr marL="342900" indent="-342900">
-              <a:buFont typeface="Arial" panose="020B0604020202020204" pitchFamily="34" charset="0"/>
-              <a:buChar char="•"/>
-            </a:pPr>
-            <a:r>
-              <a:rPr lang="ru-RU" sz="2400" b="1" dirty="0">
-                <a:solidFill>
-                  <a:schemeClr val="accent1">
-                    <a:lumMod val="50000"/>
-                  </a:schemeClr>
-                </a:solidFill>
-              </a:rPr>
-              <a:t>Архитектура</a:t>
-            </a:r>
-          </a:p>
-          <a:p>
-            <a:pPr marL="342900" indent="-342900">
-              <a:buFont typeface="Arial" panose="020B0604020202020204" pitchFamily="34" charset="0"/>
-              <a:buChar char="•"/>
-            </a:pPr>
-            <a:r>
-              <a:rPr lang="ru-RU" sz="2400" b="1" dirty="0">
-                <a:solidFill>
-                  <a:schemeClr val="accent1">
-                    <a:lumMod val="50000"/>
-                  </a:schemeClr>
-                </a:solidFill>
-              </a:rPr>
-              <a:t>Поддерживаемые типы данных</a:t>
-            </a:r>
-          </a:p>
-          <a:p>
-            <a:pPr marL="342900" indent="-342900">
-              <a:buFont typeface="Arial" panose="020B0604020202020204" pitchFamily="34" charset="0"/>
-              <a:buChar char="•"/>
-            </a:pPr>
-            <a:r>
-              <a:rPr lang="ru-RU" sz="2400" b="1" dirty="0">
-                <a:solidFill>
-                  <a:schemeClr val="accent1">
-                    <a:lumMod val="50000"/>
-                  </a:schemeClr>
-                </a:solidFill>
-              </a:rPr>
-              <a:t>Поддерживаемые индексы</a:t>
-            </a:r>
-          </a:p>
-          <a:p>
-            <a:pPr marL="342900" indent="-342900">
-              <a:buFont typeface="Arial" panose="020B0604020202020204" pitchFamily="34" charset="0"/>
-              <a:buChar char="•"/>
-            </a:pPr>
-            <a:r>
-              <a:rPr lang="ru-RU" sz="2400" b="1" dirty="0">
-                <a:solidFill>
-                  <a:schemeClr val="accent1">
-                    <a:lumMod val="50000"/>
-                  </a:schemeClr>
-                </a:solidFill>
-              </a:rPr>
-              <a:t>Производительность</a:t>
-            </a:r>
-          </a:p>
-          <a:p>
-            <a:pPr marL="342900" indent="-342900">
-              <a:buFont typeface="Arial" panose="020B0604020202020204" pitchFamily="34" charset="0"/>
-              <a:buChar char="•"/>
-            </a:pPr>
-            <a:r>
-              <a:rPr lang="ru-RU" sz="2400" b="1" dirty="0">
-                <a:solidFill>
-                  <a:schemeClr val="accent1">
-                    <a:lumMod val="50000"/>
-                  </a:schemeClr>
-                </a:solidFill>
-              </a:rPr>
-              <a:t>Безопасность</a:t>
-            </a:r>
-          </a:p>
-          <a:p>
-            <a:pPr marL="342900" indent="-342900">
-              <a:buFont typeface="Arial" panose="020B0604020202020204" pitchFamily="34" charset="0"/>
-              <a:buChar char="•"/>
-            </a:pPr>
-            <a:r>
-              <a:rPr lang="ru-RU" sz="2400" b="1" dirty="0">
-                <a:solidFill>
-                  <a:schemeClr val="accent1">
-                    <a:lumMod val="50000"/>
-                  </a:schemeClr>
-                </a:solidFill>
-              </a:rPr>
-              <a:t>Поддержка</a:t>
-            </a:r>
-          </a:p>
-        </p:txBody>
-      </p:sp>
-      <p:sp>
-        <p:nvSpPr>
-          <p:cNvPr id="30" name="Прямоугольник 5">
-            <a:extLst>
-              <a:ext uri="{FF2B5EF4-FFF2-40B4-BE49-F238E27FC236}">
-                <a16:creationId xmlns:a16="http://schemas.microsoft.com/office/drawing/2014/main" id="{940F0E0F-5B3E-72A9-AF44-826B8B211FFD}"/>
-              </a:ext>
-            </a:extLst>
-          </p:cNvPr>
-          <p:cNvSpPr/>
-          <p:nvPr/>
-        </p:nvSpPr>
-        <p:spPr>
-          <a:xfrm>
-            <a:off x="838200" y="5261791"/>
-            <a:ext cx="5519871" cy="830997"/>
-          </a:xfrm>
-          <a:prstGeom prst="rect">
-            <a:avLst/>
-          </a:prstGeom>
-        </p:spPr>
-        <p:txBody>
-          <a:bodyPr wrap="square">
-            <a:spAutoFit/>
-          </a:bodyPr>
-          <a:lstStyle/>
-          <a:p>
-            <a:r>
-              <a:rPr lang="en-GB" sz="2400" b="1" dirty="0">
-                <a:solidFill>
-                  <a:schemeClr val="accent1">
-                    <a:lumMod val="50000"/>
-                  </a:schemeClr>
-                </a:solidFill>
-              </a:rPr>
-              <a:t>PostgreSQL </a:t>
-            </a:r>
-            <a:r>
-              <a:rPr lang="ru-RU" sz="2400" b="1" dirty="0">
-                <a:solidFill>
-                  <a:schemeClr val="accent1">
-                    <a:lumMod val="50000"/>
-                  </a:schemeClr>
-                </a:solidFill>
-              </a:rPr>
-              <a:t>является наиболее предпочтительным вариантом.</a:t>
-            </a:r>
-            <a:endParaRPr lang="ru-RU" sz="2400" dirty="0">
-              <a:solidFill>
-                <a:schemeClr val="accent1">
-                  <a:lumMod val="50000"/>
-                </a:schemeClr>
-              </a:solidFill>
-            </a:endParaRPr>
+            <a:pPr algn="ctr"/>
+            <a:r>
+              <a:rPr lang="ru-RU" sz="2400" dirty="0"/>
+              <a:t>9</a:t>
+            </a:r>
+            <a:endParaRPr lang="en-RU" dirty="0"/>
           </a:p>
         </p:txBody>
       </p:sp>
@@ -9222,4 +10394,299 @@
     </a:ext>
   </a:extLst>
 </a:theme>
+</file>
+
+<file path=ppt/theme/theme2.xml><?xml version="1.0" encoding="utf-8"?>
+<a:theme xmlns:a="http://schemas.openxmlformats.org/drawingml/2006/main" name="Office Theme">
+  <a:themeElements>
+    <a:clrScheme name="Office">
+      <a:dk1>
+        <a:sysClr val="windowText" lastClr="000000"/>
+      </a:dk1>
+      <a:lt1>
+        <a:sysClr val="window" lastClr="FFFFFF"/>
+      </a:lt1>
+      <a:dk2>
+        <a:srgbClr val="44546A"/>
+      </a:dk2>
+      <a:lt2>
+        <a:srgbClr val="E7E6E6"/>
+      </a:lt2>
+      <a:accent1>
+        <a:srgbClr val="4472C4"/>
+      </a:accent1>
+      <a:accent2>
+        <a:srgbClr val="ED7D31"/>
+      </a:accent2>
+      <a:accent3>
+        <a:srgbClr val="A5A5A5"/>
+      </a:accent3>
+      <a:accent4>
+        <a:srgbClr val="FFC000"/>
+      </a:accent4>
+      <a:accent5>
+        <a:srgbClr val="5B9BD5"/>
+      </a:accent5>
+      <a:accent6>
+        <a:srgbClr val="70AD47"/>
+      </a:accent6>
+      <a:hlink>
+        <a:srgbClr val="0563C1"/>
+      </a:hlink>
+      <a:folHlink>
+        <a:srgbClr val="954F72"/>
+      </a:folHlink>
+    </a:clrScheme>
+    <a:fontScheme name="Office">
+      <a:majorFont>
+        <a:latin typeface="Calibri Light" panose="020F0302020204030204"/>
+        <a:ea typeface=""/>
+        <a:cs typeface=""/>
+        <a:font script="Jpan" typeface="游ゴシック Light"/>
+        <a:font script="Hang" typeface="맑은 고딕"/>
+        <a:font script="Hans" typeface="等线 Light"/>
+        <a:font script="Hant" typeface="新細明體"/>
+        <a:font script="Arab" typeface="Times New Roman"/>
+        <a:font script="Hebr" typeface="Times New Roman"/>
+        <a:font script="Thai" typeface="Angsana New"/>
+        <a:font script="Ethi" typeface="Nyala"/>
+        <a:font script="Beng" typeface="Vrinda"/>
+        <a:font script="Gujr" typeface="Shruti"/>
+        <a:font script="Khmr" typeface="MoolBoran"/>
+        <a:font script="Knda" typeface="Tunga"/>
+        <a:font script="Guru" typeface="Raavi"/>
+        <a:font script="Cans" typeface="Euphemia"/>
+        <a:font script="Cher" typeface="Plantagenet Cherokee"/>
+        <a:font script="Yiii" typeface="Microsoft Yi Baiti"/>
+        <a:font script="Tibt" typeface="Microsoft Himalaya"/>
+        <a:font script="Thaa" typeface="MV Boli"/>
+        <a:font script="Deva" typeface="Mangal"/>
+        <a:font script="Telu" typeface="Gautami"/>
+        <a:font script="Taml" typeface="Latha"/>
+        <a:font script="Syrc" typeface="Estrangelo Edessa"/>
+        <a:font script="Orya" typeface="Kalinga"/>
+        <a:font script="Mlym" typeface="Kartika"/>
+        <a:font script="Laoo" typeface="DokChampa"/>
+        <a:font script="Sinh" typeface="Iskoola Pota"/>
+        <a:font script="Mong" typeface="Mongolian Baiti"/>
+        <a:font script="Viet" typeface="Times New Roman"/>
+        <a:font script="Uigh" typeface="Microsoft Uighur"/>
+        <a:font script="Geor" typeface="Sylfaen"/>
+        <a:font script="Armn" typeface="Arial"/>
+        <a:font script="Bugi" typeface="Leelawadee UI"/>
+        <a:font script="Bopo" typeface="Microsoft JhengHei"/>
+        <a:font script="Java" typeface="Javanese Text"/>
+        <a:font script="Lisu" typeface="Segoe UI"/>
+        <a:font script="Mymr" typeface="Myanmar Text"/>
+        <a:font script="Nkoo" typeface="Ebrima"/>
+        <a:font script="Olck" typeface="Nirmala UI"/>
+        <a:font script="Osma" typeface="Ebrima"/>
+        <a:font script="Phag" typeface="Phagspa"/>
+        <a:font script="Syrn" typeface="Estrangelo Edessa"/>
+        <a:font script="Syrj" typeface="Estrangelo Edessa"/>
+        <a:font script="Syre" typeface="Estrangelo Edessa"/>
+        <a:font script="Sora" typeface="Nirmala UI"/>
+        <a:font script="Tale" typeface="Microsoft Tai Le"/>
+        <a:font script="Talu" typeface="Microsoft New Tai Lue"/>
+        <a:font script="Tfng" typeface="Ebrima"/>
+      </a:majorFont>
+      <a:minorFont>
+        <a:latin typeface="Calibri" panose="020F0502020204030204"/>
+        <a:ea typeface=""/>
+        <a:cs typeface=""/>
+        <a:font script="Jpan" typeface="游ゴシック"/>
+        <a:font script="Hang" typeface="맑은 고딕"/>
+        <a:font script="Hans" typeface="等线"/>
+        <a:font script="Hant" typeface="新細明體"/>
+        <a:font script="Arab" typeface="Arial"/>
+        <a:font script="Hebr" typeface="Arial"/>
+        <a:font script="Thai" typeface="Cordia New"/>
+        <a:font script="Ethi" typeface="Nyala"/>
+        <a:font script="Beng" typeface="Vrinda"/>
+        <a:font script="Gujr" typeface="Shruti"/>
+        <a:font script="Khmr" typeface="DaunPenh"/>
+        <a:font script="Knda" typeface="Tunga"/>
+        <a:font script="Guru" typeface="Raavi"/>
+        <a:font script="Cans" typeface="Euphemia"/>
+        <a:font script="Cher" typeface="Plantagenet Cherokee"/>
+        <a:font script="Yiii" typeface="Microsoft Yi Baiti"/>
+        <a:font script="Tibt" typeface="Microsoft Himalaya"/>
+        <a:font script="Thaa" typeface="MV Boli"/>
+        <a:font script="Deva" typeface="Mangal"/>
+        <a:font script="Telu" typeface="Gautami"/>
+        <a:font script="Taml" typeface="Latha"/>
+        <a:font script="Syrc" typeface="Estrangelo Edessa"/>
+        <a:font script="Orya" typeface="Kalinga"/>
+        <a:font script="Mlym" typeface="Kartika"/>
+        <a:font script="Laoo" typeface="DokChampa"/>
+        <a:font script="Sinh" typeface="Iskoola Pota"/>
+        <a:font script="Mong" typeface="Mongolian Baiti"/>
+        <a:font script="Viet" typeface="Arial"/>
+        <a:font script="Uigh" typeface="Microsoft Uighur"/>
+        <a:font script="Geor" typeface="Sylfaen"/>
+        <a:font script="Armn" typeface="Arial"/>
+        <a:font script="Bugi" typeface="Leelawadee UI"/>
+        <a:font script="Bopo" typeface="Microsoft JhengHei"/>
+        <a:font script="Java" typeface="Javanese Text"/>
+        <a:font script="Lisu" typeface="Segoe UI"/>
+        <a:font script="Mymr" typeface="Myanmar Text"/>
+        <a:font script="Nkoo" typeface="Ebrima"/>
+        <a:font script="Olck" typeface="Nirmala UI"/>
+        <a:font script="Osma" typeface="Ebrima"/>
+        <a:font script="Phag" typeface="Phagspa"/>
+        <a:font script="Syrn" typeface="Estrangelo Edessa"/>
+        <a:font script="Syrj" typeface="Estrangelo Edessa"/>
+        <a:font script="Syre" typeface="Estrangelo Edessa"/>
+        <a:font script="Sora" typeface="Nirmala UI"/>
+        <a:font script="Tale" typeface="Microsoft Tai Le"/>
+        <a:font script="Talu" typeface="Microsoft New Tai Lue"/>
+        <a:font script="Tfng" typeface="Ebrima"/>
+      </a:minorFont>
+    </a:fontScheme>
+    <a:fmtScheme name="Office">
+      <a:fillStyleLst>
+        <a:solidFill>
+          <a:schemeClr val="phClr"/>
+        </a:solidFill>
+        <a:gradFill rotWithShape="1">
+          <a:gsLst>
+            <a:gs pos="0">
+              <a:schemeClr val="phClr">
+                <a:lumMod val="110000"/>
+                <a:satMod val="105000"/>
+                <a:tint val="67000"/>
+              </a:schemeClr>
+            </a:gs>
+            <a:gs pos="50000">
+              <a:schemeClr val="phClr">
+                <a:lumMod val="105000"/>
+                <a:satMod val="103000"/>
+                <a:tint val="73000"/>
+              </a:schemeClr>
+            </a:gs>
+            <a:gs pos="100000">
+              <a:schemeClr val="phClr">
+                <a:lumMod val="105000"/>
+                <a:satMod val="109000"/>
+                <a:tint val="81000"/>
+              </a:schemeClr>
+            </a:gs>
+          </a:gsLst>
+          <a:lin ang="5400000" scaled="0"/>
+        </a:gradFill>
+        <a:gradFill rotWithShape="1">
+          <a:gsLst>
+            <a:gs pos="0">
+              <a:schemeClr val="phClr">
+                <a:satMod val="103000"/>
+                <a:lumMod val="102000"/>
+                <a:tint val="94000"/>
+              </a:schemeClr>
+            </a:gs>
+            <a:gs pos="50000">
+              <a:schemeClr val="phClr">
+                <a:satMod val="110000"/>
+                <a:lumMod val="100000"/>
+                <a:shade val="100000"/>
+              </a:schemeClr>
+            </a:gs>
+            <a:gs pos="100000">
+              <a:schemeClr val="phClr">
+                <a:lumMod val="99000"/>
+                <a:satMod val="120000"/>
+                <a:shade val="78000"/>
+              </a:schemeClr>
+            </a:gs>
+          </a:gsLst>
+          <a:lin ang="5400000" scaled="0"/>
+        </a:gradFill>
+      </a:fillStyleLst>
+      <a:lnStyleLst>
+        <a:ln w="6350" cap="flat" cmpd="sng" algn="ctr">
+          <a:solidFill>
+            <a:schemeClr val="phClr"/>
+          </a:solidFill>
+          <a:prstDash val="solid"/>
+          <a:miter lim="800000"/>
+        </a:ln>
+        <a:ln w="12700" cap="flat" cmpd="sng" algn="ctr">
+          <a:solidFill>
+            <a:schemeClr val="phClr"/>
+          </a:solidFill>
+          <a:prstDash val="solid"/>
+          <a:miter lim="800000"/>
+        </a:ln>
+        <a:ln w="19050" cap="flat" cmpd="sng" algn="ctr">
+          <a:solidFill>
+            <a:schemeClr val="phClr"/>
+          </a:solidFill>
+          <a:prstDash val="solid"/>
+          <a:miter lim="800000"/>
+        </a:ln>
+      </a:lnStyleLst>
+      <a:effectStyleLst>
+        <a:effectStyle>
+          <a:effectLst/>
+        </a:effectStyle>
+        <a:effectStyle>
+          <a:effectLst/>
+        </a:effectStyle>
+        <a:effectStyle>
+          <a:effectLst>
+            <a:outerShdw blurRad="57150" dist="19050" dir="5400000" algn="ctr" rotWithShape="0">
+              <a:srgbClr val="000000">
+                <a:alpha val="63000"/>
+              </a:srgbClr>
+            </a:outerShdw>
+          </a:effectLst>
+        </a:effectStyle>
+      </a:effectStyleLst>
+      <a:bgFillStyleLst>
+        <a:solidFill>
+          <a:schemeClr val="phClr"/>
+        </a:solidFill>
+        <a:solidFill>
+          <a:schemeClr val="phClr">
+            <a:tint val="95000"/>
+            <a:satMod val="170000"/>
+          </a:schemeClr>
+        </a:solidFill>
+        <a:gradFill rotWithShape="1">
+          <a:gsLst>
+            <a:gs pos="0">
+              <a:schemeClr val="phClr">
+                <a:tint val="93000"/>
+                <a:satMod val="150000"/>
+                <a:shade val="98000"/>
+                <a:lumMod val="102000"/>
+              </a:schemeClr>
+            </a:gs>
+            <a:gs pos="50000">
+              <a:schemeClr val="phClr">
+                <a:tint val="98000"/>
+                <a:satMod val="130000"/>
+                <a:shade val="90000"/>
+                <a:lumMod val="103000"/>
+              </a:schemeClr>
+            </a:gs>
+            <a:gs pos="100000">
+              <a:schemeClr val="phClr">
+                <a:shade val="63000"/>
+                <a:satMod val="120000"/>
+              </a:schemeClr>
+            </a:gs>
+          </a:gsLst>
+          <a:lin ang="5400000" scaled="0"/>
+        </a:gradFill>
+      </a:bgFillStyleLst>
+    </a:fmtScheme>
+  </a:themeElements>
+  <a:objectDefaults/>
+  <a:extraClrSchemeLst/>
+  <a:extLst>
+    <a:ext uri="{05A4C25C-085E-4340-85A3-A5531E510DB2}">
+      <thm15:themeFamily xmlns:thm15="http://schemas.microsoft.com/office/thememl/2012/main" name="Office Theme" id="{62F939B6-93AF-4DB8-9C6B-D6C7DFDC589F}" vid="{4A3C46E8-61CC-4603-A589-7422A47A8E4A}"/>
+    </a:ext>
+  </a:extLst>
+</a:theme>
 </file>
</xml_diff>